<commit_message>
Fixing metadata, updating slides for topic 10
</commit_message>
<xml_diff>
--- a/Courses/Software-Sciences/Module-3-Databases-New/10-Group-and-Aggregate-Functions/10-Group-and-Aggregate-Functions.pptx
+++ b/Courses/Software-Sciences/Module-3-Databases-New/10-Group-and-Aggregate-Functions/10-Group-and-Aggregate-Functions.pptx
@@ -134,7 +134,7 @@
   </p:defaultTextStyle>
   <p:extLst>
     <p:ext uri="{521415D9-36F7-43E2-AB2F-B90AF26B5E84}">
-      <p14:sectionLst xmlns="" xmlns:p14="http://schemas.microsoft.com/office/powerpoint/2010/main">
+      <p14:sectionLst xmlns:p14="http://schemas.microsoft.com/office/powerpoint/2010/main" xmlns="">
         <p14:section name="Въведение" id="{A0C7653D-1924-4F56-9E27-AA2B21F1DA92}">
           <p14:sldIdLst>
             <p14:sldId id="503"/>
@@ -193,7 +193,7 @@
       </p14:sectionLst>
     </p:ext>
     <p:ext uri="{EFAFB233-063F-42B5-8137-9DF3F51BA10A}">
-      <p15:sldGuideLst xmlns="" xmlns:p15="http://schemas.microsoft.com/office/powerpoint/2012/main">
+      <p15:sldGuideLst xmlns:p15="http://schemas.microsoft.com/office/powerpoint/2012/main" xmlns="">
         <p15:guide id="1" orient="horz" pos="2184" userDrawn="1">
           <p15:clr>
             <a:srgbClr val="A4A3A4"/>
@@ -207,7 +207,7 @@
       </p15:sldGuideLst>
     </p:ext>
     <p:ext uri="{2D200454-40CA-4A62-9FC3-DE9A4176ACB9}">
-      <p15:notesGuideLst xmlns="" xmlns:p15="http://schemas.microsoft.com/office/powerpoint/2012/main"/>
+      <p15:notesGuideLst xmlns:p15="http://schemas.microsoft.com/office/powerpoint/2012/main" xmlns=""/>
     </p:ext>
   </p:extLst>
 </p:presentation>
@@ -240,7 +240,7 @@
           <p:cNvPr id="2" name="Header Placeholder 1">
             <a:extLst>
               <a:ext uri="{FF2B5EF4-FFF2-40B4-BE49-F238E27FC236}">
-                <a16:creationId xmlns="" xmlns:a16="http://schemas.microsoft.com/office/drawing/2014/main" id="{56F20103-83CC-4A54-8FDE-9D37FC2629C0}"/>
+                <a16:creationId xmlns:a16="http://schemas.microsoft.com/office/drawing/2014/main" xmlns="" id="{56F20103-83CC-4A54-8FDE-9D37FC2629C0}"/>
               </a:ext>
             </a:extLst>
           </p:cNvPr>
@@ -277,7 +277,7 @@
           <p:cNvPr id="3" name="Date Placeholder 2">
             <a:extLst>
               <a:ext uri="{FF2B5EF4-FFF2-40B4-BE49-F238E27FC236}">
-                <a16:creationId xmlns="" xmlns:a16="http://schemas.microsoft.com/office/drawing/2014/main" id="{27A53962-26EF-44E4-9E69-61B1727AB1C2}"/>
+                <a16:creationId xmlns:a16="http://schemas.microsoft.com/office/drawing/2014/main" xmlns="" id="{27A53962-26EF-44E4-9E69-61B1727AB1C2}"/>
               </a:ext>
             </a:extLst>
           </p:cNvPr>
@@ -308,7 +308,7 @@
             <a:fld id="{4E087215-0C8F-4762-A664-737A353EC9A4}" type="datetimeFigureOut">
               <a:rPr lang="bg-BG" smtClean="0"/>
               <a:pPr/>
-              <a:t>26.8.2023 г.</a:t>
+              <a:t>30.8.2023 г.</a:t>
             </a:fld>
             <a:endParaRPr lang="bg-BG" dirty="0"/>
           </a:p>
@@ -319,7 +319,7 @@
           <p:cNvPr id="4" name="Footer Placeholder 3">
             <a:extLst>
               <a:ext uri="{FF2B5EF4-FFF2-40B4-BE49-F238E27FC236}">
-                <a16:creationId xmlns="" xmlns:a16="http://schemas.microsoft.com/office/drawing/2014/main" id="{28A6967E-448F-4887-8FCB-34482EFBCC74}"/>
+                <a16:creationId xmlns:a16="http://schemas.microsoft.com/office/drawing/2014/main" xmlns="" id="{28A6967E-448F-4887-8FCB-34482EFBCC74}"/>
               </a:ext>
             </a:extLst>
           </p:cNvPr>
@@ -369,7 +369,7 @@
           <p:cNvPr id="5" name="Slide Number Placeholder 4">
             <a:extLst>
               <a:ext uri="{FF2B5EF4-FFF2-40B4-BE49-F238E27FC236}">
-                <a16:creationId xmlns="" xmlns:a16="http://schemas.microsoft.com/office/drawing/2014/main" id="{8B6554C2-DDBA-40E2-9536-53A07EC50274}"/>
+                <a16:creationId xmlns:a16="http://schemas.microsoft.com/office/drawing/2014/main" xmlns="" id="{8B6554C2-DDBA-40E2-9536-53A07EC50274}"/>
               </a:ext>
             </a:extLst>
           </p:cNvPr>
@@ -409,7 +409,7 @@
     </p:spTree>
     <p:extLst>
       <p:ext uri="{BB962C8B-B14F-4D97-AF65-F5344CB8AC3E}">
-        <p14:creationId xmlns="" xmlns:p14="http://schemas.microsoft.com/office/powerpoint/2010/main" val="4150602968"/>
+        <p14:creationId xmlns:p14="http://schemas.microsoft.com/office/powerpoint/2010/main" xmlns="" val="4150602968"/>
       </p:ext>
     </p:extLst>
   </p:cSld>
@@ -501,7 +501,7 @@
             <a:fld id="{72D84649-876A-46C9-8472-14CB09C070D8}" type="datetimeFigureOut">
               <a:rPr lang="en-US" smtClean="0"/>
               <a:pPr/>
-              <a:t>8/26/2023</a:t>
+              <a:t>8/30/2023</a:t>
             </a:fld>
             <a:endParaRPr lang="en-US" dirty="0"/>
           </a:p>
@@ -640,7 +640,7 @@
           <p:cNvPr id="8" name="Footer Placeholder 7">
             <a:extLst>
               <a:ext uri="{FF2B5EF4-FFF2-40B4-BE49-F238E27FC236}">
-                <a16:creationId xmlns="" xmlns:a16="http://schemas.microsoft.com/office/drawing/2014/main" id="{CAC3A49B-3196-44DF-AC28-085C72EFBFF0}"/>
+                <a16:creationId xmlns:a16="http://schemas.microsoft.com/office/drawing/2014/main" xmlns="" id="{CAC3A49B-3196-44DF-AC28-085C72EFBFF0}"/>
               </a:ext>
             </a:extLst>
           </p:cNvPr>
@@ -688,7 +688,7 @@
     </p:spTree>
     <p:extLst>
       <p:ext uri="{BB962C8B-B14F-4D97-AF65-F5344CB8AC3E}">
-        <p14:creationId xmlns="" xmlns:p14="http://schemas.microsoft.com/office/powerpoint/2010/main" val="1530847692"/>
+        <p14:creationId xmlns:p14="http://schemas.microsoft.com/office/powerpoint/2010/main" xmlns="" val="1530847692"/>
       </p:ext>
     </p:extLst>
   </p:cSld>
@@ -835,7 +835,7 @@
           <p:cNvPr id="8" name="Slide Image Placeholder 7">
             <a:extLst>
               <a:ext uri="{FF2B5EF4-FFF2-40B4-BE49-F238E27FC236}">
-                <a16:creationId xmlns="" xmlns:a16="http://schemas.microsoft.com/office/drawing/2014/main" id="{78811095-27E9-49AB-972B-D4E20B3963A6}"/>
+                <a16:creationId xmlns:a16="http://schemas.microsoft.com/office/drawing/2014/main" xmlns="" id="{78811095-27E9-49AB-972B-D4E20B3963A6}"/>
               </a:ext>
             </a:extLst>
           </p:cNvPr>
@@ -853,7 +853,7 @@
           <p:cNvPr id="9" name="Notes Placeholder 8">
             <a:extLst>
               <a:ext uri="{FF2B5EF4-FFF2-40B4-BE49-F238E27FC236}">
-                <a16:creationId xmlns="" xmlns:a16="http://schemas.microsoft.com/office/drawing/2014/main" id="{E923224B-0CC3-475A-8628-8A90751AE61A}"/>
+                <a16:creationId xmlns:a16="http://schemas.microsoft.com/office/drawing/2014/main" xmlns="" id="{E923224B-0CC3-475A-8628-8A90751AE61A}"/>
               </a:ext>
             </a:extLst>
           </p:cNvPr>
@@ -878,7 +878,7 @@
           <p:cNvPr id="2" name="Footer Placeholder 1">
             <a:extLst>
               <a:ext uri="{FF2B5EF4-FFF2-40B4-BE49-F238E27FC236}">
-                <a16:creationId xmlns="" xmlns:a16="http://schemas.microsoft.com/office/drawing/2014/main" id="{3288A3F3-90B1-4930-8D00-5603BDABEF10}"/>
+                <a16:creationId xmlns:a16="http://schemas.microsoft.com/office/drawing/2014/main" xmlns="" id="{3288A3F3-90B1-4930-8D00-5603BDABEF10}"/>
               </a:ext>
             </a:extLst>
           </p:cNvPr>
@@ -914,7 +914,7 @@
     </p:spTree>
     <p:extLst>
       <p:ext uri="{BB962C8B-B14F-4D97-AF65-F5344CB8AC3E}">
-        <p14:creationId xmlns="" xmlns:p14="http://schemas.microsoft.com/office/powerpoint/2010/main" val="2594489433"/>
+        <p14:creationId xmlns:p14="http://schemas.microsoft.com/office/powerpoint/2010/main" xmlns="" val="2594489433"/>
       </p:ext>
     </p:extLst>
   </p:cSld>
@@ -1001,7 +1001,7 @@
     </p:spTree>
     <p:extLst>
       <p:ext uri="{BB962C8B-B14F-4D97-AF65-F5344CB8AC3E}">
-        <p14:creationId xmlns:p14="http://schemas.microsoft.com/office/powerpoint/2010/main" xmlns="" val="739441119"/>
+        <p14:creationId xmlns="" xmlns:p14="http://schemas.microsoft.com/office/powerpoint/2010/main" val="739441119"/>
       </p:ext>
     </p:extLst>
   </p:cSld>
@@ -1088,7 +1088,7 @@
     </p:spTree>
     <p:extLst>
       <p:ext uri="{BB962C8B-B14F-4D97-AF65-F5344CB8AC3E}">
-        <p14:creationId xmlns:p14="http://schemas.microsoft.com/office/powerpoint/2010/main" xmlns="" val="392881015"/>
+        <p14:creationId xmlns="" xmlns:p14="http://schemas.microsoft.com/office/powerpoint/2010/main" val="392881015"/>
       </p:ext>
     </p:extLst>
   </p:cSld>
@@ -1175,7 +1175,7 @@
     </p:spTree>
     <p:extLst>
       <p:ext uri="{BB962C8B-B14F-4D97-AF65-F5344CB8AC3E}">
-        <p14:creationId xmlns:p14="http://schemas.microsoft.com/office/powerpoint/2010/main" xmlns="" val="1959022685"/>
+        <p14:creationId xmlns="" xmlns:p14="http://schemas.microsoft.com/office/powerpoint/2010/main" val="1959022685"/>
       </p:ext>
     </p:extLst>
   </p:cSld>
@@ -1262,7 +1262,7 @@
     </p:spTree>
     <p:extLst>
       <p:ext uri="{BB962C8B-B14F-4D97-AF65-F5344CB8AC3E}">
-        <p14:creationId xmlns:p14="http://schemas.microsoft.com/office/powerpoint/2010/main" xmlns="" val="1957593545"/>
+        <p14:creationId xmlns="" xmlns:p14="http://schemas.microsoft.com/office/powerpoint/2010/main" val="1957593545"/>
       </p:ext>
     </p:extLst>
   </p:cSld>
@@ -1349,7 +1349,7 @@
     </p:spTree>
     <p:extLst>
       <p:ext uri="{BB962C8B-B14F-4D97-AF65-F5344CB8AC3E}">
-        <p14:creationId xmlns:p14="http://schemas.microsoft.com/office/powerpoint/2010/main" xmlns="" val="1241881377"/>
+        <p14:creationId xmlns="" xmlns:p14="http://schemas.microsoft.com/office/powerpoint/2010/main" val="1241881377"/>
       </p:ext>
     </p:extLst>
   </p:cSld>
@@ -1436,7 +1436,7 @@
     </p:spTree>
     <p:extLst>
       <p:ext uri="{BB962C8B-B14F-4D97-AF65-F5344CB8AC3E}">
-        <p14:creationId xmlns:p14="http://schemas.microsoft.com/office/powerpoint/2010/main" xmlns="" val="3230814681"/>
+        <p14:creationId xmlns="" xmlns:p14="http://schemas.microsoft.com/office/powerpoint/2010/main" val="3230814681"/>
       </p:ext>
     </p:extLst>
   </p:cSld>
@@ -1523,7 +1523,7 @@
     </p:spTree>
     <p:extLst>
       <p:ext uri="{BB962C8B-B14F-4D97-AF65-F5344CB8AC3E}">
-        <p14:creationId xmlns:p14="http://schemas.microsoft.com/office/powerpoint/2010/main" xmlns="" val="1732524567"/>
+        <p14:creationId xmlns="" xmlns:p14="http://schemas.microsoft.com/office/powerpoint/2010/main" val="1732524567"/>
       </p:ext>
     </p:extLst>
   </p:cSld>
@@ -1610,7 +1610,7 @@
     </p:spTree>
     <p:extLst>
       <p:ext uri="{BB962C8B-B14F-4D97-AF65-F5344CB8AC3E}">
-        <p14:creationId xmlns:p14="http://schemas.microsoft.com/office/powerpoint/2010/main" xmlns="" val="3666701707"/>
+        <p14:creationId xmlns="" xmlns:p14="http://schemas.microsoft.com/office/powerpoint/2010/main" val="3666701707"/>
       </p:ext>
     </p:extLst>
   </p:cSld>
@@ -1697,7 +1697,7 @@
     </p:spTree>
     <p:extLst>
       <p:ext uri="{BB962C8B-B14F-4D97-AF65-F5344CB8AC3E}">
-        <p14:creationId xmlns:p14="http://schemas.microsoft.com/office/powerpoint/2010/main" xmlns="" val="2565863475"/>
+        <p14:creationId xmlns="" xmlns:p14="http://schemas.microsoft.com/office/powerpoint/2010/main" val="2565863475"/>
       </p:ext>
     </p:extLst>
   </p:cSld>
@@ -1760,7 +1760,7 @@
           <p:cNvPr id="7" name="Slide Number Placeholder 5">
             <a:extLst>
               <a:ext uri="{FF2B5EF4-FFF2-40B4-BE49-F238E27FC236}">
-                <a16:creationId xmlns="" xmlns:a16="http://schemas.microsoft.com/office/drawing/2014/main" id="{E65F1CA9-65DC-416B-8882-B3A5E415CE67}"/>
+                <a16:creationId xmlns:a16="http://schemas.microsoft.com/office/drawing/2014/main" xmlns="" id="{E65F1CA9-65DC-416B-8882-B3A5E415CE67}"/>
               </a:ext>
             </a:extLst>
           </p:cNvPr>
@@ -1890,7 +1890,7 @@
           <p:cNvPr id="4" name="Footer Placeholder 3">
             <a:extLst>
               <a:ext uri="{FF2B5EF4-FFF2-40B4-BE49-F238E27FC236}">
-                <a16:creationId xmlns="" xmlns:a16="http://schemas.microsoft.com/office/drawing/2014/main" id="{C5BD11C3-9FCD-4EAE-876D-E766924FAFF2}"/>
+                <a16:creationId xmlns:a16="http://schemas.microsoft.com/office/drawing/2014/main" xmlns="" id="{C5BD11C3-9FCD-4EAE-876D-E766924FAFF2}"/>
               </a:ext>
             </a:extLst>
           </p:cNvPr>
@@ -1926,7 +1926,7 @@
     </p:spTree>
     <p:extLst>
       <p:ext uri="{BB962C8B-B14F-4D97-AF65-F5344CB8AC3E}">
-        <p14:creationId xmlns="" xmlns:p14="http://schemas.microsoft.com/office/powerpoint/2010/main" val="1860974293"/>
+        <p14:creationId xmlns:p14="http://schemas.microsoft.com/office/powerpoint/2010/main" xmlns="" val="1860974293"/>
       </p:ext>
     </p:extLst>
   </p:cSld>
@@ -1958,7 +1958,7 @@
           <p:cNvPr id="14" name="Slide Image Placeholder 13">
             <a:extLst>
               <a:ext uri="{FF2B5EF4-FFF2-40B4-BE49-F238E27FC236}">
-                <a16:creationId xmlns="" xmlns:a16="http://schemas.microsoft.com/office/drawing/2014/main" id="{A1F0B3C6-2E53-4CA3-86D1-53D46EC35267}"/>
+                <a16:creationId xmlns:a16="http://schemas.microsoft.com/office/drawing/2014/main" xmlns="" id="{A1F0B3C6-2E53-4CA3-86D1-53D46EC35267}"/>
               </a:ext>
             </a:extLst>
           </p:cNvPr>
@@ -1976,7 +1976,7 @@
           <p:cNvPr id="15" name="Notes Placeholder 14">
             <a:extLst>
               <a:ext uri="{FF2B5EF4-FFF2-40B4-BE49-F238E27FC236}">
-                <a16:creationId xmlns="" xmlns:a16="http://schemas.microsoft.com/office/drawing/2014/main" id="{149CC699-A079-49A5-A4D6-73B7F849A7DC}"/>
+                <a16:creationId xmlns:a16="http://schemas.microsoft.com/office/drawing/2014/main" xmlns="" id="{149CC699-A079-49A5-A4D6-73B7F849A7DC}"/>
               </a:ext>
             </a:extLst>
           </p:cNvPr>
@@ -2001,7 +2001,7 @@
           <p:cNvPr id="19" name="Slide Number Placeholder 5">
             <a:extLst>
               <a:ext uri="{FF2B5EF4-FFF2-40B4-BE49-F238E27FC236}">
-                <a16:creationId xmlns="" xmlns:a16="http://schemas.microsoft.com/office/drawing/2014/main" id="{121F4233-7E9A-40D2-9066-2DB14E2FA5AD}"/>
+                <a16:creationId xmlns:a16="http://schemas.microsoft.com/office/drawing/2014/main" xmlns="" id="{121F4233-7E9A-40D2-9066-2DB14E2FA5AD}"/>
               </a:ext>
             </a:extLst>
           </p:cNvPr>
@@ -2131,7 +2131,7 @@
           <p:cNvPr id="2" name="Footer Placeholder 1">
             <a:extLst>
               <a:ext uri="{FF2B5EF4-FFF2-40B4-BE49-F238E27FC236}">
-                <a16:creationId xmlns="" xmlns:a16="http://schemas.microsoft.com/office/drawing/2014/main" id="{D18F1DFF-B3E7-4ABF-97EE-0BBF3A961EC5}"/>
+                <a16:creationId xmlns:a16="http://schemas.microsoft.com/office/drawing/2014/main" xmlns="" id="{D18F1DFF-B3E7-4ABF-97EE-0BBF3A961EC5}"/>
               </a:ext>
             </a:extLst>
           </p:cNvPr>
@@ -2167,7 +2167,7 @@
     </p:spTree>
     <p:extLst>
       <p:ext uri="{BB962C8B-B14F-4D97-AF65-F5344CB8AC3E}">
-        <p14:creationId xmlns="" xmlns:p14="http://schemas.microsoft.com/office/powerpoint/2010/main" val="4028530743"/>
+        <p14:creationId xmlns:p14="http://schemas.microsoft.com/office/powerpoint/2010/main" xmlns="" val="4028530743"/>
       </p:ext>
     </p:extLst>
   </p:cSld>
@@ -2252,7 +2252,7 @@
     </p:spTree>
     <p:extLst>
       <p:ext uri="{BB962C8B-B14F-4D97-AF65-F5344CB8AC3E}">
-        <p14:creationId xmlns="" xmlns:p14="http://schemas.microsoft.com/office/powerpoint/2010/main" val="1201445929"/>
+        <p14:creationId xmlns:p14="http://schemas.microsoft.com/office/powerpoint/2010/main" xmlns="" val="1201445929"/>
       </p:ext>
     </p:extLst>
   </p:cSld>
@@ -2315,7 +2315,7 @@
           <p:cNvPr id="6" name="Slide Number Placeholder 5">
             <a:extLst>
               <a:ext uri="{FF2B5EF4-FFF2-40B4-BE49-F238E27FC236}">
-                <a16:creationId xmlns="" xmlns:a16="http://schemas.microsoft.com/office/drawing/2014/main" id="{6627548A-4D3C-449B-81A5-FA4BE4628490}"/>
+                <a16:creationId xmlns:a16="http://schemas.microsoft.com/office/drawing/2014/main" xmlns="" id="{6627548A-4D3C-449B-81A5-FA4BE4628490}"/>
               </a:ext>
             </a:extLst>
           </p:cNvPr>
@@ -2445,7 +2445,7 @@
           <p:cNvPr id="4" name="Footer Placeholder 3">
             <a:extLst>
               <a:ext uri="{FF2B5EF4-FFF2-40B4-BE49-F238E27FC236}">
-                <a16:creationId xmlns="" xmlns:a16="http://schemas.microsoft.com/office/drawing/2014/main" id="{D2472CE7-61C1-4B7B-B0C8-5A45F0178717}"/>
+                <a16:creationId xmlns:a16="http://schemas.microsoft.com/office/drawing/2014/main" xmlns="" id="{D2472CE7-61C1-4B7B-B0C8-5A45F0178717}"/>
               </a:ext>
             </a:extLst>
           </p:cNvPr>
@@ -2481,7 +2481,7 @@
     </p:spTree>
     <p:extLst>
       <p:ext uri="{BB962C8B-B14F-4D97-AF65-F5344CB8AC3E}">
-        <p14:creationId xmlns="" xmlns:p14="http://schemas.microsoft.com/office/powerpoint/2010/main" val="729041308"/>
+        <p14:creationId xmlns:p14="http://schemas.microsoft.com/office/powerpoint/2010/main" xmlns="" val="729041308"/>
       </p:ext>
     </p:extLst>
   </p:cSld>
@@ -2568,7 +2568,7 @@
     </p:spTree>
     <p:extLst>
       <p:ext uri="{BB962C8B-B14F-4D97-AF65-F5344CB8AC3E}">
-        <p14:creationId xmlns:p14="http://schemas.microsoft.com/office/powerpoint/2010/main" xmlns="" val="1983305484"/>
+        <p14:creationId xmlns="" xmlns:p14="http://schemas.microsoft.com/office/powerpoint/2010/main" val="1983305484"/>
       </p:ext>
     </p:extLst>
   </p:cSld>
@@ -2711,7 +2711,7 @@
     </p:spTree>
     <p:extLst>
       <p:ext uri="{BB962C8B-B14F-4D97-AF65-F5344CB8AC3E}">
-        <p14:creationId xmlns:p14="http://schemas.microsoft.com/office/powerpoint/2010/main" xmlns="" val="2521350068"/>
+        <p14:creationId xmlns="" xmlns:p14="http://schemas.microsoft.com/office/powerpoint/2010/main" val="2521350068"/>
       </p:ext>
     </p:extLst>
   </p:cSld>
@@ -2798,7 +2798,7 @@
     </p:spTree>
     <p:extLst>
       <p:ext uri="{BB962C8B-B14F-4D97-AF65-F5344CB8AC3E}">
-        <p14:creationId xmlns:p14="http://schemas.microsoft.com/office/powerpoint/2010/main" xmlns="" val="4189918064"/>
+        <p14:creationId xmlns="" xmlns:p14="http://schemas.microsoft.com/office/powerpoint/2010/main" val="4189918064"/>
       </p:ext>
     </p:extLst>
   </p:cSld>
@@ -2903,7 +2903,7 @@
     </p:spTree>
     <p:extLst>
       <p:ext uri="{BB962C8B-B14F-4D97-AF65-F5344CB8AC3E}">
-        <p14:creationId xmlns:p14="http://schemas.microsoft.com/office/powerpoint/2010/main" xmlns="" val="3583996884"/>
+        <p14:creationId xmlns="" xmlns:p14="http://schemas.microsoft.com/office/powerpoint/2010/main" val="3583996884"/>
       </p:ext>
     </p:extLst>
   </p:cSld>
@@ -3252,7 +3252,7 @@
     </p:spTree>
     <p:extLst>
       <p:ext uri="{BB962C8B-B14F-4D97-AF65-F5344CB8AC3E}">
-        <p14:creationId xmlns:p14="http://schemas.microsoft.com/office/powerpoint/2010/main" xmlns="" val="3067206918"/>
+        <p14:creationId xmlns="" xmlns:p14="http://schemas.microsoft.com/office/powerpoint/2010/main" val="3067206918"/>
       </p:ext>
     </p:extLst>
   </p:cSld>
@@ -3339,7 +3339,7 @@
     </p:spTree>
     <p:extLst>
       <p:ext uri="{BB962C8B-B14F-4D97-AF65-F5344CB8AC3E}">
-        <p14:creationId xmlns:p14="http://schemas.microsoft.com/office/powerpoint/2010/main" xmlns="" val="981608418"/>
+        <p14:creationId xmlns="" xmlns:p14="http://schemas.microsoft.com/office/powerpoint/2010/main" val="981608418"/>
       </p:ext>
     </p:extLst>
   </p:cSld>
@@ -3426,7 +3426,7 @@
     </p:spTree>
     <p:extLst>
       <p:ext uri="{BB962C8B-B14F-4D97-AF65-F5344CB8AC3E}">
-        <p14:creationId xmlns:p14="http://schemas.microsoft.com/office/powerpoint/2010/main" xmlns="" val="3056574795"/>
+        <p14:creationId xmlns="" xmlns:p14="http://schemas.microsoft.com/office/powerpoint/2010/main" val="3056574795"/>
       </p:ext>
     </p:extLst>
   </p:cSld>
@@ -3458,7 +3458,7 @@
           <p:cNvPr id="16" name="Rectangle Bottom">
             <a:extLst>
               <a:ext uri="{FF2B5EF4-FFF2-40B4-BE49-F238E27FC236}">
-                <a16:creationId xmlns="" xmlns:a16="http://schemas.microsoft.com/office/drawing/2014/main" id="{6854D183-0374-4B3E-B2CE-32F308A81591}"/>
+                <a16:creationId xmlns:a16="http://schemas.microsoft.com/office/drawing/2014/main" xmlns="" id="{6854D183-0374-4B3E-B2CE-32F308A81591}"/>
               </a:ext>
             </a:extLst>
           </p:cNvPr>
@@ -3539,7 +3539,7 @@
           <p:cNvPr id="14" name="Picture Logo SoftUni" descr="SoftUni logo">
             <a:extLst>
               <a:ext uri="{FF2B5EF4-FFF2-40B4-BE49-F238E27FC236}">
-                <a16:creationId xmlns="" xmlns:a16="http://schemas.microsoft.com/office/drawing/2014/main" id="{C4D6B2A2-DFF0-4712-BFEC-6676BEC99FEC}"/>
+                <a16:creationId xmlns:a16="http://schemas.microsoft.com/office/drawing/2014/main" xmlns="" id="{C4D6B2A2-DFF0-4712-BFEC-6676BEC99FEC}"/>
               </a:ext>
             </a:extLst>
           </p:cNvPr>
@@ -3562,7 +3562,7 @@
             </a:clrChange>
             <a:extLst>
               <a:ext uri="{28A0092B-C50C-407E-A947-70E740481C1C}">
-                <a14:useLocalDpi xmlns="" xmlns:a14="http://schemas.microsoft.com/office/drawing/2010/main" val="0"/>
+                <a14:useLocalDpi xmlns:a14="http://schemas.microsoft.com/office/drawing/2010/main" xmlns="" val="0"/>
               </a:ext>
             </a:extLst>
           </a:blip>
@@ -3585,7 +3585,7 @@
           <p:cNvPr id="31" name="Text Placeholder Company Site">
             <a:extLst>
               <a:ext uri="{FF2B5EF4-FFF2-40B4-BE49-F238E27FC236}">
-                <a16:creationId xmlns="" xmlns:a16="http://schemas.microsoft.com/office/drawing/2014/main" id="{3E6B87B7-9D33-4EBB-BD4F-C0436BA3FD72}"/>
+                <a16:creationId xmlns:a16="http://schemas.microsoft.com/office/drawing/2014/main" xmlns="" id="{3E6B87B7-9D33-4EBB-BD4F-C0436BA3FD72}"/>
               </a:ext>
             </a:extLst>
           </p:cNvPr>
@@ -3647,7 +3647,7 @@
           <p:cNvPr id="30" name="Text Placeholder Company Name">
             <a:extLst>
               <a:ext uri="{FF2B5EF4-FFF2-40B4-BE49-F238E27FC236}">
-                <a16:creationId xmlns="" xmlns:a16="http://schemas.microsoft.com/office/drawing/2014/main" id="{2EA92DCA-4DB5-4D03-ACD3-A6A296592D0C}"/>
+                <a16:creationId xmlns:a16="http://schemas.microsoft.com/office/drawing/2014/main" xmlns="" id="{2EA92DCA-4DB5-4D03-ACD3-A6A296592D0C}"/>
               </a:ext>
             </a:extLst>
           </p:cNvPr>
@@ -3709,7 +3709,7 @@
           <p:cNvPr id="35" name="Picture SoftUni Mascot" descr="SoftUni mascot">
             <a:extLst>
               <a:ext uri="{FF2B5EF4-FFF2-40B4-BE49-F238E27FC236}">
-                <a16:creationId xmlns="" xmlns:a16="http://schemas.microsoft.com/office/drawing/2014/main" id="{951E7DA9-C5F0-43D9-B013-3BDF9EEF029D}"/>
+                <a16:creationId xmlns:a16="http://schemas.microsoft.com/office/drawing/2014/main" xmlns="" id="{951E7DA9-C5F0-43D9-B013-3BDF9EEF029D}"/>
               </a:ext>
             </a:extLst>
           </p:cNvPr>
@@ -3722,7 +3722,7 @@
           <a:blip r:embed="rId3" cstate="print">
             <a:extLst>
               <a:ext uri="{28A0092B-C50C-407E-A947-70E740481C1C}">
-                <a14:useLocalDpi xmlns="" xmlns:a14="http://schemas.microsoft.com/office/drawing/2010/main" val="0"/>
+                <a14:useLocalDpi xmlns:a14="http://schemas.microsoft.com/office/drawing/2010/main" xmlns="" val="0"/>
               </a:ext>
             </a:extLst>
           </a:blip>
@@ -3745,7 +3745,7 @@
             <a:hlinkClick r:id="rId4"/>
             <a:extLst>
               <a:ext uri="{FF2B5EF4-FFF2-40B4-BE49-F238E27FC236}">
-                <a16:creationId xmlns="" xmlns:a16="http://schemas.microsoft.com/office/drawing/2014/main" id="{F2315EB3-3FE4-4D3B-921E-5F209CEC13CB}"/>
+                <a16:creationId xmlns:a16="http://schemas.microsoft.com/office/drawing/2014/main" xmlns="" id="{F2315EB3-3FE4-4D3B-921E-5F209CEC13CB}"/>
               </a:ext>
             </a:extLst>
           </p:cNvPr>
@@ -3768,7 +3768,7 @@
             </a:clrChange>
             <a:extLst>
               <a:ext uri="{28A0092B-C50C-407E-A947-70E740481C1C}">
-                <a14:useLocalDpi xmlns="" xmlns:a14="http://schemas.microsoft.com/office/drawing/2010/main" val="0"/>
+                <a14:useLocalDpi xmlns:a14="http://schemas.microsoft.com/office/drawing/2010/main" xmlns="" val="0"/>
               </a:ext>
             </a:extLst>
           </a:blip>
@@ -3791,7 +3791,7 @@
           <p:cNvPr id="40" name="Text Placeholder Author Position">
             <a:extLst>
               <a:ext uri="{FF2B5EF4-FFF2-40B4-BE49-F238E27FC236}">
-                <a16:creationId xmlns="" xmlns:a16="http://schemas.microsoft.com/office/drawing/2014/main" id="{CD940256-851E-46C8-8BFB-A5ECA6C7DA07}"/>
+                <a16:creationId xmlns:a16="http://schemas.microsoft.com/office/drawing/2014/main" xmlns="" id="{CD940256-851E-46C8-8BFB-A5ECA6C7DA07}"/>
               </a:ext>
             </a:extLst>
           </p:cNvPr>
@@ -3851,7 +3851,7 @@
           <p:cNvPr id="36" name="Text Placeholder Author Name">
             <a:extLst>
               <a:ext uri="{FF2B5EF4-FFF2-40B4-BE49-F238E27FC236}">
-                <a16:creationId xmlns="" xmlns:a16="http://schemas.microsoft.com/office/drawing/2014/main" id="{3B21F47B-DE1F-442D-A2B7-6866F8786704}"/>
+                <a16:creationId xmlns:a16="http://schemas.microsoft.com/office/drawing/2014/main" xmlns="" id="{3B21F47B-DE1F-442D-A2B7-6866F8786704}"/>
               </a:ext>
             </a:extLst>
           </p:cNvPr>
@@ -3911,7 +3911,7 @@
           <p:cNvPr id="33" name="Picture Placeholder Title Image">
             <a:extLst>
               <a:ext uri="{FF2B5EF4-FFF2-40B4-BE49-F238E27FC236}">
-                <a16:creationId xmlns="" xmlns:a16="http://schemas.microsoft.com/office/drawing/2014/main" id="{A04D819A-89E2-4714-8C56-1838BF467EF7}"/>
+                <a16:creationId xmlns:a16="http://schemas.microsoft.com/office/drawing/2014/main" xmlns="" id="{A04D819A-89E2-4714-8C56-1838BF467EF7}"/>
               </a:ext>
             </a:extLst>
           </p:cNvPr>
@@ -3953,7 +3953,7 @@
           <p:cNvPr id="43" name="Presentation Subtitle">
             <a:extLst>
               <a:ext uri="{FF2B5EF4-FFF2-40B4-BE49-F238E27FC236}">
-                <a16:creationId xmlns="" xmlns:a16="http://schemas.microsoft.com/office/drawing/2014/main" id="{37BDB812-1395-4B02-ABCF-6A331EEE23E5}"/>
+                <a16:creationId xmlns:a16="http://schemas.microsoft.com/office/drawing/2014/main" xmlns="" id="{37BDB812-1395-4B02-ABCF-6A331EEE23E5}"/>
               </a:ext>
             </a:extLst>
           </p:cNvPr>
@@ -3997,7 +3997,7 @@
           <p:cNvPr id="2" name="Presentation Title">
             <a:extLst>
               <a:ext uri="{FF2B5EF4-FFF2-40B4-BE49-F238E27FC236}">
-                <a16:creationId xmlns="" xmlns:a16="http://schemas.microsoft.com/office/drawing/2014/main" id="{A4DF3AB8-E6E3-4FCE-8A4A-ECD147720A5D}"/>
+                <a16:creationId xmlns:a16="http://schemas.microsoft.com/office/drawing/2014/main" xmlns="" id="{A4DF3AB8-E6E3-4FCE-8A4A-ECD147720A5D}"/>
               </a:ext>
             </a:extLst>
           </p:cNvPr>
@@ -4032,7 +4032,7 @@
     </p:spTree>
     <p:extLst>
       <p:ext uri="{BB962C8B-B14F-4D97-AF65-F5344CB8AC3E}">
-        <p14:creationId xmlns="" xmlns:p14="http://schemas.microsoft.com/office/powerpoint/2010/main" val="970179299"/>
+        <p14:creationId xmlns:p14="http://schemas.microsoft.com/office/powerpoint/2010/main" xmlns="" val="970179299"/>
       </p:ext>
     </p:extLst>
   </p:cSld>
@@ -4040,7 +4040,7 @@
     <a:masterClrMapping/>
   </p:clrMapOvr>
   <mc:AlternateContent xmlns:mc="http://schemas.openxmlformats.org/markup-compatibility/2006">
-    <mc:Choice xmlns="" xmlns:p14="http://schemas.microsoft.com/office/powerpoint/2010/main" Requires="p14">
+    <mc:Choice xmlns:p14="http://schemas.microsoft.com/office/powerpoint/2010/main" xmlns="" Requires="p14">
       <p:transition spd="slow" p14:dur="2000" advClick="0" advTm="5000"/>
     </mc:Choice>
     <mc:Fallback>
@@ -4049,7 +4049,7 @@
   </mc:AlternateContent>
   <p:extLst>
     <p:ext uri="{DCECCB84-F9BA-43D5-87BE-67443E8EF086}">
-      <p15:sldGuideLst xmlns="" xmlns:p15="http://schemas.microsoft.com/office/powerpoint/2012/main">
+      <p15:sldGuideLst xmlns:p15="http://schemas.microsoft.com/office/powerpoint/2012/main" xmlns="">
         <p15:guide id="1" orient="horz" pos="2160">
           <p15:clr>
             <a:srgbClr val="FBAE40"/>
@@ -4088,7 +4088,7 @@
           <p:cNvPr id="15" name="Slide Number">
             <a:extLst>
               <a:ext uri="{FF2B5EF4-FFF2-40B4-BE49-F238E27FC236}">
-                <a16:creationId xmlns="" xmlns:a16="http://schemas.microsoft.com/office/drawing/2014/main" id="{F888EE71-82B3-40F1-A63F-7417422FB4A4}"/>
+                <a16:creationId xmlns:a16="http://schemas.microsoft.com/office/drawing/2014/main" xmlns="" id="{F888EE71-82B3-40F1-A63F-7417422FB4A4}"/>
               </a:ext>
             </a:extLst>
           </p:cNvPr>
@@ -4130,7 +4130,7 @@
           <p:cNvPr id="14" name="Text Placeholder Body">
             <a:extLst>
               <a:ext uri="{FF2B5EF4-FFF2-40B4-BE49-F238E27FC236}">
-                <a16:creationId xmlns="" xmlns:a16="http://schemas.microsoft.com/office/drawing/2014/main" id="{A2ABE920-240F-4CF6-AD45-23ED489FAD6E}"/>
+                <a16:creationId xmlns:a16="http://schemas.microsoft.com/office/drawing/2014/main" xmlns="" id="{A2ABE920-240F-4CF6-AD45-23ED489FAD6E}"/>
               </a:ext>
             </a:extLst>
           </p:cNvPr>
@@ -4436,7 +4436,7 @@
           <p:cNvPr id="10" name="Rectangle Down">
             <a:extLst>
               <a:ext uri="{FF2B5EF4-FFF2-40B4-BE49-F238E27FC236}">
-                <a16:creationId xmlns="" xmlns:a16="http://schemas.microsoft.com/office/drawing/2014/main" id="{E9B994EC-35A8-4A11-98CB-25DC28852F94}"/>
+                <a16:creationId xmlns:a16="http://schemas.microsoft.com/office/drawing/2014/main" xmlns="" id="{E9B994EC-35A8-4A11-98CB-25DC28852F94}"/>
               </a:ext>
             </a:extLst>
           </p:cNvPr>
@@ -4517,7 +4517,7 @@
           <p:cNvPr id="11" name="Rectangle Top">
             <a:extLst>
               <a:ext uri="{FF2B5EF4-FFF2-40B4-BE49-F238E27FC236}">
-                <a16:creationId xmlns="" xmlns:a16="http://schemas.microsoft.com/office/drawing/2014/main" id="{274B8F05-DFCE-47BD-BAFD-DF93E1A63BDD}"/>
+                <a16:creationId xmlns:a16="http://schemas.microsoft.com/office/drawing/2014/main" xmlns="" id="{274B8F05-DFCE-47BD-BAFD-DF93E1A63BDD}"/>
               </a:ext>
             </a:extLst>
           </p:cNvPr>
@@ -4598,7 +4598,7 @@
           <p:cNvPr id="12" name="Logo Software University" descr="Software University logo">
             <a:extLst>
               <a:ext uri="{FF2B5EF4-FFF2-40B4-BE49-F238E27FC236}">
-                <a16:creationId xmlns="" xmlns:a16="http://schemas.microsoft.com/office/drawing/2014/main" id="{233CBB95-791E-4630-B3D9-FADFCE7BCF52}"/>
+                <a16:creationId xmlns:a16="http://schemas.microsoft.com/office/drawing/2014/main" xmlns="" id="{233CBB95-791E-4630-B3D9-FADFCE7BCF52}"/>
               </a:ext>
             </a:extLst>
           </p:cNvPr>
@@ -4611,7 +4611,7 @@
           <a:blip r:embed="rId2" cstate="print">
             <a:extLst>
               <a:ext uri="{28A0092B-C50C-407E-A947-70E740481C1C}">
-                <a14:useLocalDpi xmlns="" xmlns:a14="http://schemas.microsoft.com/office/drawing/2010/main" val="0"/>
+                <a14:useLocalDpi xmlns:a14="http://schemas.microsoft.com/office/drawing/2010/main" xmlns="" val="0"/>
               </a:ext>
             </a:extLst>
           </a:blip>
@@ -4634,7 +4634,7 @@
           <p:cNvPr id="13" name="Slide Title">
             <a:extLst>
               <a:ext uri="{FF2B5EF4-FFF2-40B4-BE49-F238E27FC236}">
-                <a16:creationId xmlns="" xmlns:a16="http://schemas.microsoft.com/office/drawing/2014/main" id="{3F218E34-55D7-4290-BFE4-80F31F941551}"/>
+                <a16:creationId xmlns:a16="http://schemas.microsoft.com/office/drawing/2014/main" xmlns="" id="{3F218E34-55D7-4290-BFE4-80F31F941551}"/>
               </a:ext>
             </a:extLst>
           </p:cNvPr>
@@ -4673,7 +4673,7 @@
     </p:spTree>
     <p:extLst>
       <p:ext uri="{BB962C8B-B14F-4D97-AF65-F5344CB8AC3E}">
-        <p14:creationId xmlns="" xmlns:p14="http://schemas.microsoft.com/office/powerpoint/2010/main" val="3774019400"/>
+        <p14:creationId xmlns:p14="http://schemas.microsoft.com/office/powerpoint/2010/main" xmlns="" val="3774019400"/>
       </p:ext>
     </p:extLst>
   </p:cSld>
@@ -4681,7 +4681,7 @@
     <a:masterClrMapping/>
   </p:clrMapOvr>
   <mc:AlternateContent xmlns:mc="http://schemas.openxmlformats.org/markup-compatibility/2006">
-    <mc:Choice xmlns="" xmlns:p14="http://schemas.microsoft.com/office/powerpoint/2010/main" Requires="p14">
+    <mc:Choice xmlns:p14="http://schemas.microsoft.com/office/powerpoint/2010/main" xmlns="" Requires="p14">
       <p:transition spd="slow" p14:dur="2000" advClick="0" advTm="5000"/>
     </mc:Choice>
     <mc:Fallback>
@@ -4721,7 +4721,7 @@
           <p:cNvPr id="35" name="Rectangle Bottom">
             <a:extLst>
               <a:ext uri="{FF2B5EF4-FFF2-40B4-BE49-F238E27FC236}">
-                <a16:creationId xmlns="" xmlns:a16="http://schemas.microsoft.com/office/drawing/2014/main" id="{550A59F9-9A9D-4956-95B4-F78CC0DB1D59}"/>
+                <a16:creationId xmlns:a16="http://schemas.microsoft.com/office/drawing/2014/main" xmlns="" id="{550A59F9-9A9D-4956-95B4-F78CC0DB1D59}"/>
               </a:ext>
             </a:extLst>
           </p:cNvPr>
@@ -4802,7 +4802,7 @@
           <p:cNvPr id="53" name="Rectangle Bottom Copyright">
             <a:extLst>
               <a:ext uri="{FF2B5EF4-FFF2-40B4-BE49-F238E27FC236}">
-                <a16:creationId xmlns="" xmlns:a16="http://schemas.microsoft.com/office/drawing/2014/main" id="{B07FB7FB-DA6C-4F5D-B068-357F0FCE27D8}"/>
+                <a16:creationId xmlns:a16="http://schemas.microsoft.com/office/drawing/2014/main" xmlns="" id="{B07FB7FB-DA6C-4F5D-B068-357F0FCE27D8}"/>
               </a:ext>
             </a:extLst>
           </p:cNvPr>
@@ -4859,7 +4859,7 @@
                 <a:hlinkClick r:id="rId2">
                   <a:extLst>
                     <a:ext uri="{A12FA001-AC4F-418D-AE19-62706E023703}">
-                      <ahyp:hlinkClr xmlns="" xmlns:ahyp="http://schemas.microsoft.com/office/drawing/2018/hyperlinkcolor" val="tx"/>
+                      <ahyp:hlinkClr xmlns:ahyp="http://schemas.microsoft.com/office/drawing/2018/hyperlinkcolor" xmlns="" val="tx"/>
                     </a:ext>
                   </a:extLst>
                 </a:hlinkClick>
@@ -4895,7 +4895,7 @@
           <p:cNvPr id="26" name="Picture SoftUni Mascot" descr="SoftUni mascot with open hand">
             <a:extLst>
               <a:ext uri="{FF2B5EF4-FFF2-40B4-BE49-F238E27FC236}">
-                <a16:creationId xmlns="" xmlns:a16="http://schemas.microsoft.com/office/drawing/2014/main" id="{247CFF3C-C4FA-493D-8505-DF469F4D36A4}"/>
+                <a16:creationId xmlns:a16="http://schemas.microsoft.com/office/drawing/2014/main" xmlns="" id="{247CFF3C-C4FA-493D-8505-DF469F4D36A4}"/>
               </a:ext>
             </a:extLst>
           </p:cNvPr>
@@ -4908,7 +4908,7 @@
           <a:blip r:embed="rId3" cstate="print">
             <a:extLst>
               <a:ext uri="{28A0092B-C50C-407E-A947-70E740481C1C}">
-                <a14:useLocalDpi xmlns="" xmlns:a14="http://schemas.microsoft.com/office/drawing/2010/main" val="0"/>
+                <a14:useLocalDpi xmlns:a14="http://schemas.microsoft.com/office/drawing/2010/main" xmlns="" val="0"/>
               </a:ext>
             </a:extLst>
           </a:blip>
@@ -4931,7 +4931,7 @@
           <p:cNvPr id="2" name="Group SoftUni Brands">
             <a:extLst>
               <a:ext uri="{FF2B5EF4-FFF2-40B4-BE49-F238E27FC236}">
-                <a16:creationId xmlns="" xmlns:a16="http://schemas.microsoft.com/office/drawing/2014/main" id="{418FAE34-C1F8-46C7-A4AE-F270D1E70F25}"/>
+                <a16:creationId xmlns:a16="http://schemas.microsoft.com/office/drawing/2014/main" xmlns="" id="{418FAE34-C1F8-46C7-A4AE-F270D1E70F25}"/>
               </a:ext>
             </a:extLst>
           </p:cNvPr>
@@ -4951,7 +4951,7 @@
             <p:cNvPr id="24" name="Picture SoftUni Kids Logo" descr="SoftUni Kids logo">
               <a:extLst>
                 <a:ext uri="{FF2B5EF4-FFF2-40B4-BE49-F238E27FC236}">
-                  <a16:creationId xmlns="" xmlns:a16="http://schemas.microsoft.com/office/drawing/2014/main" id="{B0812936-74B6-4265-8C08-AEDC8C798702}"/>
+                  <a16:creationId xmlns:a16="http://schemas.microsoft.com/office/drawing/2014/main" xmlns="" id="{B0812936-74B6-4265-8C08-AEDC8C798702}"/>
                 </a:ext>
               </a:extLst>
             </p:cNvPr>
@@ -4964,7 +4964,7 @@
             <a:blip r:embed="rId4" cstate="print">
               <a:extLst>
                 <a:ext uri="{28A0092B-C50C-407E-A947-70E740481C1C}">
-                  <a14:useLocalDpi xmlns="" xmlns:a14="http://schemas.microsoft.com/office/drawing/2010/main" val="0"/>
+                  <a14:useLocalDpi xmlns:a14="http://schemas.microsoft.com/office/drawing/2010/main" xmlns="" val="0"/>
                 </a:ext>
               </a:extLst>
             </a:blip>
@@ -4987,7 +4987,7 @@
             <p:cNvPr id="23" name="Picture SoftUni Foundation Logo" descr="SoftUni Foundation logo">
               <a:extLst>
                 <a:ext uri="{FF2B5EF4-FFF2-40B4-BE49-F238E27FC236}">
-                  <a16:creationId xmlns="" xmlns:a16="http://schemas.microsoft.com/office/drawing/2014/main" id="{6643F71A-2013-433A-8322-FBAAED3162D8}"/>
+                  <a16:creationId xmlns:a16="http://schemas.microsoft.com/office/drawing/2014/main" xmlns="" id="{6643F71A-2013-433A-8322-FBAAED3162D8}"/>
                 </a:ext>
               </a:extLst>
             </p:cNvPr>
@@ -5000,7 +5000,7 @@
             <a:blip r:embed="rId5" cstate="print">
               <a:extLst>
                 <a:ext uri="{28A0092B-C50C-407E-A947-70E740481C1C}">
-                  <a14:useLocalDpi xmlns="" xmlns:a14="http://schemas.microsoft.com/office/drawing/2010/main" val="0"/>
+                  <a14:useLocalDpi xmlns:a14="http://schemas.microsoft.com/office/drawing/2010/main" xmlns="" val="0"/>
                 </a:ext>
               </a:extLst>
             </a:blip>
@@ -5023,7 +5023,7 @@
             <p:cNvPr id="22" name="Picture SoftUni Digital Logo" descr="SoftUni Digital logo">
               <a:extLst>
                 <a:ext uri="{FF2B5EF4-FFF2-40B4-BE49-F238E27FC236}">
-                  <a16:creationId xmlns="" xmlns:a16="http://schemas.microsoft.com/office/drawing/2014/main" id="{0A83D66F-855B-463B-920B-BF239B01A206}"/>
+                  <a16:creationId xmlns:a16="http://schemas.microsoft.com/office/drawing/2014/main" xmlns="" id="{0A83D66F-855B-463B-920B-BF239B01A206}"/>
                 </a:ext>
               </a:extLst>
             </p:cNvPr>
@@ -5036,7 +5036,7 @@
             <a:blip r:embed="rId6" cstate="print">
               <a:extLst>
                 <a:ext uri="{28A0092B-C50C-407E-A947-70E740481C1C}">
-                  <a14:useLocalDpi xmlns="" xmlns:a14="http://schemas.microsoft.com/office/drawing/2010/main" val="0"/>
+                  <a14:useLocalDpi xmlns:a14="http://schemas.microsoft.com/office/drawing/2010/main" xmlns="" val="0"/>
                 </a:ext>
               </a:extLst>
             </a:blip>
@@ -5059,7 +5059,7 @@
             <p:cNvPr id="21" name="Picture SoftUni Creative Logo" descr="SoftUni Creative logo">
               <a:extLst>
                 <a:ext uri="{FF2B5EF4-FFF2-40B4-BE49-F238E27FC236}">
-                  <a16:creationId xmlns="" xmlns:a16="http://schemas.microsoft.com/office/drawing/2014/main" id="{EA755AAE-BA08-481C-9224-0061170EE4B8}"/>
+                  <a16:creationId xmlns:a16="http://schemas.microsoft.com/office/drawing/2014/main" xmlns="" id="{EA755AAE-BA08-481C-9224-0061170EE4B8}"/>
                 </a:ext>
               </a:extLst>
             </p:cNvPr>
@@ -5072,7 +5072,7 @@
             <a:blip r:embed="rId7" cstate="print">
               <a:extLst>
                 <a:ext uri="{28A0092B-C50C-407E-A947-70E740481C1C}">
-                  <a14:useLocalDpi xmlns="" xmlns:a14="http://schemas.microsoft.com/office/drawing/2010/main" val="0"/>
+                  <a14:useLocalDpi xmlns:a14="http://schemas.microsoft.com/office/drawing/2010/main" xmlns="" val="0"/>
                 </a:ext>
               </a:extLst>
             </a:blip>
@@ -5095,7 +5095,7 @@
             <p:cNvPr id="20" name="Picture SoftUni Svetlina Logo" descr="SoftUni Svetlina logo">
               <a:extLst>
                 <a:ext uri="{FF2B5EF4-FFF2-40B4-BE49-F238E27FC236}">
-                  <a16:creationId xmlns="" xmlns:a16="http://schemas.microsoft.com/office/drawing/2014/main" id="{827D15FD-4C66-4B85-98E6-7826AA8F61C6}"/>
+                  <a16:creationId xmlns:a16="http://schemas.microsoft.com/office/drawing/2014/main" xmlns="" id="{827D15FD-4C66-4B85-98E6-7826AA8F61C6}"/>
                 </a:ext>
               </a:extLst>
             </p:cNvPr>
@@ -5108,7 +5108,7 @@
             <a:blip r:embed="rId8" cstate="print">
               <a:extLst>
                 <a:ext uri="{28A0092B-C50C-407E-A947-70E740481C1C}">
-                  <a14:useLocalDpi xmlns="" xmlns:a14="http://schemas.microsoft.com/office/drawing/2010/main" val="0"/>
+                  <a14:useLocalDpi xmlns:a14="http://schemas.microsoft.com/office/drawing/2010/main" xmlns="" val="0"/>
                 </a:ext>
               </a:extLst>
             </a:blip>
@@ -5131,7 +5131,7 @@
             <p:cNvPr id="25" name="Picture Software University Logo" descr="Software University logo">
               <a:extLst>
                 <a:ext uri="{FF2B5EF4-FFF2-40B4-BE49-F238E27FC236}">
-                  <a16:creationId xmlns="" xmlns:a16="http://schemas.microsoft.com/office/drawing/2014/main" id="{C74C190C-5856-41B9-8819-AE8DE0E10980}"/>
+                  <a16:creationId xmlns:a16="http://schemas.microsoft.com/office/drawing/2014/main" xmlns="" id="{C74C190C-5856-41B9-8819-AE8DE0E10980}"/>
                 </a:ext>
               </a:extLst>
             </p:cNvPr>
@@ -5144,7 +5144,7 @@
             <a:blip r:embed="rId9" cstate="print">
               <a:extLst>
                 <a:ext uri="{28A0092B-C50C-407E-A947-70E740481C1C}">
-                  <a14:useLocalDpi xmlns="" xmlns:a14="http://schemas.microsoft.com/office/drawing/2010/main" val="0"/>
+                  <a14:useLocalDpi xmlns:a14="http://schemas.microsoft.com/office/drawing/2010/main" xmlns="" val="0"/>
                 </a:ext>
               </a:extLst>
             </a:blip>
@@ -5167,7 +5167,7 @@
             <p:cNvPr id="33" name="Straight Connector 6">
               <a:extLst>
                 <a:ext uri="{FF2B5EF4-FFF2-40B4-BE49-F238E27FC236}">
-                  <a16:creationId xmlns="" xmlns:a16="http://schemas.microsoft.com/office/drawing/2014/main" id="{5C63D1E8-4A92-4691-8A24-A2FC7E8008E5}"/>
+                  <a16:creationId xmlns:a16="http://schemas.microsoft.com/office/drawing/2014/main" xmlns="" id="{5C63D1E8-4A92-4691-8A24-A2FC7E8008E5}"/>
                 </a:ext>
               </a:extLst>
             </p:cNvPr>
@@ -5206,7 +5206,7 @@
             <p:cNvPr id="32" name="Straight Connector 5">
               <a:extLst>
                 <a:ext uri="{FF2B5EF4-FFF2-40B4-BE49-F238E27FC236}">
-                  <a16:creationId xmlns="" xmlns:a16="http://schemas.microsoft.com/office/drawing/2014/main" id="{6E91D320-3732-40B8-864D-142D0A277ED1}"/>
+                  <a16:creationId xmlns:a16="http://schemas.microsoft.com/office/drawing/2014/main" xmlns="" id="{6E91D320-3732-40B8-864D-142D0A277ED1}"/>
                 </a:ext>
               </a:extLst>
             </p:cNvPr>
@@ -5245,7 +5245,7 @@
             <p:cNvPr id="31" name="Straight Connector 4">
               <a:extLst>
                 <a:ext uri="{FF2B5EF4-FFF2-40B4-BE49-F238E27FC236}">
-                  <a16:creationId xmlns="" xmlns:a16="http://schemas.microsoft.com/office/drawing/2014/main" id="{299ABE09-E33C-46B7-A80D-7BF4A6956211}"/>
+                  <a16:creationId xmlns:a16="http://schemas.microsoft.com/office/drawing/2014/main" xmlns="" id="{299ABE09-E33C-46B7-A80D-7BF4A6956211}"/>
                 </a:ext>
               </a:extLst>
             </p:cNvPr>
@@ -5282,7 +5282,7 @@
             <p:cNvPr id="30" name="Straight Connector 3">
               <a:extLst>
                 <a:ext uri="{FF2B5EF4-FFF2-40B4-BE49-F238E27FC236}">
-                  <a16:creationId xmlns="" xmlns:a16="http://schemas.microsoft.com/office/drawing/2014/main" id="{93DDBF37-0764-47AA-94E3-9A44F3ED8FB5}"/>
+                  <a16:creationId xmlns:a16="http://schemas.microsoft.com/office/drawing/2014/main" xmlns="" id="{93DDBF37-0764-47AA-94E3-9A44F3ED8FB5}"/>
                 </a:ext>
               </a:extLst>
             </p:cNvPr>
@@ -5319,7 +5319,7 @@
             <p:cNvPr id="29" name="Straight Connector 2">
               <a:extLst>
                 <a:ext uri="{FF2B5EF4-FFF2-40B4-BE49-F238E27FC236}">
-                  <a16:creationId xmlns="" xmlns:a16="http://schemas.microsoft.com/office/drawing/2014/main" id="{72BFE2F3-0845-4E5B-9375-E9D4027DD675}"/>
+                  <a16:creationId xmlns:a16="http://schemas.microsoft.com/office/drawing/2014/main" xmlns="" id="{72BFE2F3-0845-4E5B-9375-E9D4027DD675}"/>
                 </a:ext>
               </a:extLst>
             </p:cNvPr>
@@ -5356,7 +5356,7 @@
             <p:cNvPr id="28" name="Straight Connector 1">
               <a:extLst>
                 <a:ext uri="{FF2B5EF4-FFF2-40B4-BE49-F238E27FC236}">
-                  <a16:creationId xmlns="" xmlns:a16="http://schemas.microsoft.com/office/drawing/2014/main" id="{D4E5982E-3110-47E1-A5BB-91B7BECC3093}"/>
+                  <a16:creationId xmlns:a16="http://schemas.microsoft.com/office/drawing/2014/main" xmlns="" id="{D4E5982E-3110-47E1-A5BB-91B7BECC3093}"/>
                 </a:ext>
               </a:extLst>
             </p:cNvPr>
@@ -5393,7 +5393,7 @@
             <p:cNvPr id="27" name="Straight Connector Horizontal">
               <a:extLst>
                 <a:ext uri="{FF2B5EF4-FFF2-40B4-BE49-F238E27FC236}">
-                  <a16:creationId xmlns="" xmlns:a16="http://schemas.microsoft.com/office/drawing/2014/main" id="{5F62FB7C-BD6E-4383-98C1-2CF30F34CAFD}"/>
+                  <a16:creationId xmlns:a16="http://schemas.microsoft.com/office/drawing/2014/main" xmlns="" id="{5F62FB7C-BD6E-4383-98C1-2CF30F34CAFD}"/>
                 </a:ext>
               </a:extLst>
             </p:cNvPr>
@@ -5432,7 +5432,7 @@
             <p:cNvPr id="34" name="Straight Connector 0">
               <a:extLst>
                 <a:ext uri="{FF2B5EF4-FFF2-40B4-BE49-F238E27FC236}">
-                  <a16:creationId xmlns="" xmlns:a16="http://schemas.microsoft.com/office/drawing/2014/main" id="{C84A0FE1-723D-4682-8682-77BAD950EE15}"/>
+                  <a16:creationId xmlns:a16="http://schemas.microsoft.com/office/drawing/2014/main" xmlns="" id="{C84A0FE1-723D-4682-8682-77BAD950EE15}"/>
                 </a:ext>
               </a:extLst>
             </p:cNvPr>
@@ -5469,7 +5469,7 @@
             <p:cNvPr id="18" name="Picture SoftUni Logo" descr="SoftUni logo">
               <a:extLst>
                 <a:ext uri="{FF2B5EF4-FFF2-40B4-BE49-F238E27FC236}">
-                  <a16:creationId xmlns="" xmlns:a16="http://schemas.microsoft.com/office/drawing/2014/main" id="{A0675455-B7FA-4569-A5FD-A3B0F20B2A26}"/>
+                  <a16:creationId xmlns:a16="http://schemas.microsoft.com/office/drawing/2014/main" xmlns="" id="{A0675455-B7FA-4569-A5FD-A3B0F20B2A26}"/>
                 </a:ext>
               </a:extLst>
             </p:cNvPr>
@@ -5482,7 +5482,7 @@
             <a:blip r:embed="rId10" cstate="print">
               <a:extLst>
                 <a:ext uri="{28A0092B-C50C-407E-A947-70E740481C1C}">
-                  <a14:useLocalDpi xmlns="" xmlns:a14="http://schemas.microsoft.com/office/drawing/2010/main" val="0"/>
+                  <a14:useLocalDpi xmlns:a14="http://schemas.microsoft.com/office/drawing/2010/main" xmlns="" val="0"/>
                 </a:ext>
               </a:extLst>
             </a:blip>
@@ -5506,7 +5506,7 @@
           <p:cNvPr id="19" name="Slide Title">
             <a:extLst>
               <a:ext uri="{FF2B5EF4-FFF2-40B4-BE49-F238E27FC236}">
-                <a16:creationId xmlns="" xmlns:a16="http://schemas.microsoft.com/office/drawing/2014/main" id="{7CFDBB16-985C-4CC7-B6DB-B81B36037922}"/>
+                <a16:creationId xmlns:a16="http://schemas.microsoft.com/office/drawing/2014/main" xmlns="" id="{7CFDBB16-985C-4CC7-B6DB-B81B36037922}"/>
               </a:ext>
             </a:extLst>
           </p:cNvPr>
@@ -5609,7 +5609,7 @@
           <p:cNvPr id="36" name="Logo Software University" descr="Software University logo">
             <a:extLst>
               <a:ext uri="{FF2B5EF4-FFF2-40B4-BE49-F238E27FC236}">
-                <a16:creationId xmlns="" xmlns:a16="http://schemas.microsoft.com/office/drawing/2014/main" id="{67FC4D2E-913D-432A-B658-F0D82839FA5E}"/>
+                <a16:creationId xmlns:a16="http://schemas.microsoft.com/office/drawing/2014/main" xmlns="" id="{67FC4D2E-913D-432A-B658-F0D82839FA5E}"/>
               </a:ext>
             </a:extLst>
           </p:cNvPr>
@@ -5632,7 +5632,7 @@
             </a:clrChange>
             <a:extLst>
               <a:ext uri="{28A0092B-C50C-407E-A947-70E740481C1C}">
-                <a14:useLocalDpi xmlns="" xmlns:a14="http://schemas.microsoft.com/office/drawing/2010/main" val="0"/>
+                <a14:useLocalDpi xmlns:a14="http://schemas.microsoft.com/office/drawing/2010/main" xmlns="" val="0"/>
               </a:ext>
             </a:extLst>
           </a:blip>
@@ -5653,7 +5653,7 @@
     </p:spTree>
     <p:extLst>
       <p:ext uri="{BB962C8B-B14F-4D97-AF65-F5344CB8AC3E}">
-        <p14:creationId xmlns="" xmlns:p14="http://schemas.microsoft.com/office/powerpoint/2010/main" val="4192061223"/>
+        <p14:creationId xmlns:p14="http://schemas.microsoft.com/office/powerpoint/2010/main" xmlns="" val="4192061223"/>
       </p:ext>
     </p:extLst>
   </p:cSld>
@@ -5661,7 +5661,7 @@
     <a:masterClrMapping/>
   </p:clrMapOvr>
   <mc:AlternateContent xmlns:mc="http://schemas.openxmlformats.org/markup-compatibility/2006">
-    <mc:Choice xmlns="" xmlns:p14="http://schemas.microsoft.com/office/powerpoint/2010/main" Requires="p14">
+    <mc:Choice xmlns:p14="http://schemas.microsoft.com/office/powerpoint/2010/main" xmlns="" Requires="p14">
       <p:transition spd="slow" p14:dur="2000" advClick="0" advTm="5000"/>
     </mc:Choice>
     <mc:Fallback>
@@ -5670,7 +5670,7 @@
   </mc:AlternateContent>
   <p:extLst>
     <p:ext uri="{DCECCB84-F9BA-43D5-87BE-67443E8EF086}">
-      <p15:sldGuideLst xmlns="" xmlns:p15="http://schemas.microsoft.com/office/powerpoint/2012/main">
+      <p15:sldGuideLst xmlns:p15="http://schemas.microsoft.com/office/powerpoint/2012/main" xmlns="">
         <p15:guide id="1" orient="horz" pos="2160">
           <p15:clr>
             <a:srgbClr val="FBAE40"/>
@@ -5709,7 +5709,7 @@
           <p:cNvPr id="13" name="Slide Number">
             <a:extLst>
               <a:ext uri="{FF2B5EF4-FFF2-40B4-BE49-F238E27FC236}">
-                <a16:creationId xmlns="" xmlns:a16="http://schemas.microsoft.com/office/drawing/2014/main" id="{5B8761D8-B42F-4A70-A0CE-682CEB2AE31B}"/>
+                <a16:creationId xmlns:a16="http://schemas.microsoft.com/office/drawing/2014/main" xmlns="" id="{5B8761D8-B42F-4A70-A0CE-682CEB2AE31B}"/>
               </a:ext>
             </a:extLst>
           </p:cNvPr>
@@ -5752,7 +5752,7 @@
             <a:hlinkClick r:id="rId2" tooltip="Software University Discussion Forum"/>
             <a:extLst>
               <a:ext uri="{FF2B5EF4-FFF2-40B4-BE49-F238E27FC236}">
-                <a16:creationId xmlns="" xmlns:a16="http://schemas.microsoft.com/office/drawing/2014/main" id="{98C579AD-FAF5-4B28-9B52-5457F1E90061}"/>
+                <a16:creationId xmlns:a16="http://schemas.microsoft.com/office/drawing/2014/main" xmlns="" id="{98C579AD-FAF5-4B28-9B52-5457F1E90061}"/>
               </a:ext>
             </a:extLst>
           </p:cNvPr>
@@ -5765,7 +5765,7 @@
           <a:blip r:embed="rId3" cstate="print">
             <a:extLst>
               <a:ext uri="{28A0092B-C50C-407E-A947-70E740481C1C}">
-                <a14:useLocalDpi xmlns="" xmlns:a14="http://schemas.microsoft.com/office/drawing/2010/main"/>
+                <a14:useLocalDpi xmlns:a14="http://schemas.microsoft.com/office/drawing/2010/main" xmlns=""/>
               </a:ext>
             </a:extLst>
           </a:blip>
@@ -5789,7 +5789,7 @@
             <a:hlinkClick r:id="rId4" tooltip="Software University @ Facebook"/>
             <a:extLst>
               <a:ext uri="{FF2B5EF4-FFF2-40B4-BE49-F238E27FC236}">
-                <a16:creationId xmlns="" xmlns:a16="http://schemas.microsoft.com/office/drawing/2014/main" id="{6B2C510E-5EF2-49F6-B926-2BD74CD3C7F8}"/>
+                <a16:creationId xmlns:a16="http://schemas.microsoft.com/office/drawing/2014/main" xmlns="" id="{6B2C510E-5EF2-49F6-B926-2BD74CD3C7F8}"/>
               </a:ext>
             </a:extLst>
           </p:cNvPr>
@@ -5802,7 +5802,7 @@
           <a:blip r:embed="rId5" cstate="print">
             <a:extLst>
               <a:ext uri="{28A0092B-C50C-407E-A947-70E740481C1C}">
-                <a14:useLocalDpi xmlns="" xmlns:a14="http://schemas.microsoft.com/office/drawing/2010/main"/>
+                <a14:useLocalDpi xmlns:a14="http://schemas.microsoft.com/office/drawing/2010/main" xmlns=""/>
               </a:ext>
             </a:extLst>
           </a:blip>
@@ -5820,7 +5820,7 @@
           <a:noFill/>
           <a:extLst>
             <a:ext uri="{909E8E84-426E-40DD-AFC4-6F175D3DCCD1}">
-              <a14:hiddenFill xmlns="" xmlns:a14="http://schemas.microsoft.com/office/drawing/2010/main">
+              <a14:hiddenFill xmlns:a14="http://schemas.microsoft.com/office/drawing/2010/main" xmlns="">
                 <a:solidFill>
                   <a:srgbClr val="FFFFFF"/>
                 </a:solidFill>
@@ -5835,7 +5835,7 @@
             <a:hlinkClick r:id="rId6"/>
             <a:extLst>
               <a:ext uri="{FF2B5EF4-FFF2-40B4-BE49-F238E27FC236}">
-                <a16:creationId xmlns="" xmlns:a16="http://schemas.microsoft.com/office/drawing/2014/main" id="{F4604840-E810-44B7-9FF1-3B28CD68B758}"/>
+                <a16:creationId xmlns:a16="http://schemas.microsoft.com/office/drawing/2014/main" xmlns="" id="{F4604840-E810-44B7-9FF1-3B28CD68B758}"/>
               </a:ext>
             </a:extLst>
           </p:cNvPr>
@@ -5848,7 +5848,7 @@
           <a:blip r:embed="rId7" cstate="print">
             <a:extLst>
               <a:ext uri="{28A0092B-C50C-407E-A947-70E740481C1C}">
-                <a14:useLocalDpi xmlns="" xmlns:a14="http://schemas.microsoft.com/office/drawing/2010/main" val="0"/>
+                <a14:useLocalDpi xmlns:a14="http://schemas.microsoft.com/office/drawing/2010/main" xmlns="" val="0"/>
               </a:ext>
             </a:extLst>
           </a:blip>
@@ -5872,7 +5872,7 @@
             <a:hlinkClick r:id="rId8"/>
             <a:extLst>
               <a:ext uri="{FF2B5EF4-FFF2-40B4-BE49-F238E27FC236}">
-                <a16:creationId xmlns="" xmlns:a16="http://schemas.microsoft.com/office/drawing/2014/main" id="{07C965FA-A87E-4824-AFA8-C67AF548A76A}"/>
+                <a16:creationId xmlns:a16="http://schemas.microsoft.com/office/drawing/2014/main" xmlns="" id="{07C965FA-A87E-4824-AFA8-C67AF548A76A}"/>
               </a:ext>
             </a:extLst>
           </p:cNvPr>
@@ -5885,7 +5885,7 @@
           <a:blip r:embed="rId9" cstate="print">
             <a:extLst>
               <a:ext uri="{28A0092B-C50C-407E-A947-70E740481C1C}">
-                <a14:useLocalDpi xmlns="" xmlns:a14="http://schemas.microsoft.com/office/drawing/2010/main" val="0"/>
+                <a14:useLocalDpi xmlns:a14="http://schemas.microsoft.com/office/drawing/2010/main" xmlns="" val="0"/>
               </a:ext>
             </a:extLst>
           </a:blip>
@@ -5907,7 +5907,7 @@
           <p:cNvPr id="12" name="Slide Body Text">
             <a:extLst>
               <a:ext uri="{FF2B5EF4-FFF2-40B4-BE49-F238E27FC236}">
-                <a16:creationId xmlns="" xmlns:a16="http://schemas.microsoft.com/office/drawing/2014/main" id="{0C1F9416-8B6E-46DE-973C-777785E27A26}"/>
+                <a16:creationId xmlns:a16="http://schemas.microsoft.com/office/drawing/2014/main" xmlns="" id="{0C1F9416-8B6E-46DE-973C-777785E27A26}"/>
               </a:ext>
             </a:extLst>
           </p:cNvPr>
@@ -6032,7 +6032,7 @@
           <p:cNvPr id="10" name="Rectangle Top">
             <a:extLst>
               <a:ext uri="{FF2B5EF4-FFF2-40B4-BE49-F238E27FC236}">
-                <a16:creationId xmlns="" xmlns:a16="http://schemas.microsoft.com/office/drawing/2014/main" id="{86646B95-5E3B-4DE8-9118-031C2C296D8C}"/>
+                <a16:creationId xmlns:a16="http://schemas.microsoft.com/office/drawing/2014/main" xmlns="" id="{86646B95-5E3B-4DE8-9118-031C2C296D8C}"/>
               </a:ext>
             </a:extLst>
           </p:cNvPr>
@@ -6113,7 +6113,7 @@
           <p:cNvPr id="11" name="Logo Software University" descr="Software University logo">
             <a:extLst>
               <a:ext uri="{FF2B5EF4-FFF2-40B4-BE49-F238E27FC236}">
-                <a16:creationId xmlns="" xmlns:a16="http://schemas.microsoft.com/office/drawing/2014/main" id="{58AB1944-B146-4E89-B2D9-426EB610F319}"/>
+                <a16:creationId xmlns:a16="http://schemas.microsoft.com/office/drawing/2014/main" xmlns="" id="{58AB1944-B146-4E89-B2D9-426EB610F319}"/>
               </a:ext>
             </a:extLst>
           </p:cNvPr>
@@ -6126,7 +6126,7 @@
           <a:blip r:embed="rId11" cstate="print">
             <a:extLst>
               <a:ext uri="{28A0092B-C50C-407E-A947-70E740481C1C}">
-                <a14:useLocalDpi xmlns="" xmlns:a14="http://schemas.microsoft.com/office/drawing/2010/main" val="0"/>
+                <a14:useLocalDpi xmlns:a14="http://schemas.microsoft.com/office/drawing/2010/main" xmlns="" val="0"/>
               </a:ext>
             </a:extLst>
           </a:blip>
@@ -6149,7 +6149,7 @@
           <p:cNvPr id="18" name="Slide Title">
             <a:extLst>
               <a:ext uri="{FF2B5EF4-FFF2-40B4-BE49-F238E27FC236}">
-                <a16:creationId xmlns="" xmlns:a16="http://schemas.microsoft.com/office/drawing/2014/main" id="{AE87ED9C-76E1-4D85-9B06-3AF44AABB668}"/>
+                <a16:creationId xmlns:a16="http://schemas.microsoft.com/office/drawing/2014/main" xmlns="" id="{AE87ED9C-76E1-4D85-9B06-3AF44AABB668}"/>
               </a:ext>
             </a:extLst>
           </p:cNvPr>
@@ -6188,7 +6188,7 @@
     </p:spTree>
     <p:extLst>
       <p:ext uri="{BB962C8B-B14F-4D97-AF65-F5344CB8AC3E}">
-        <p14:creationId xmlns="" xmlns:p14="http://schemas.microsoft.com/office/powerpoint/2010/main" val="2196466322"/>
+        <p14:creationId xmlns:p14="http://schemas.microsoft.com/office/powerpoint/2010/main" xmlns="" val="2196466322"/>
       </p:ext>
     </p:extLst>
   </p:cSld>
@@ -6196,7 +6196,7 @@
     <a:masterClrMapping/>
   </p:clrMapOvr>
   <mc:AlternateContent xmlns:mc="http://schemas.openxmlformats.org/markup-compatibility/2006">
-    <mc:Choice xmlns="" xmlns:p14="http://schemas.microsoft.com/office/powerpoint/2010/main" Requires="p14">
+    <mc:Choice xmlns:p14="http://schemas.microsoft.com/office/powerpoint/2010/main" xmlns="" Requires="p14">
       <p:transition spd="slow" p14:dur="2000" advClick="0" advTm="5000"/>
     </mc:Choice>
     <mc:Fallback>
@@ -6228,7 +6228,7 @@
           <p:cNvPr id="9" name="Oval Center Icon">
             <a:extLst>
               <a:ext uri="{FF2B5EF4-FFF2-40B4-BE49-F238E27FC236}">
-                <a16:creationId xmlns="" xmlns:a16="http://schemas.microsoft.com/office/drawing/2014/main" id="{13B9A8FE-2718-4F2C-98D4-CBF86AD69D58}"/>
+                <a16:creationId xmlns:a16="http://schemas.microsoft.com/office/drawing/2014/main" xmlns="" id="{13B9A8FE-2718-4F2C-98D4-CBF86AD69D58}"/>
               </a:ext>
             </a:extLst>
           </p:cNvPr>
@@ -6309,7 +6309,7 @@
           <p:cNvPr id="8" name="Slide Subtitle">
             <a:extLst>
               <a:ext uri="{FF2B5EF4-FFF2-40B4-BE49-F238E27FC236}">
-                <a16:creationId xmlns="" xmlns:a16="http://schemas.microsoft.com/office/drawing/2014/main" id="{588387B4-E99E-4145-9D1D-F17CA5190DFD}"/>
+                <a16:creationId xmlns:a16="http://schemas.microsoft.com/office/drawing/2014/main" xmlns="" id="{588387B4-E99E-4145-9D1D-F17CA5190DFD}"/>
               </a:ext>
             </a:extLst>
           </p:cNvPr>
@@ -6359,7 +6359,7 @@
           <p:cNvPr id="13" name="Slide Title">
             <a:extLst>
               <a:ext uri="{FF2B5EF4-FFF2-40B4-BE49-F238E27FC236}">
-                <a16:creationId xmlns="" xmlns:a16="http://schemas.microsoft.com/office/drawing/2014/main" id="{8A28C56F-AE84-49D0-9AD1-1F0CEEABF710}"/>
+                <a16:creationId xmlns:a16="http://schemas.microsoft.com/office/drawing/2014/main" xmlns="" id="{8A28C56F-AE84-49D0-9AD1-1F0CEEABF710}"/>
               </a:ext>
             </a:extLst>
           </p:cNvPr>
@@ -6404,7 +6404,7 @@
     </p:spTree>
     <p:extLst>
       <p:ext uri="{BB962C8B-B14F-4D97-AF65-F5344CB8AC3E}">
-        <p14:creationId xmlns="" xmlns:p14="http://schemas.microsoft.com/office/powerpoint/2010/main" val="475389923"/>
+        <p14:creationId xmlns:p14="http://schemas.microsoft.com/office/powerpoint/2010/main" xmlns="" val="475389923"/>
       </p:ext>
     </p:extLst>
   </p:cSld>
@@ -6412,7 +6412,7 @@
     <a:masterClrMapping/>
   </p:clrMapOvr>
   <mc:AlternateContent xmlns:mc="http://schemas.openxmlformats.org/markup-compatibility/2006">
-    <mc:Choice xmlns="" xmlns:p14="http://schemas.microsoft.com/office/powerpoint/2010/main" Requires="p14">
+    <mc:Choice xmlns:p14="http://schemas.microsoft.com/office/powerpoint/2010/main" xmlns="" Requires="p14">
       <p:transition spd="slow" p14:dur="2000" advClick="0" advTm="5000"/>
     </mc:Choice>
     <mc:Fallback>
@@ -6445,7 +6445,7 @@
           <p:cNvPr id="2" name="Title 1">
             <a:extLst>
               <a:ext uri="{FF2B5EF4-FFF2-40B4-BE49-F238E27FC236}">
-                <a16:creationId xmlns="" xmlns:a16="http://schemas.microsoft.com/office/drawing/2014/main" id="{5213C145-EA12-94EF-AA17-5F628EA0AD2D}"/>
+                <a16:creationId xmlns:a16="http://schemas.microsoft.com/office/drawing/2014/main" xmlns="" id="{5213C145-EA12-94EF-AA17-5F628EA0AD2D}"/>
               </a:ext>
             </a:extLst>
           </p:cNvPr>
@@ -6483,7 +6483,7 @@
           <p:cNvPr id="3" name="Subtitle 2">
             <a:extLst>
               <a:ext uri="{FF2B5EF4-FFF2-40B4-BE49-F238E27FC236}">
-                <a16:creationId xmlns="" xmlns:a16="http://schemas.microsoft.com/office/drawing/2014/main" id="{5F55E72E-5B45-B6EE-75AE-03B188AD9A08}"/>
+                <a16:creationId xmlns:a16="http://schemas.microsoft.com/office/drawing/2014/main" xmlns="" id="{5F55E72E-5B45-B6EE-75AE-03B188AD9A08}"/>
               </a:ext>
             </a:extLst>
           </p:cNvPr>
@@ -6554,7 +6554,7 @@
           <p:cNvPr id="4" name="Date Placeholder 3">
             <a:extLst>
               <a:ext uri="{FF2B5EF4-FFF2-40B4-BE49-F238E27FC236}">
-                <a16:creationId xmlns="" xmlns:a16="http://schemas.microsoft.com/office/drawing/2014/main" id="{30C6A8EA-0240-01AB-A7C2-BD1CD885E1C1}"/>
+                <a16:creationId xmlns:a16="http://schemas.microsoft.com/office/drawing/2014/main" xmlns="" id="{30C6A8EA-0240-01AB-A7C2-BD1CD885E1C1}"/>
               </a:ext>
             </a:extLst>
           </p:cNvPr>
@@ -6573,7 +6573,7 @@
             <a:fld id="{1CF2F75B-1C4E-1E47-AE31-5B79E79ADF4F}" type="datetimeFigureOut">
               <a:rPr lang="x-none" smtClean="0"/>
               <a:pPr/>
-              <a:t>26.8.2023 г.</a:t>
+              <a:t>30.8.2023 г.</a:t>
             </a:fld>
             <a:endParaRPr lang="x-none"/>
           </a:p>
@@ -6584,7 +6584,7 @@
           <p:cNvPr id="5" name="Footer Placeholder 4">
             <a:extLst>
               <a:ext uri="{FF2B5EF4-FFF2-40B4-BE49-F238E27FC236}">
-                <a16:creationId xmlns="" xmlns:a16="http://schemas.microsoft.com/office/drawing/2014/main" id="{F95CBF96-4249-1541-E44E-FBCECA233B3C}"/>
+                <a16:creationId xmlns:a16="http://schemas.microsoft.com/office/drawing/2014/main" xmlns="" id="{F95CBF96-4249-1541-E44E-FBCECA233B3C}"/>
               </a:ext>
             </a:extLst>
           </p:cNvPr>
@@ -6609,7 +6609,7 @@
           <p:cNvPr id="6" name="Slide Number Placeholder 5">
             <a:extLst>
               <a:ext uri="{FF2B5EF4-FFF2-40B4-BE49-F238E27FC236}">
-                <a16:creationId xmlns="" xmlns:a16="http://schemas.microsoft.com/office/drawing/2014/main" id="{7ACB54F2-814F-F79B-8CD7-FA3133365CBC}"/>
+                <a16:creationId xmlns:a16="http://schemas.microsoft.com/office/drawing/2014/main" xmlns="" id="{7ACB54F2-814F-F79B-8CD7-FA3133365CBC}"/>
               </a:ext>
             </a:extLst>
           </p:cNvPr>
@@ -6637,7 +6637,7 @@
     </p:spTree>
     <p:extLst>
       <p:ext uri="{BB962C8B-B14F-4D97-AF65-F5344CB8AC3E}">
-        <p14:creationId xmlns="" xmlns:p14="http://schemas.microsoft.com/office/powerpoint/2010/main" val="2773863354"/>
+        <p14:creationId xmlns:p14="http://schemas.microsoft.com/office/powerpoint/2010/main" xmlns="" val="2773863354"/>
       </p:ext>
     </p:extLst>
   </p:cSld>
@@ -6669,7 +6669,7 @@
           <p:cNvPr id="8" name="Rectangle Top">
             <a:extLst>
               <a:ext uri="{FF2B5EF4-FFF2-40B4-BE49-F238E27FC236}">
-                <a16:creationId xmlns="" xmlns:a16="http://schemas.microsoft.com/office/drawing/2014/main" id="{454BD9C2-93A6-4860-A758-846ED0E1C8FA}"/>
+                <a16:creationId xmlns:a16="http://schemas.microsoft.com/office/drawing/2014/main" xmlns="" id="{454BD9C2-93A6-4860-A758-846ED0E1C8FA}"/>
               </a:ext>
             </a:extLst>
           </p:cNvPr>
@@ -6750,7 +6750,7 @@
           <p:cNvPr id="7" name="Slide Number">
             <a:extLst>
               <a:ext uri="{FF2B5EF4-FFF2-40B4-BE49-F238E27FC236}">
-                <a16:creationId xmlns="" xmlns:a16="http://schemas.microsoft.com/office/drawing/2014/main" id="{C1780DB1-0AF0-4108-AFE1-9DA99F0DBCB8}"/>
+                <a16:creationId xmlns:a16="http://schemas.microsoft.com/office/drawing/2014/main" xmlns="" id="{C1780DB1-0AF0-4108-AFE1-9DA99F0DBCB8}"/>
               </a:ext>
             </a:extLst>
           </p:cNvPr>
@@ -6792,7 +6792,7 @@
           <p:cNvPr id="3" name="Slide Body Text">
             <a:extLst>
               <a:ext uri="{FF2B5EF4-FFF2-40B4-BE49-F238E27FC236}">
-                <a16:creationId xmlns="" xmlns:a16="http://schemas.microsoft.com/office/drawing/2014/main" id="{5A9D2960-6D42-439F-82E8-812822013A10}"/>
+                <a16:creationId xmlns:a16="http://schemas.microsoft.com/office/drawing/2014/main" xmlns="" id="{5A9D2960-6D42-439F-82E8-812822013A10}"/>
               </a:ext>
             </a:extLst>
           </p:cNvPr>
@@ -6870,7 +6870,7 @@
           <p:cNvPr id="13" name="Rectangle Top">
             <a:extLst>
               <a:ext uri="{FF2B5EF4-FFF2-40B4-BE49-F238E27FC236}">
-                <a16:creationId xmlns="" xmlns:a16="http://schemas.microsoft.com/office/drawing/2014/main" id="{391AFA4E-7870-4561-A1B8-AC956B0C8931}"/>
+                <a16:creationId xmlns:a16="http://schemas.microsoft.com/office/drawing/2014/main" xmlns="" id="{391AFA4E-7870-4561-A1B8-AC956B0C8931}"/>
               </a:ext>
             </a:extLst>
           </p:cNvPr>
@@ -6951,7 +6951,7 @@
           <p:cNvPr id="12" name="Logo Software University" descr="Software University logo">
             <a:extLst>
               <a:ext uri="{FF2B5EF4-FFF2-40B4-BE49-F238E27FC236}">
-                <a16:creationId xmlns="" xmlns:a16="http://schemas.microsoft.com/office/drawing/2014/main" id="{B1D3B425-B9BF-43ED-9DEC-C05002FBA22F}"/>
+                <a16:creationId xmlns:a16="http://schemas.microsoft.com/office/drawing/2014/main" xmlns="" id="{B1D3B425-B9BF-43ED-9DEC-C05002FBA22F}"/>
               </a:ext>
             </a:extLst>
           </p:cNvPr>
@@ -6964,7 +6964,7 @@
           <a:blip r:embed="rId2" cstate="print">
             <a:extLst>
               <a:ext uri="{28A0092B-C50C-407E-A947-70E740481C1C}">
-                <a14:useLocalDpi xmlns="" xmlns:a14="http://schemas.microsoft.com/office/drawing/2010/main" val="0"/>
+                <a14:useLocalDpi xmlns:a14="http://schemas.microsoft.com/office/drawing/2010/main" xmlns="" val="0"/>
               </a:ext>
             </a:extLst>
           </a:blip>
@@ -6987,7 +6987,7 @@
           <p:cNvPr id="6" name="Slide Title">
             <a:extLst>
               <a:ext uri="{FF2B5EF4-FFF2-40B4-BE49-F238E27FC236}">
-                <a16:creationId xmlns="" xmlns:a16="http://schemas.microsoft.com/office/drawing/2014/main" id="{19B5B676-7892-440F-8191-7109B2C59885}"/>
+                <a16:creationId xmlns:a16="http://schemas.microsoft.com/office/drawing/2014/main" xmlns="" id="{19B5B676-7892-440F-8191-7109B2C59885}"/>
               </a:ext>
             </a:extLst>
           </p:cNvPr>
@@ -7026,7 +7026,7 @@
     </p:spTree>
     <p:extLst>
       <p:ext uri="{BB962C8B-B14F-4D97-AF65-F5344CB8AC3E}">
-        <p14:creationId xmlns="" xmlns:p14="http://schemas.microsoft.com/office/powerpoint/2010/main" val="2685365194"/>
+        <p14:creationId xmlns:p14="http://schemas.microsoft.com/office/powerpoint/2010/main" xmlns="" val="2685365194"/>
       </p:ext>
     </p:extLst>
   </p:cSld>
@@ -7034,7 +7034,7 @@
     <a:masterClrMapping/>
   </p:clrMapOvr>
   <mc:AlternateContent xmlns:mc="http://schemas.openxmlformats.org/markup-compatibility/2006">
-    <mc:Choice xmlns="" xmlns:p14="http://schemas.microsoft.com/office/powerpoint/2010/main" Requires="p14">
+    <mc:Choice xmlns:p14="http://schemas.microsoft.com/office/powerpoint/2010/main" xmlns="" Requires="p14">
       <p:transition spd="slow" p14:dur="2000" advClick="0" advTm="5000"/>
     </mc:Choice>
     <mc:Fallback>
@@ -8084,7 +8084,7 @@
             <a:fld id="{1D8BD707-D9CF-40AE-B4C6-C98DA3205C09}" type="datetimeFigureOut">
               <a:rPr lang="en-US"/>
               <a:pPr/>
-              <a:t>8/26/2023</a:t>
+              <a:t>8/30/2023</a:t>
             </a:fld>
             <a:endParaRPr lang="en-US" dirty="0"/>
           </a:p>
@@ -8144,7 +8144,7 @@
     </p:spTree>
     <p:extLst>
       <p:ext uri="{BB962C8B-B14F-4D97-AF65-F5344CB8AC3E}">
-        <p14:creationId xmlns="" xmlns:p14="http://schemas.microsoft.com/office/powerpoint/2010/main" val="2531485629"/>
+        <p14:creationId xmlns:p14="http://schemas.microsoft.com/office/powerpoint/2010/main" xmlns="" val="2531485629"/>
       </p:ext>
     </p:extLst>
   </p:cSld>
@@ -8340,7 +8340,7 @@
     </p:spTree>
     <p:extLst>
       <p:ext uri="{BB962C8B-B14F-4D97-AF65-F5344CB8AC3E}">
-        <p14:creationId xmlns="" xmlns:p14="http://schemas.microsoft.com/office/powerpoint/2010/main" val="3529216409"/>
+        <p14:creationId xmlns:p14="http://schemas.microsoft.com/office/powerpoint/2010/main" xmlns="" val="3529216409"/>
       </p:ext>
     </p:extLst>
   </p:cSld>
@@ -8348,7 +8348,7 @@
     <a:masterClrMapping/>
   </p:clrMapOvr>
   <mc:AlternateContent xmlns:mc="http://schemas.openxmlformats.org/markup-compatibility/2006">
-    <mc:Choice xmlns="" xmlns:p14="http://schemas.microsoft.com/office/powerpoint/2010/main" Requires="p14">
+    <mc:Choice xmlns:p14="http://schemas.microsoft.com/office/powerpoint/2010/main" xmlns="" Requires="p14">
       <p:transition spd="slow" p14:dur="2000" advClick="0" advTm="5000"/>
     </mc:Choice>
     <mc:Fallback>
@@ -8380,7 +8380,7 @@
           <p:cNvPr id="7" name="Slide Number">
             <a:extLst>
               <a:ext uri="{FF2B5EF4-FFF2-40B4-BE49-F238E27FC236}">
-                <a16:creationId xmlns="" xmlns:a16="http://schemas.microsoft.com/office/drawing/2014/main" id="{C1780DB1-0AF0-4108-AFE1-9DA99F0DBCB8}"/>
+                <a16:creationId xmlns:a16="http://schemas.microsoft.com/office/drawing/2014/main" xmlns="" id="{C1780DB1-0AF0-4108-AFE1-9DA99F0DBCB8}"/>
               </a:ext>
             </a:extLst>
           </p:cNvPr>
@@ -8422,7 +8422,7 @@
           <p:cNvPr id="3" name="Slide Body Text">
             <a:extLst>
               <a:ext uri="{FF2B5EF4-FFF2-40B4-BE49-F238E27FC236}">
-                <a16:creationId xmlns="" xmlns:a16="http://schemas.microsoft.com/office/drawing/2014/main" id="{5A9D2960-6D42-439F-82E8-812822013A10}"/>
+                <a16:creationId xmlns:a16="http://schemas.microsoft.com/office/drawing/2014/main" xmlns="" id="{5A9D2960-6D42-439F-82E8-812822013A10}"/>
               </a:ext>
             </a:extLst>
           </p:cNvPr>
@@ -8500,7 +8500,7 @@
           <p:cNvPr id="13" name="Rectangle Top">
             <a:extLst>
               <a:ext uri="{FF2B5EF4-FFF2-40B4-BE49-F238E27FC236}">
-                <a16:creationId xmlns="" xmlns:a16="http://schemas.microsoft.com/office/drawing/2014/main" id="{391AFA4E-7870-4561-A1B8-AC956B0C8931}"/>
+                <a16:creationId xmlns:a16="http://schemas.microsoft.com/office/drawing/2014/main" xmlns="" id="{391AFA4E-7870-4561-A1B8-AC956B0C8931}"/>
               </a:ext>
             </a:extLst>
           </p:cNvPr>
@@ -8581,7 +8581,7 @@
           <p:cNvPr id="12" name="Logo Software University" descr="Software University logo">
             <a:extLst>
               <a:ext uri="{FF2B5EF4-FFF2-40B4-BE49-F238E27FC236}">
-                <a16:creationId xmlns="" xmlns:a16="http://schemas.microsoft.com/office/drawing/2014/main" id="{B1D3B425-B9BF-43ED-9DEC-C05002FBA22F}"/>
+                <a16:creationId xmlns:a16="http://schemas.microsoft.com/office/drawing/2014/main" xmlns="" id="{B1D3B425-B9BF-43ED-9DEC-C05002FBA22F}"/>
               </a:ext>
             </a:extLst>
           </p:cNvPr>
@@ -8594,7 +8594,7 @@
           <a:blip r:embed="rId2" cstate="print">
             <a:extLst>
               <a:ext uri="{28A0092B-C50C-407E-A947-70E740481C1C}">
-                <a14:useLocalDpi xmlns="" xmlns:a14="http://schemas.microsoft.com/office/drawing/2010/main" val="0"/>
+                <a14:useLocalDpi xmlns:a14="http://schemas.microsoft.com/office/drawing/2010/main" xmlns="" val="0"/>
               </a:ext>
             </a:extLst>
           </a:blip>
@@ -8617,7 +8617,7 @@
           <p:cNvPr id="6" name="Slide Title">
             <a:extLst>
               <a:ext uri="{FF2B5EF4-FFF2-40B4-BE49-F238E27FC236}">
-                <a16:creationId xmlns="" xmlns:a16="http://schemas.microsoft.com/office/drawing/2014/main" id="{19B5B676-7892-440F-8191-7109B2C59885}"/>
+                <a16:creationId xmlns:a16="http://schemas.microsoft.com/office/drawing/2014/main" xmlns="" id="{19B5B676-7892-440F-8191-7109B2C59885}"/>
               </a:ext>
             </a:extLst>
           </p:cNvPr>
@@ -8656,7 +8656,7 @@
     </p:spTree>
     <p:extLst>
       <p:ext uri="{BB962C8B-B14F-4D97-AF65-F5344CB8AC3E}">
-        <p14:creationId xmlns="" xmlns:p14="http://schemas.microsoft.com/office/powerpoint/2010/main" val="1102970716"/>
+        <p14:creationId xmlns:p14="http://schemas.microsoft.com/office/powerpoint/2010/main" xmlns="" val="1102970716"/>
       </p:ext>
     </p:extLst>
   </p:cSld>
@@ -8664,7 +8664,7 @@
     <a:masterClrMapping/>
   </p:clrMapOvr>
   <mc:AlternateContent xmlns:mc="http://schemas.openxmlformats.org/markup-compatibility/2006">
-    <mc:Choice xmlns="" xmlns:p14="http://schemas.microsoft.com/office/powerpoint/2010/main" Requires="p14">
+    <mc:Choice xmlns:p14="http://schemas.microsoft.com/office/powerpoint/2010/main" xmlns="" Requires="p14">
       <p:transition spd="slow" p14:dur="2000" advClick="0" advTm="5000"/>
     </mc:Choice>
     <mc:Fallback>
@@ -8696,7 +8696,7 @@
           <p:cNvPr id="9" name="Slide Number">
             <a:extLst>
               <a:ext uri="{FF2B5EF4-FFF2-40B4-BE49-F238E27FC236}">
-                <a16:creationId xmlns="" xmlns:a16="http://schemas.microsoft.com/office/drawing/2014/main" id="{0020EB61-2079-41A3-B356-B1D8D48D786E}"/>
+                <a16:creationId xmlns:a16="http://schemas.microsoft.com/office/drawing/2014/main" xmlns="" id="{0020EB61-2079-41A3-B356-B1D8D48D786E}"/>
               </a:ext>
             </a:extLst>
           </p:cNvPr>
@@ -8813,7 +8813,7 @@
           <p:cNvPr id="7" name="Slide Body Text">
             <a:extLst>
               <a:ext uri="{FF2B5EF4-FFF2-40B4-BE49-F238E27FC236}">
-                <a16:creationId xmlns="" xmlns:a16="http://schemas.microsoft.com/office/drawing/2014/main" id="{CB4CB13C-66A1-466B-A6C1-B0BABF5CFEC1}"/>
+                <a16:creationId xmlns:a16="http://schemas.microsoft.com/office/drawing/2014/main" xmlns="" id="{CB4CB13C-66A1-466B-A6C1-B0BABF5CFEC1}"/>
               </a:ext>
             </a:extLst>
           </p:cNvPr>
@@ -8911,7 +8911,7 @@
           <p:cNvPr id="3" name="Logo Software University" descr="Software University logo">
             <a:extLst>
               <a:ext uri="{FF2B5EF4-FFF2-40B4-BE49-F238E27FC236}">
-                <a16:creationId xmlns="" xmlns:a16="http://schemas.microsoft.com/office/drawing/2014/main" id="{5573C101-930B-47AC-967A-A64513DFFDEE}"/>
+                <a16:creationId xmlns:a16="http://schemas.microsoft.com/office/drawing/2014/main" xmlns="" id="{5573C101-930B-47AC-967A-A64513DFFDEE}"/>
               </a:ext>
             </a:extLst>
           </p:cNvPr>
@@ -8934,7 +8934,7 @@
             </a:clrChange>
             <a:extLst>
               <a:ext uri="{28A0092B-C50C-407E-A947-70E740481C1C}">
-                <a14:useLocalDpi xmlns="" xmlns:a14="http://schemas.microsoft.com/office/drawing/2010/main" val="0"/>
+                <a14:useLocalDpi xmlns:a14="http://schemas.microsoft.com/office/drawing/2010/main" xmlns="" val="0"/>
               </a:ext>
             </a:extLst>
           </a:blip>
@@ -8957,7 +8957,7 @@
           <p:cNvPr id="8" name="Slide Title">
             <a:extLst>
               <a:ext uri="{FF2B5EF4-FFF2-40B4-BE49-F238E27FC236}">
-                <a16:creationId xmlns="" xmlns:a16="http://schemas.microsoft.com/office/drawing/2014/main" id="{E2DA9691-CDF5-499C-94BB-AAA61DAC1BFB}"/>
+                <a16:creationId xmlns:a16="http://schemas.microsoft.com/office/drawing/2014/main" xmlns="" id="{E2DA9691-CDF5-499C-94BB-AAA61DAC1BFB}"/>
               </a:ext>
             </a:extLst>
           </p:cNvPr>
@@ -8994,7 +8994,7 @@
           <p:cNvPr id="10" name="Group 9">
             <a:extLst>
               <a:ext uri="{FF2B5EF4-FFF2-40B4-BE49-F238E27FC236}">
-                <a16:creationId xmlns="" xmlns:a16="http://schemas.microsoft.com/office/drawing/2014/main" id="{43CDBCC2-1C96-44BC-B992-7B0C49C34904}"/>
+                <a16:creationId xmlns:a16="http://schemas.microsoft.com/office/drawing/2014/main" xmlns="" id="{43CDBCC2-1C96-44BC-B992-7B0C49C34904}"/>
               </a:ext>
             </a:extLst>
           </p:cNvPr>
@@ -9014,7 +9014,7 @@
             <p:cNvPr id="11" name="Group 10">
               <a:extLst>
                 <a:ext uri="{FF2B5EF4-FFF2-40B4-BE49-F238E27FC236}">
-                  <a16:creationId xmlns="" xmlns:a16="http://schemas.microsoft.com/office/drawing/2014/main" id="{7D71B3A8-4D39-42CF-9255-81EA3A622DD6}"/>
+                  <a16:creationId xmlns:a16="http://schemas.microsoft.com/office/drawing/2014/main" xmlns="" id="{7D71B3A8-4D39-42CF-9255-81EA3A622DD6}"/>
                 </a:ext>
               </a:extLst>
             </p:cNvPr>
@@ -9034,7 +9034,7 @@
               <p:cNvPr id="25" name="Oval 24">
                 <a:extLst>
                   <a:ext uri="{FF2B5EF4-FFF2-40B4-BE49-F238E27FC236}">
-                    <a16:creationId xmlns="" xmlns:a16="http://schemas.microsoft.com/office/drawing/2014/main" id="{B98059F9-1874-426D-8AF7-A12C21F37DD9}"/>
+                    <a16:creationId xmlns:a16="http://schemas.microsoft.com/office/drawing/2014/main" xmlns="" id="{B98059F9-1874-426D-8AF7-A12C21F37DD9}"/>
                   </a:ext>
                 </a:extLst>
               </p:cNvPr>
@@ -9086,7 +9086,7 @@
               <p:cNvPr id="26" name="Rectangle 5">
                 <a:extLst>
                   <a:ext uri="{FF2B5EF4-FFF2-40B4-BE49-F238E27FC236}">
-                    <a16:creationId xmlns="" xmlns:a16="http://schemas.microsoft.com/office/drawing/2014/main" id="{A3A1E077-DBDF-48F0-A924-604984B940A2}"/>
+                    <a16:creationId xmlns:a16="http://schemas.microsoft.com/office/drawing/2014/main" xmlns="" id="{A3A1E077-DBDF-48F0-A924-604984B940A2}"/>
                   </a:ext>
                 </a:extLst>
               </p:cNvPr>
@@ -9231,7 +9231,7 @@
               <p:cNvPr id="27" name="Rectangle 5">
                 <a:extLst>
                   <a:ext uri="{FF2B5EF4-FFF2-40B4-BE49-F238E27FC236}">
-                    <a16:creationId xmlns="" xmlns:a16="http://schemas.microsoft.com/office/drawing/2014/main" id="{798B1F51-1FA4-4199-81C7-62356C936CC9}"/>
+                    <a16:creationId xmlns:a16="http://schemas.microsoft.com/office/drawing/2014/main" xmlns="" id="{798B1F51-1FA4-4199-81C7-62356C936CC9}"/>
                   </a:ext>
                 </a:extLst>
               </p:cNvPr>
@@ -9376,7 +9376,7 @@
               <p:cNvPr id="28" name="Arc 27">
                 <a:extLst>
                   <a:ext uri="{FF2B5EF4-FFF2-40B4-BE49-F238E27FC236}">
-                    <a16:creationId xmlns="" xmlns:a16="http://schemas.microsoft.com/office/drawing/2014/main" id="{40A224C8-1233-40F7-96AB-BFF79AF6CDCB}"/>
+                    <a16:creationId xmlns:a16="http://schemas.microsoft.com/office/drawing/2014/main" xmlns="" id="{40A224C8-1233-40F7-96AB-BFF79AF6CDCB}"/>
                   </a:ext>
                 </a:extLst>
               </p:cNvPr>
@@ -9435,7 +9435,7 @@
               <p:cNvPr id="29" name="Arc 28">
                 <a:extLst>
                   <a:ext uri="{FF2B5EF4-FFF2-40B4-BE49-F238E27FC236}">
-                    <a16:creationId xmlns="" xmlns:a16="http://schemas.microsoft.com/office/drawing/2014/main" id="{B57C7CCC-E218-4321-8C7B-3F0C5753C7A1}"/>
+                    <a16:creationId xmlns:a16="http://schemas.microsoft.com/office/drawing/2014/main" xmlns="" id="{B57C7CCC-E218-4321-8C7B-3F0C5753C7A1}"/>
                   </a:ext>
                 </a:extLst>
               </p:cNvPr>
@@ -9495,7 +9495,7 @@
             <p:cNvPr id="13" name="Rectangle: Rounded Corners 12">
               <a:extLst>
                 <a:ext uri="{FF2B5EF4-FFF2-40B4-BE49-F238E27FC236}">
-                  <a16:creationId xmlns="" xmlns:a16="http://schemas.microsoft.com/office/drawing/2014/main" id="{6AF309CA-A56C-4ABC-B293-420F4EB1A9B4}"/>
+                  <a16:creationId xmlns:a16="http://schemas.microsoft.com/office/drawing/2014/main" xmlns="" id="{6AF309CA-A56C-4ABC-B293-420F4EB1A9B4}"/>
                 </a:ext>
               </a:extLst>
             </p:cNvPr>
@@ -9549,7 +9549,7 @@
             <p:cNvPr id="14" name="Rectangle: Rounded Corners 13">
               <a:extLst>
                 <a:ext uri="{FF2B5EF4-FFF2-40B4-BE49-F238E27FC236}">
-                  <a16:creationId xmlns="" xmlns:a16="http://schemas.microsoft.com/office/drawing/2014/main" id="{07955808-2AC7-44EB-8B6D-82B974E53A3C}"/>
+                  <a16:creationId xmlns:a16="http://schemas.microsoft.com/office/drawing/2014/main" xmlns="" id="{07955808-2AC7-44EB-8B6D-82B974E53A3C}"/>
                 </a:ext>
               </a:extLst>
             </p:cNvPr>
@@ -9610,7 +9610,7 @@
             <p:cNvPr id="15" name="Straight Connector 14">
               <a:extLst>
                 <a:ext uri="{FF2B5EF4-FFF2-40B4-BE49-F238E27FC236}">
-                  <a16:creationId xmlns="" xmlns:a16="http://schemas.microsoft.com/office/drawing/2014/main" id="{AC6420D7-AEAB-45EF-8D46-11EB06E4AFEA}"/>
+                  <a16:creationId xmlns:a16="http://schemas.microsoft.com/office/drawing/2014/main" xmlns="" id="{AC6420D7-AEAB-45EF-8D46-11EB06E4AFEA}"/>
                 </a:ext>
               </a:extLst>
             </p:cNvPr>
@@ -9656,7 +9656,7 @@
             <p:cNvPr id="16" name="Straight Connector 15">
               <a:extLst>
                 <a:ext uri="{FF2B5EF4-FFF2-40B4-BE49-F238E27FC236}">
-                  <a16:creationId xmlns="" xmlns:a16="http://schemas.microsoft.com/office/drawing/2014/main" id="{76C7FABC-6773-44F6-990B-3EB082BE9B35}"/>
+                  <a16:creationId xmlns:a16="http://schemas.microsoft.com/office/drawing/2014/main" xmlns="" id="{76C7FABC-6773-44F6-990B-3EB082BE9B35}"/>
                 </a:ext>
               </a:extLst>
             </p:cNvPr>
@@ -9702,7 +9702,7 @@
             <p:cNvPr id="17" name="Group 16">
               <a:extLst>
                 <a:ext uri="{FF2B5EF4-FFF2-40B4-BE49-F238E27FC236}">
-                  <a16:creationId xmlns="" xmlns:a16="http://schemas.microsoft.com/office/drawing/2014/main" id="{1FAD48E1-DC45-4B3D-9CE5-613250708496}"/>
+                  <a16:creationId xmlns:a16="http://schemas.microsoft.com/office/drawing/2014/main" xmlns="" id="{1FAD48E1-DC45-4B3D-9CE5-613250708496}"/>
                 </a:ext>
               </a:extLst>
             </p:cNvPr>
@@ -9725,7 +9725,7 @@
               <p:cNvPr id="23" name="Straight Connector 22">
                 <a:extLst>
                   <a:ext uri="{FF2B5EF4-FFF2-40B4-BE49-F238E27FC236}">
-                    <a16:creationId xmlns="" xmlns:a16="http://schemas.microsoft.com/office/drawing/2014/main" id="{B01FD1D1-046F-457B-AB63-2702CE3E906E}"/>
+                    <a16:creationId xmlns:a16="http://schemas.microsoft.com/office/drawing/2014/main" xmlns="" id="{B01FD1D1-046F-457B-AB63-2702CE3E906E}"/>
                   </a:ext>
                 </a:extLst>
               </p:cNvPr>
@@ -9769,7 +9769,7 @@
               <p:cNvPr id="24" name="Straight Connector 23">
                 <a:extLst>
                   <a:ext uri="{FF2B5EF4-FFF2-40B4-BE49-F238E27FC236}">
-                    <a16:creationId xmlns="" xmlns:a16="http://schemas.microsoft.com/office/drawing/2014/main" id="{895660C3-C72C-43EE-9C4A-170F85E5BE08}"/>
+                    <a16:creationId xmlns:a16="http://schemas.microsoft.com/office/drawing/2014/main" xmlns="" id="{895660C3-C72C-43EE-9C4A-170F85E5BE08}"/>
                   </a:ext>
                 </a:extLst>
               </p:cNvPr>
@@ -9814,7 +9814,7 @@
             <p:cNvPr id="19" name="Straight Connector 18">
               <a:extLst>
                 <a:ext uri="{FF2B5EF4-FFF2-40B4-BE49-F238E27FC236}">
-                  <a16:creationId xmlns="" xmlns:a16="http://schemas.microsoft.com/office/drawing/2014/main" id="{A74EE503-8FC0-42A6-8860-CA4EE42272E4}"/>
+                  <a16:creationId xmlns:a16="http://schemas.microsoft.com/office/drawing/2014/main" xmlns="" id="{A74EE503-8FC0-42A6-8860-CA4EE42272E4}"/>
                 </a:ext>
               </a:extLst>
             </p:cNvPr>
@@ -9860,7 +9860,7 @@
             <p:cNvPr id="12" name="Rectangle: Rounded Corners 11">
               <a:extLst>
                 <a:ext uri="{FF2B5EF4-FFF2-40B4-BE49-F238E27FC236}">
-                  <a16:creationId xmlns="" xmlns:a16="http://schemas.microsoft.com/office/drawing/2014/main" id="{F4189FDA-9FE8-490B-8A70-2E941811021F}"/>
+                  <a16:creationId xmlns:a16="http://schemas.microsoft.com/office/drawing/2014/main" xmlns="" id="{F4189FDA-9FE8-490B-8A70-2E941811021F}"/>
                 </a:ext>
               </a:extLst>
             </p:cNvPr>
@@ -9914,7 +9914,7 @@
             <p:cNvPr id="18" name="Group 17">
               <a:extLst>
                 <a:ext uri="{FF2B5EF4-FFF2-40B4-BE49-F238E27FC236}">
-                  <a16:creationId xmlns="" xmlns:a16="http://schemas.microsoft.com/office/drawing/2014/main" id="{FDA3EFCD-0DF8-419D-8533-D781521E597E}"/>
+                  <a16:creationId xmlns:a16="http://schemas.microsoft.com/office/drawing/2014/main" xmlns="" id="{FDA3EFCD-0DF8-419D-8533-D781521E597E}"/>
                 </a:ext>
               </a:extLst>
             </p:cNvPr>
@@ -9937,7 +9937,7 @@
               <p:cNvPr id="21" name="Straight Connector 20">
                 <a:extLst>
                   <a:ext uri="{FF2B5EF4-FFF2-40B4-BE49-F238E27FC236}">
-                    <a16:creationId xmlns="" xmlns:a16="http://schemas.microsoft.com/office/drawing/2014/main" id="{C3CC6A5A-182E-4A09-9C04-EB191881D789}"/>
+                    <a16:creationId xmlns:a16="http://schemas.microsoft.com/office/drawing/2014/main" xmlns="" id="{C3CC6A5A-182E-4A09-9C04-EB191881D789}"/>
                   </a:ext>
                 </a:extLst>
               </p:cNvPr>
@@ -9981,7 +9981,7 @@
               <p:cNvPr id="22" name="Straight Connector 21">
                 <a:extLst>
                   <a:ext uri="{FF2B5EF4-FFF2-40B4-BE49-F238E27FC236}">
-                    <a16:creationId xmlns="" xmlns:a16="http://schemas.microsoft.com/office/drawing/2014/main" id="{440C8953-0555-48CC-8255-78F17E053EE7}"/>
+                    <a16:creationId xmlns:a16="http://schemas.microsoft.com/office/drawing/2014/main" xmlns="" id="{440C8953-0555-48CC-8255-78F17E053EE7}"/>
                   </a:ext>
                 </a:extLst>
               </p:cNvPr>
@@ -10027,7 +10027,7 @@
           <p:cNvPr id="34" name="Straight Connector 33">
             <a:extLst>
               <a:ext uri="{FF2B5EF4-FFF2-40B4-BE49-F238E27FC236}">
-                <a16:creationId xmlns="" xmlns:a16="http://schemas.microsoft.com/office/drawing/2014/main" id="{29B538CA-8CCB-43FB-B5E5-5FC04EBC1F54}"/>
+                <a16:creationId xmlns:a16="http://schemas.microsoft.com/office/drawing/2014/main" xmlns="" id="{29B538CA-8CCB-43FB-B5E5-5FC04EBC1F54}"/>
               </a:ext>
             </a:extLst>
           </p:cNvPr>
@@ -10072,7 +10072,7 @@
     </p:spTree>
     <p:extLst>
       <p:ext uri="{BB962C8B-B14F-4D97-AF65-F5344CB8AC3E}">
-        <p14:creationId xmlns="" xmlns:p14="http://schemas.microsoft.com/office/powerpoint/2010/main" val="743545348"/>
+        <p14:creationId xmlns:p14="http://schemas.microsoft.com/office/powerpoint/2010/main" xmlns="" val="743545348"/>
       </p:ext>
     </p:extLst>
   </p:cSld>
@@ -10080,7 +10080,7 @@
     <a:masterClrMapping/>
   </p:clrMapOvr>
   <mc:AlternateContent xmlns:mc="http://schemas.openxmlformats.org/markup-compatibility/2006">
-    <mc:Choice xmlns="" xmlns:p14="http://schemas.microsoft.com/office/powerpoint/2010/main" Requires="p14">
+    <mc:Choice xmlns:p14="http://schemas.microsoft.com/office/powerpoint/2010/main" xmlns="" Requires="p14">
       <p:transition spd="slow" p14:dur="2000" advClick="0" advTm="5000"/>
     </mc:Choice>
     <mc:Fallback>
@@ -10112,7 +10112,7 @@
           <p:cNvPr id="9" name="Slide Number">
             <a:extLst>
               <a:ext uri="{FF2B5EF4-FFF2-40B4-BE49-F238E27FC236}">
-                <a16:creationId xmlns="" xmlns:a16="http://schemas.microsoft.com/office/drawing/2014/main" id="{1865BF6B-7F07-4E9C-879F-80E36EEB3405}"/>
+                <a16:creationId xmlns:a16="http://schemas.microsoft.com/office/drawing/2014/main" xmlns="" id="{1865BF6B-7F07-4E9C-879F-80E36EEB3405}"/>
               </a:ext>
             </a:extLst>
           </p:cNvPr>
@@ -10154,7 +10154,7 @@
           <p:cNvPr id="12" name="Rectangle Left">
             <a:extLst>
               <a:ext uri="{FF2B5EF4-FFF2-40B4-BE49-F238E27FC236}">
-                <a16:creationId xmlns="" xmlns:a16="http://schemas.microsoft.com/office/drawing/2014/main" id="{345FB1C8-7F66-4D5C-ACCE-AE919936BCFD}"/>
+                <a16:creationId xmlns:a16="http://schemas.microsoft.com/office/drawing/2014/main" xmlns="" id="{345FB1C8-7F66-4D5C-ACCE-AE919936BCFD}"/>
               </a:ext>
             </a:extLst>
           </p:cNvPr>
@@ -10235,7 +10235,7 @@
           <p:cNvPr id="15" name="Slide Body Text">
             <a:extLst>
               <a:ext uri="{FF2B5EF4-FFF2-40B4-BE49-F238E27FC236}">
-                <a16:creationId xmlns="" xmlns:a16="http://schemas.microsoft.com/office/drawing/2014/main" id="{6157C8DE-E0AF-422B-BBB1-F0AF1264B5E9}"/>
+                <a16:creationId xmlns:a16="http://schemas.microsoft.com/office/drawing/2014/main" xmlns="" id="{6157C8DE-E0AF-422B-BBB1-F0AF1264B5E9}"/>
               </a:ext>
             </a:extLst>
           </p:cNvPr>
@@ -10333,7 +10333,7 @@
           <p:cNvPr id="16" name="Logo Software University" descr="Software University logo">
             <a:extLst>
               <a:ext uri="{FF2B5EF4-FFF2-40B4-BE49-F238E27FC236}">
-                <a16:creationId xmlns="" xmlns:a16="http://schemas.microsoft.com/office/drawing/2014/main" id="{EFEBB553-EACE-4B4F-8B4F-7629FDD910A4}"/>
+                <a16:creationId xmlns:a16="http://schemas.microsoft.com/office/drawing/2014/main" xmlns="" id="{EFEBB553-EACE-4B4F-8B4F-7629FDD910A4}"/>
               </a:ext>
             </a:extLst>
           </p:cNvPr>
@@ -10356,7 +10356,7 @@
             </a:clrChange>
             <a:extLst>
               <a:ext uri="{28A0092B-C50C-407E-A947-70E740481C1C}">
-                <a14:useLocalDpi xmlns="" xmlns:a14="http://schemas.microsoft.com/office/drawing/2010/main" val="0"/>
+                <a14:useLocalDpi xmlns:a14="http://schemas.microsoft.com/office/drawing/2010/main" xmlns="" val="0"/>
               </a:ext>
             </a:extLst>
           </a:blip>
@@ -10379,7 +10379,7 @@
           <p:cNvPr id="13" name="Slide Title">
             <a:extLst>
               <a:ext uri="{FF2B5EF4-FFF2-40B4-BE49-F238E27FC236}">
-                <a16:creationId xmlns="" xmlns:a16="http://schemas.microsoft.com/office/drawing/2014/main" id="{0D5CC956-5C4A-44BE-8F8B-327FAFA51E97}"/>
+                <a16:creationId xmlns:a16="http://schemas.microsoft.com/office/drawing/2014/main" xmlns="" id="{0D5CC956-5C4A-44BE-8F8B-327FAFA51E97}"/>
               </a:ext>
             </a:extLst>
           </p:cNvPr>
@@ -10416,7 +10416,7 @@
           <p:cNvPr id="33" name="Group 32">
             <a:extLst>
               <a:ext uri="{FF2B5EF4-FFF2-40B4-BE49-F238E27FC236}">
-                <a16:creationId xmlns="" xmlns:a16="http://schemas.microsoft.com/office/drawing/2014/main" id="{7CF60135-47AA-48F0-96BA-0E795668ABDB}"/>
+                <a16:creationId xmlns:a16="http://schemas.microsoft.com/office/drawing/2014/main" xmlns="" id="{7CF60135-47AA-48F0-96BA-0E795668ABDB}"/>
               </a:ext>
             </a:extLst>
           </p:cNvPr>
@@ -10436,7 +10436,7 @@
             <p:cNvPr id="34" name="Group 33">
               <a:extLst>
                 <a:ext uri="{FF2B5EF4-FFF2-40B4-BE49-F238E27FC236}">
-                  <a16:creationId xmlns="" xmlns:a16="http://schemas.microsoft.com/office/drawing/2014/main" id="{2823380E-3936-41AF-BDF7-DA54D75BBF6B}"/>
+                  <a16:creationId xmlns:a16="http://schemas.microsoft.com/office/drawing/2014/main" xmlns="" id="{2823380E-3936-41AF-BDF7-DA54D75BBF6B}"/>
                 </a:ext>
               </a:extLst>
             </p:cNvPr>
@@ -10456,7 +10456,7 @@
               <p:cNvPr id="47" name="Oval 46">
                 <a:extLst>
                   <a:ext uri="{FF2B5EF4-FFF2-40B4-BE49-F238E27FC236}">
-                    <a16:creationId xmlns="" xmlns:a16="http://schemas.microsoft.com/office/drawing/2014/main" id="{52B047D9-D8DD-45C7-9BC8-6D4F682F5182}"/>
+                    <a16:creationId xmlns:a16="http://schemas.microsoft.com/office/drawing/2014/main" xmlns="" id="{52B047D9-D8DD-45C7-9BC8-6D4F682F5182}"/>
                   </a:ext>
                 </a:extLst>
               </p:cNvPr>
@@ -10508,7 +10508,7 @@
               <p:cNvPr id="48" name="Rectangle 5">
                 <a:extLst>
                   <a:ext uri="{FF2B5EF4-FFF2-40B4-BE49-F238E27FC236}">
-                    <a16:creationId xmlns="" xmlns:a16="http://schemas.microsoft.com/office/drawing/2014/main" id="{4D84FE51-BD8E-47EA-9463-CE02FEA31766}"/>
+                    <a16:creationId xmlns:a16="http://schemas.microsoft.com/office/drawing/2014/main" xmlns="" id="{4D84FE51-BD8E-47EA-9463-CE02FEA31766}"/>
                   </a:ext>
                 </a:extLst>
               </p:cNvPr>
@@ -10653,7 +10653,7 @@
               <p:cNvPr id="49" name="Rectangle 5">
                 <a:extLst>
                   <a:ext uri="{FF2B5EF4-FFF2-40B4-BE49-F238E27FC236}">
-                    <a16:creationId xmlns="" xmlns:a16="http://schemas.microsoft.com/office/drawing/2014/main" id="{F5C8F037-C197-4219-AC87-3A81763512BC}"/>
+                    <a16:creationId xmlns:a16="http://schemas.microsoft.com/office/drawing/2014/main" xmlns="" id="{F5C8F037-C197-4219-AC87-3A81763512BC}"/>
                   </a:ext>
                 </a:extLst>
               </p:cNvPr>
@@ -10798,7 +10798,7 @@
               <p:cNvPr id="50" name="Arc 49">
                 <a:extLst>
                   <a:ext uri="{FF2B5EF4-FFF2-40B4-BE49-F238E27FC236}">
-                    <a16:creationId xmlns="" xmlns:a16="http://schemas.microsoft.com/office/drawing/2014/main" id="{786EE401-CF8E-439B-94A0-EE6F3A7D5798}"/>
+                    <a16:creationId xmlns:a16="http://schemas.microsoft.com/office/drawing/2014/main" xmlns="" id="{786EE401-CF8E-439B-94A0-EE6F3A7D5798}"/>
                   </a:ext>
                 </a:extLst>
               </p:cNvPr>
@@ -10857,7 +10857,7 @@
               <p:cNvPr id="51" name="Arc 50">
                 <a:extLst>
                   <a:ext uri="{FF2B5EF4-FFF2-40B4-BE49-F238E27FC236}">
-                    <a16:creationId xmlns="" xmlns:a16="http://schemas.microsoft.com/office/drawing/2014/main" id="{8D9ACD38-B3EB-4A63-9730-CBF0501BF235}"/>
+                    <a16:creationId xmlns:a16="http://schemas.microsoft.com/office/drawing/2014/main" xmlns="" id="{8D9ACD38-B3EB-4A63-9730-CBF0501BF235}"/>
                   </a:ext>
                 </a:extLst>
               </p:cNvPr>
@@ -10917,7 +10917,7 @@
             <p:cNvPr id="35" name="Rectangle: Rounded Corners 34">
               <a:extLst>
                 <a:ext uri="{FF2B5EF4-FFF2-40B4-BE49-F238E27FC236}">
-                  <a16:creationId xmlns="" xmlns:a16="http://schemas.microsoft.com/office/drawing/2014/main" id="{64EE493E-A353-4C75-A3B9-D48ABA2C57CC}"/>
+                  <a16:creationId xmlns:a16="http://schemas.microsoft.com/office/drawing/2014/main" xmlns="" id="{64EE493E-A353-4C75-A3B9-D48ABA2C57CC}"/>
                 </a:ext>
               </a:extLst>
             </p:cNvPr>
@@ -10971,7 +10971,7 @@
             <p:cNvPr id="36" name="Rectangle: Rounded Corners 35">
               <a:extLst>
                 <a:ext uri="{FF2B5EF4-FFF2-40B4-BE49-F238E27FC236}">
-                  <a16:creationId xmlns="" xmlns:a16="http://schemas.microsoft.com/office/drawing/2014/main" id="{718408B9-204E-42E3-9E79-33E047E869BC}"/>
+                  <a16:creationId xmlns:a16="http://schemas.microsoft.com/office/drawing/2014/main" xmlns="" id="{718408B9-204E-42E3-9E79-33E047E869BC}"/>
                 </a:ext>
               </a:extLst>
             </p:cNvPr>
@@ -11032,7 +11032,7 @@
             <p:cNvPr id="37" name="Straight Connector 36">
               <a:extLst>
                 <a:ext uri="{FF2B5EF4-FFF2-40B4-BE49-F238E27FC236}">
-                  <a16:creationId xmlns="" xmlns:a16="http://schemas.microsoft.com/office/drawing/2014/main" id="{0AB66D97-DF6F-4CD2-AF13-42B5C852F673}"/>
+                  <a16:creationId xmlns:a16="http://schemas.microsoft.com/office/drawing/2014/main" xmlns="" id="{0AB66D97-DF6F-4CD2-AF13-42B5C852F673}"/>
                 </a:ext>
               </a:extLst>
             </p:cNvPr>
@@ -11078,7 +11078,7 @@
             <p:cNvPr id="38" name="Straight Connector 37">
               <a:extLst>
                 <a:ext uri="{FF2B5EF4-FFF2-40B4-BE49-F238E27FC236}">
-                  <a16:creationId xmlns="" xmlns:a16="http://schemas.microsoft.com/office/drawing/2014/main" id="{F2AFBA69-C196-4703-8AAB-5F72A8EDCEB5}"/>
+                  <a16:creationId xmlns:a16="http://schemas.microsoft.com/office/drawing/2014/main" xmlns="" id="{F2AFBA69-C196-4703-8AAB-5F72A8EDCEB5}"/>
                 </a:ext>
               </a:extLst>
             </p:cNvPr>
@@ -11124,7 +11124,7 @@
             <p:cNvPr id="39" name="Group 38">
               <a:extLst>
                 <a:ext uri="{FF2B5EF4-FFF2-40B4-BE49-F238E27FC236}">
-                  <a16:creationId xmlns="" xmlns:a16="http://schemas.microsoft.com/office/drawing/2014/main" id="{9AFC66C1-0C1C-4332-9C4E-782574C896B8}"/>
+                  <a16:creationId xmlns:a16="http://schemas.microsoft.com/office/drawing/2014/main" xmlns="" id="{9AFC66C1-0C1C-4332-9C4E-782574C896B8}"/>
                 </a:ext>
               </a:extLst>
             </p:cNvPr>
@@ -11147,7 +11147,7 @@
               <p:cNvPr id="45" name="Straight Connector 44">
                 <a:extLst>
                   <a:ext uri="{FF2B5EF4-FFF2-40B4-BE49-F238E27FC236}">
-                    <a16:creationId xmlns="" xmlns:a16="http://schemas.microsoft.com/office/drawing/2014/main" id="{872CA8AD-EAF6-40BE-9DDE-ECDB4A980CA5}"/>
+                    <a16:creationId xmlns:a16="http://schemas.microsoft.com/office/drawing/2014/main" xmlns="" id="{872CA8AD-EAF6-40BE-9DDE-ECDB4A980CA5}"/>
                   </a:ext>
                 </a:extLst>
               </p:cNvPr>
@@ -11191,7 +11191,7 @@
               <p:cNvPr id="46" name="Straight Connector 45">
                 <a:extLst>
                   <a:ext uri="{FF2B5EF4-FFF2-40B4-BE49-F238E27FC236}">
-                    <a16:creationId xmlns="" xmlns:a16="http://schemas.microsoft.com/office/drawing/2014/main" id="{57DD3EC7-1A13-4AFE-BD6F-DA12C281FAFB}"/>
+                    <a16:creationId xmlns:a16="http://schemas.microsoft.com/office/drawing/2014/main" xmlns="" id="{57DD3EC7-1A13-4AFE-BD6F-DA12C281FAFB}"/>
                   </a:ext>
                 </a:extLst>
               </p:cNvPr>
@@ -11236,7 +11236,7 @@
             <p:cNvPr id="40" name="Straight Connector 39">
               <a:extLst>
                 <a:ext uri="{FF2B5EF4-FFF2-40B4-BE49-F238E27FC236}">
-                  <a16:creationId xmlns="" xmlns:a16="http://schemas.microsoft.com/office/drawing/2014/main" id="{E46151FA-19E9-4E84-A082-EDAC6F76EA9D}"/>
+                  <a16:creationId xmlns:a16="http://schemas.microsoft.com/office/drawing/2014/main" xmlns="" id="{E46151FA-19E9-4E84-A082-EDAC6F76EA9D}"/>
                 </a:ext>
               </a:extLst>
             </p:cNvPr>
@@ -11282,7 +11282,7 @@
             <p:cNvPr id="41" name="Rectangle: Rounded Corners 40">
               <a:extLst>
                 <a:ext uri="{FF2B5EF4-FFF2-40B4-BE49-F238E27FC236}">
-                  <a16:creationId xmlns="" xmlns:a16="http://schemas.microsoft.com/office/drawing/2014/main" id="{3423EEF0-5B70-4091-B2DA-0740D2609643}"/>
+                  <a16:creationId xmlns:a16="http://schemas.microsoft.com/office/drawing/2014/main" xmlns="" id="{3423EEF0-5B70-4091-B2DA-0740D2609643}"/>
                 </a:ext>
               </a:extLst>
             </p:cNvPr>
@@ -11336,7 +11336,7 @@
             <p:cNvPr id="42" name="Group 41">
               <a:extLst>
                 <a:ext uri="{FF2B5EF4-FFF2-40B4-BE49-F238E27FC236}">
-                  <a16:creationId xmlns="" xmlns:a16="http://schemas.microsoft.com/office/drawing/2014/main" id="{49A8AAA7-98E7-4224-B027-830FFCC285A3}"/>
+                  <a16:creationId xmlns:a16="http://schemas.microsoft.com/office/drawing/2014/main" xmlns="" id="{49A8AAA7-98E7-4224-B027-830FFCC285A3}"/>
                 </a:ext>
               </a:extLst>
             </p:cNvPr>
@@ -11359,7 +11359,7 @@
               <p:cNvPr id="43" name="Straight Connector 42">
                 <a:extLst>
                   <a:ext uri="{FF2B5EF4-FFF2-40B4-BE49-F238E27FC236}">
-                    <a16:creationId xmlns="" xmlns:a16="http://schemas.microsoft.com/office/drawing/2014/main" id="{2129EC38-471E-4685-973E-BA7A7F567C42}"/>
+                    <a16:creationId xmlns:a16="http://schemas.microsoft.com/office/drawing/2014/main" xmlns="" id="{2129EC38-471E-4685-973E-BA7A7F567C42}"/>
                   </a:ext>
                 </a:extLst>
               </p:cNvPr>
@@ -11403,7 +11403,7 @@
               <p:cNvPr id="44" name="Straight Connector 43">
                 <a:extLst>
                   <a:ext uri="{FF2B5EF4-FFF2-40B4-BE49-F238E27FC236}">
-                    <a16:creationId xmlns="" xmlns:a16="http://schemas.microsoft.com/office/drawing/2014/main" id="{678142BE-84C9-4834-B6CC-6623E401661C}"/>
+                    <a16:creationId xmlns:a16="http://schemas.microsoft.com/office/drawing/2014/main" xmlns="" id="{678142BE-84C9-4834-B6CC-6623E401661C}"/>
                   </a:ext>
                 </a:extLst>
               </p:cNvPr>
@@ -11447,7 +11447,7 @@
     </p:spTree>
     <p:extLst>
       <p:ext uri="{BB962C8B-B14F-4D97-AF65-F5344CB8AC3E}">
-        <p14:creationId xmlns="" xmlns:p14="http://schemas.microsoft.com/office/powerpoint/2010/main" val="1679651758"/>
+        <p14:creationId xmlns:p14="http://schemas.microsoft.com/office/powerpoint/2010/main" xmlns="" val="1679651758"/>
       </p:ext>
     </p:extLst>
   </p:cSld>
@@ -11455,7 +11455,7 @@
     <a:masterClrMapping/>
   </p:clrMapOvr>
   <mc:AlternateContent xmlns:mc="http://schemas.openxmlformats.org/markup-compatibility/2006">
-    <mc:Choice xmlns="" xmlns:p14="http://schemas.microsoft.com/office/powerpoint/2010/main" Requires="p14">
+    <mc:Choice xmlns:p14="http://schemas.microsoft.com/office/powerpoint/2010/main" xmlns="" Requires="p14">
       <p:transition spd="slow" p14:dur="2000" advClick="0" advTm="5000"/>
     </mc:Choice>
     <mc:Fallback>
@@ -11487,7 +11487,7 @@
           <p:cNvPr id="5" name="Slide Number">
             <a:extLst>
               <a:ext uri="{FF2B5EF4-FFF2-40B4-BE49-F238E27FC236}">
-                <a16:creationId xmlns="" xmlns:a16="http://schemas.microsoft.com/office/drawing/2014/main" id="{F0B8C963-1813-4B69-AD27-6D02EBBBB569}"/>
+                <a16:creationId xmlns:a16="http://schemas.microsoft.com/office/drawing/2014/main" xmlns="" id="{F0B8C963-1813-4B69-AD27-6D02EBBBB569}"/>
               </a:ext>
             </a:extLst>
           </p:cNvPr>
@@ -11529,7 +11529,7 @@
           <p:cNvPr id="3" name="Rectangle Left">
             <a:extLst>
               <a:ext uri="{FF2B5EF4-FFF2-40B4-BE49-F238E27FC236}">
-                <a16:creationId xmlns="" xmlns:a16="http://schemas.microsoft.com/office/drawing/2014/main" id="{345FB1C8-7F66-4D5C-ACCE-AE919936BCFD}"/>
+                <a16:creationId xmlns:a16="http://schemas.microsoft.com/office/drawing/2014/main" xmlns="" id="{345FB1C8-7F66-4D5C-ACCE-AE919936BCFD}"/>
               </a:ext>
             </a:extLst>
           </p:cNvPr>
@@ -11610,7 +11610,7 @@
           <p:cNvPr id="7" name="Slide Body Text">
             <a:extLst>
               <a:ext uri="{FF2B5EF4-FFF2-40B4-BE49-F238E27FC236}">
-                <a16:creationId xmlns="" xmlns:a16="http://schemas.microsoft.com/office/drawing/2014/main" id="{7296EDA7-D37D-4B31-A888-371F0804124F}"/>
+                <a16:creationId xmlns:a16="http://schemas.microsoft.com/office/drawing/2014/main" xmlns="" id="{7296EDA7-D37D-4B31-A888-371F0804124F}"/>
               </a:ext>
             </a:extLst>
           </p:cNvPr>
@@ -11708,7 +11708,7 @@
           <p:cNvPr id="6" name="Slide Title">
             <a:extLst>
               <a:ext uri="{FF2B5EF4-FFF2-40B4-BE49-F238E27FC236}">
-                <a16:creationId xmlns="" xmlns:a16="http://schemas.microsoft.com/office/drawing/2014/main" id="{55A88B09-3557-48A3-BF27-42699C269215}"/>
+                <a16:creationId xmlns:a16="http://schemas.microsoft.com/office/drawing/2014/main" xmlns="" id="{55A88B09-3557-48A3-BF27-42699C269215}"/>
               </a:ext>
             </a:extLst>
           </p:cNvPr>
@@ -11745,7 +11745,7 @@
           <p:cNvPr id="28" name="Group 27">
             <a:extLst>
               <a:ext uri="{FF2B5EF4-FFF2-40B4-BE49-F238E27FC236}">
-                <a16:creationId xmlns="" xmlns:a16="http://schemas.microsoft.com/office/drawing/2014/main" id="{C4248838-4E67-439E-AE0A-0043D2CB04D6}"/>
+                <a16:creationId xmlns:a16="http://schemas.microsoft.com/office/drawing/2014/main" xmlns="" id="{C4248838-4E67-439E-AE0A-0043D2CB04D6}"/>
               </a:ext>
             </a:extLst>
           </p:cNvPr>
@@ -11765,7 +11765,7 @@
             <p:cNvPr id="29" name="Group 28">
               <a:extLst>
                 <a:ext uri="{FF2B5EF4-FFF2-40B4-BE49-F238E27FC236}">
-                  <a16:creationId xmlns="" xmlns:a16="http://schemas.microsoft.com/office/drawing/2014/main" id="{810CFD6A-2427-49D5-846A-5F93601D4184}"/>
+                  <a16:creationId xmlns:a16="http://schemas.microsoft.com/office/drawing/2014/main" xmlns="" id="{810CFD6A-2427-49D5-846A-5F93601D4184}"/>
                 </a:ext>
               </a:extLst>
             </p:cNvPr>
@@ -11785,7 +11785,7 @@
               <p:cNvPr id="42" name="Oval 41">
                 <a:extLst>
                   <a:ext uri="{FF2B5EF4-FFF2-40B4-BE49-F238E27FC236}">
-                    <a16:creationId xmlns="" xmlns:a16="http://schemas.microsoft.com/office/drawing/2014/main" id="{017B1AE5-5C36-4839-BA1F-B404EA44E701}"/>
+                    <a16:creationId xmlns:a16="http://schemas.microsoft.com/office/drawing/2014/main" xmlns="" id="{017B1AE5-5C36-4839-BA1F-B404EA44E701}"/>
                   </a:ext>
                 </a:extLst>
               </p:cNvPr>
@@ -11837,7 +11837,7 @@
               <p:cNvPr id="43" name="Rectangle 5">
                 <a:extLst>
                   <a:ext uri="{FF2B5EF4-FFF2-40B4-BE49-F238E27FC236}">
-                    <a16:creationId xmlns="" xmlns:a16="http://schemas.microsoft.com/office/drawing/2014/main" id="{FB963D79-BB49-4A1D-BA66-EA0670C79BAE}"/>
+                    <a16:creationId xmlns:a16="http://schemas.microsoft.com/office/drawing/2014/main" xmlns="" id="{FB963D79-BB49-4A1D-BA66-EA0670C79BAE}"/>
                   </a:ext>
                 </a:extLst>
               </p:cNvPr>
@@ -11982,7 +11982,7 @@
               <p:cNvPr id="44" name="Rectangle 5">
                 <a:extLst>
                   <a:ext uri="{FF2B5EF4-FFF2-40B4-BE49-F238E27FC236}">
-                    <a16:creationId xmlns="" xmlns:a16="http://schemas.microsoft.com/office/drawing/2014/main" id="{6D7746D8-B913-493B-AAE9-25BC6893D40E}"/>
+                    <a16:creationId xmlns:a16="http://schemas.microsoft.com/office/drawing/2014/main" xmlns="" id="{6D7746D8-B913-493B-AAE9-25BC6893D40E}"/>
                   </a:ext>
                 </a:extLst>
               </p:cNvPr>
@@ -12127,7 +12127,7 @@
               <p:cNvPr id="45" name="Arc 44">
                 <a:extLst>
                   <a:ext uri="{FF2B5EF4-FFF2-40B4-BE49-F238E27FC236}">
-                    <a16:creationId xmlns="" xmlns:a16="http://schemas.microsoft.com/office/drawing/2014/main" id="{29031C02-E965-417B-8799-96061B14F30D}"/>
+                    <a16:creationId xmlns:a16="http://schemas.microsoft.com/office/drawing/2014/main" xmlns="" id="{29031C02-E965-417B-8799-96061B14F30D}"/>
                   </a:ext>
                 </a:extLst>
               </p:cNvPr>
@@ -12186,7 +12186,7 @@
               <p:cNvPr id="46" name="Arc 45">
                 <a:extLst>
                   <a:ext uri="{FF2B5EF4-FFF2-40B4-BE49-F238E27FC236}">
-                    <a16:creationId xmlns="" xmlns:a16="http://schemas.microsoft.com/office/drawing/2014/main" id="{26BFD8A6-BC99-4B16-BA10-08A9E5C681C0}"/>
+                    <a16:creationId xmlns:a16="http://schemas.microsoft.com/office/drawing/2014/main" xmlns="" id="{26BFD8A6-BC99-4B16-BA10-08A9E5C681C0}"/>
                   </a:ext>
                 </a:extLst>
               </p:cNvPr>
@@ -12246,7 +12246,7 @@
             <p:cNvPr id="30" name="Rectangle: Rounded Corners 29">
               <a:extLst>
                 <a:ext uri="{FF2B5EF4-FFF2-40B4-BE49-F238E27FC236}">
-                  <a16:creationId xmlns="" xmlns:a16="http://schemas.microsoft.com/office/drawing/2014/main" id="{B310277F-A78E-4FB9-9EA9-88BE4F1D585B}"/>
+                  <a16:creationId xmlns:a16="http://schemas.microsoft.com/office/drawing/2014/main" xmlns="" id="{B310277F-A78E-4FB9-9EA9-88BE4F1D585B}"/>
                 </a:ext>
               </a:extLst>
             </p:cNvPr>
@@ -12300,7 +12300,7 @@
             <p:cNvPr id="31" name="Rectangle: Rounded Corners 30">
               <a:extLst>
                 <a:ext uri="{FF2B5EF4-FFF2-40B4-BE49-F238E27FC236}">
-                  <a16:creationId xmlns="" xmlns:a16="http://schemas.microsoft.com/office/drawing/2014/main" id="{A92CF92B-C212-4542-83AE-A0058B5BB5EA}"/>
+                  <a16:creationId xmlns:a16="http://schemas.microsoft.com/office/drawing/2014/main" xmlns="" id="{A92CF92B-C212-4542-83AE-A0058B5BB5EA}"/>
                 </a:ext>
               </a:extLst>
             </p:cNvPr>
@@ -12361,7 +12361,7 @@
             <p:cNvPr id="32" name="Straight Connector 31">
               <a:extLst>
                 <a:ext uri="{FF2B5EF4-FFF2-40B4-BE49-F238E27FC236}">
-                  <a16:creationId xmlns="" xmlns:a16="http://schemas.microsoft.com/office/drawing/2014/main" id="{563B4374-5C0D-461F-B3BD-78D99614D365}"/>
+                  <a16:creationId xmlns:a16="http://schemas.microsoft.com/office/drawing/2014/main" xmlns="" id="{563B4374-5C0D-461F-B3BD-78D99614D365}"/>
                 </a:ext>
               </a:extLst>
             </p:cNvPr>
@@ -12407,7 +12407,7 @@
             <p:cNvPr id="33" name="Straight Connector 32">
               <a:extLst>
                 <a:ext uri="{FF2B5EF4-FFF2-40B4-BE49-F238E27FC236}">
-                  <a16:creationId xmlns="" xmlns:a16="http://schemas.microsoft.com/office/drawing/2014/main" id="{FBC6FDE7-AEA1-4230-8433-4C088A0FF5F9}"/>
+                  <a16:creationId xmlns:a16="http://schemas.microsoft.com/office/drawing/2014/main" xmlns="" id="{FBC6FDE7-AEA1-4230-8433-4C088A0FF5F9}"/>
                 </a:ext>
               </a:extLst>
             </p:cNvPr>
@@ -12453,7 +12453,7 @@
             <p:cNvPr id="34" name="Group 33">
               <a:extLst>
                 <a:ext uri="{FF2B5EF4-FFF2-40B4-BE49-F238E27FC236}">
-                  <a16:creationId xmlns="" xmlns:a16="http://schemas.microsoft.com/office/drawing/2014/main" id="{C4D1021D-07C7-4331-8FF6-36980A30978B}"/>
+                  <a16:creationId xmlns:a16="http://schemas.microsoft.com/office/drawing/2014/main" xmlns="" id="{C4D1021D-07C7-4331-8FF6-36980A30978B}"/>
                 </a:ext>
               </a:extLst>
             </p:cNvPr>
@@ -12476,7 +12476,7 @@
               <p:cNvPr id="40" name="Straight Connector 39">
                 <a:extLst>
                   <a:ext uri="{FF2B5EF4-FFF2-40B4-BE49-F238E27FC236}">
-                    <a16:creationId xmlns="" xmlns:a16="http://schemas.microsoft.com/office/drawing/2014/main" id="{13B7FE99-95CF-45D5-966B-87A979B93431}"/>
+                    <a16:creationId xmlns:a16="http://schemas.microsoft.com/office/drawing/2014/main" xmlns="" id="{13B7FE99-95CF-45D5-966B-87A979B93431}"/>
                   </a:ext>
                 </a:extLst>
               </p:cNvPr>
@@ -12520,7 +12520,7 @@
               <p:cNvPr id="41" name="Straight Connector 40">
                 <a:extLst>
                   <a:ext uri="{FF2B5EF4-FFF2-40B4-BE49-F238E27FC236}">
-                    <a16:creationId xmlns="" xmlns:a16="http://schemas.microsoft.com/office/drawing/2014/main" id="{71BBA69B-19FF-4ADB-A739-AD8136A5F0A6}"/>
+                    <a16:creationId xmlns:a16="http://schemas.microsoft.com/office/drawing/2014/main" xmlns="" id="{71BBA69B-19FF-4ADB-A739-AD8136A5F0A6}"/>
                   </a:ext>
                 </a:extLst>
               </p:cNvPr>
@@ -12565,7 +12565,7 @@
             <p:cNvPr id="35" name="Straight Connector 34">
               <a:extLst>
                 <a:ext uri="{FF2B5EF4-FFF2-40B4-BE49-F238E27FC236}">
-                  <a16:creationId xmlns="" xmlns:a16="http://schemas.microsoft.com/office/drawing/2014/main" id="{BFD1D86B-562B-40B2-8E46-34233EFEE7FC}"/>
+                  <a16:creationId xmlns:a16="http://schemas.microsoft.com/office/drawing/2014/main" xmlns="" id="{BFD1D86B-562B-40B2-8E46-34233EFEE7FC}"/>
                 </a:ext>
               </a:extLst>
             </p:cNvPr>
@@ -12611,7 +12611,7 @@
             <p:cNvPr id="36" name="Rectangle: Rounded Corners 35">
               <a:extLst>
                 <a:ext uri="{FF2B5EF4-FFF2-40B4-BE49-F238E27FC236}">
-                  <a16:creationId xmlns="" xmlns:a16="http://schemas.microsoft.com/office/drawing/2014/main" id="{388C17BD-16A1-43C5-BFFA-2FF9174719E1}"/>
+                  <a16:creationId xmlns:a16="http://schemas.microsoft.com/office/drawing/2014/main" xmlns="" id="{388C17BD-16A1-43C5-BFFA-2FF9174719E1}"/>
                 </a:ext>
               </a:extLst>
             </p:cNvPr>
@@ -12665,7 +12665,7 @@
             <p:cNvPr id="37" name="Group 36">
               <a:extLst>
                 <a:ext uri="{FF2B5EF4-FFF2-40B4-BE49-F238E27FC236}">
-                  <a16:creationId xmlns="" xmlns:a16="http://schemas.microsoft.com/office/drawing/2014/main" id="{1B3B910E-ACFC-4F28-8E28-F02E1588B87E}"/>
+                  <a16:creationId xmlns:a16="http://schemas.microsoft.com/office/drawing/2014/main" xmlns="" id="{1B3B910E-ACFC-4F28-8E28-F02E1588B87E}"/>
                 </a:ext>
               </a:extLst>
             </p:cNvPr>
@@ -12688,7 +12688,7 @@
               <p:cNvPr id="38" name="Straight Connector 37">
                 <a:extLst>
                   <a:ext uri="{FF2B5EF4-FFF2-40B4-BE49-F238E27FC236}">
-                    <a16:creationId xmlns="" xmlns:a16="http://schemas.microsoft.com/office/drawing/2014/main" id="{F57772B6-06C0-4F54-AA94-D3F92DA4716A}"/>
+                    <a16:creationId xmlns:a16="http://schemas.microsoft.com/office/drawing/2014/main" xmlns="" id="{F57772B6-06C0-4F54-AA94-D3F92DA4716A}"/>
                   </a:ext>
                 </a:extLst>
               </p:cNvPr>
@@ -12732,7 +12732,7 @@
               <p:cNvPr id="39" name="Straight Connector 38">
                 <a:extLst>
                   <a:ext uri="{FF2B5EF4-FFF2-40B4-BE49-F238E27FC236}">
-                    <a16:creationId xmlns="" xmlns:a16="http://schemas.microsoft.com/office/drawing/2014/main" id="{23370C1F-7876-4278-AB20-78F6CAA385E2}"/>
+                    <a16:creationId xmlns:a16="http://schemas.microsoft.com/office/drawing/2014/main" xmlns="" id="{23370C1F-7876-4278-AB20-78F6CAA385E2}"/>
                   </a:ext>
                 </a:extLst>
               </p:cNvPr>
@@ -12776,7 +12776,7 @@
     </p:spTree>
     <p:extLst>
       <p:ext uri="{BB962C8B-B14F-4D97-AF65-F5344CB8AC3E}">
-        <p14:creationId xmlns="" xmlns:p14="http://schemas.microsoft.com/office/powerpoint/2010/main" val="3284562556"/>
+        <p14:creationId xmlns:p14="http://schemas.microsoft.com/office/powerpoint/2010/main" xmlns="" val="3284562556"/>
       </p:ext>
     </p:extLst>
   </p:cSld>
@@ -12784,7 +12784,7 @@
     <a:masterClrMapping/>
   </p:clrMapOvr>
   <mc:AlternateContent xmlns:mc="http://schemas.openxmlformats.org/markup-compatibility/2006">
-    <mc:Choice xmlns="" xmlns:p14="http://schemas.microsoft.com/office/powerpoint/2010/main" Requires="p14">
+    <mc:Choice xmlns:p14="http://schemas.microsoft.com/office/powerpoint/2010/main" xmlns="" Requires="p14">
       <p:transition spd="slow" p14:dur="2000" advClick="0" advTm="5000"/>
     </mc:Choice>
     <mc:Fallback>
@@ -12816,7 +12816,7 @@
           <p:cNvPr id="8" name="Slide Number">
             <a:extLst>
               <a:ext uri="{FF2B5EF4-FFF2-40B4-BE49-F238E27FC236}">
-                <a16:creationId xmlns="" xmlns:a16="http://schemas.microsoft.com/office/drawing/2014/main" id="{509D954E-A844-4072-A556-DE584BEB9321}"/>
+                <a16:creationId xmlns:a16="http://schemas.microsoft.com/office/drawing/2014/main" xmlns="" id="{509D954E-A844-4072-A556-DE584BEB9321}"/>
               </a:ext>
             </a:extLst>
           </p:cNvPr>
@@ -12858,7 +12858,7 @@
           <p:cNvPr id="6" name="Code Box">
             <a:extLst>
               <a:ext uri="{FF2B5EF4-FFF2-40B4-BE49-F238E27FC236}">
-                <a16:creationId xmlns="" xmlns:a16="http://schemas.microsoft.com/office/drawing/2014/main" id="{3278A82F-5546-4977-9F75-2A933B415945}"/>
+                <a16:creationId xmlns:a16="http://schemas.microsoft.com/office/drawing/2014/main" xmlns="" id="{3278A82F-5546-4977-9F75-2A933B415945}"/>
               </a:ext>
             </a:extLst>
           </p:cNvPr>
@@ -12945,7 +12945,7 @@
           <p:cNvPr id="21" name="Slide Body Text">
             <a:extLst>
               <a:ext uri="{FF2B5EF4-FFF2-40B4-BE49-F238E27FC236}">
-                <a16:creationId xmlns="" xmlns:a16="http://schemas.microsoft.com/office/drawing/2014/main" id="{04F318BE-2BAD-4677-871C-D78A4BF0CBA6}"/>
+                <a16:creationId xmlns:a16="http://schemas.microsoft.com/office/drawing/2014/main" xmlns="" id="{04F318BE-2BAD-4677-871C-D78A4BF0CBA6}"/>
               </a:ext>
             </a:extLst>
           </p:cNvPr>
@@ -12992,7 +12992,7 @@
           <p:cNvPr id="9" name="Rectangle Top">
             <a:extLst>
               <a:ext uri="{FF2B5EF4-FFF2-40B4-BE49-F238E27FC236}">
-                <a16:creationId xmlns="" xmlns:a16="http://schemas.microsoft.com/office/drawing/2014/main" id="{A15CE03A-0933-4E5D-9EA1-718D4F802FFC}"/>
+                <a16:creationId xmlns:a16="http://schemas.microsoft.com/office/drawing/2014/main" xmlns="" id="{A15CE03A-0933-4E5D-9EA1-718D4F802FFC}"/>
               </a:ext>
             </a:extLst>
           </p:cNvPr>
@@ -13073,7 +13073,7 @@
           <p:cNvPr id="10" name="Logo Software University" descr="Software University logo">
             <a:extLst>
               <a:ext uri="{FF2B5EF4-FFF2-40B4-BE49-F238E27FC236}">
-                <a16:creationId xmlns="" xmlns:a16="http://schemas.microsoft.com/office/drawing/2014/main" id="{8C01D7AF-7CBD-46E1-99F3-8EB60E838D91}"/>
+                <a16:creationId xmlns:a16="http://schemas.microsoft.com/office/drawing/2014/main" xmlns="" id="{8C01D7AF-7CBD-46E1-99F3-8EB60E838D91}"/>
               </a:ext>
             </a:extLst>
           </p:cNvPr>
@@ -13086,7 +13086,7 @@
           <a:blip r:embed="rId2" cstate="print">
             <a:extLst>
               <a:ext uri="{28A0092B-C50C-407E-A947-70E740481C1C}">
-                <a14:useLocalDpi xmlns="" xmlns:a14="http://schemas.microsoft.com/office/drawing/2010/main" val="0"/>
+                <a14:useLocalDpi xmlns:a14="http://schemas.microsoft.com/office/drawing/2010/main" xmlns="" val="0"/>
               </a:ext>
             </a:extLst>
           </a:blip>
@@ -13109,7 +13109,7 @@
           <p:cNvPr id="11" name="Slide Title">
             <a:extLst>
               <a:ext uri="{FF2B5EF4-FFF2-40B4-BE49-F238E27FC236}">
-                <a16:creationId xmlns="" xmlns:a16="http://schemas.microsoft.com/office/drawing/2014/main" id="{47D60833-F0A9-4F29-8C06-A963A7C8BE93}"/>
+                <a16:creationId xmlns:a16="http://schemas.microsoft.com/office/drawing/2014/main" xmlns="" id="{47D60833-F0A9-4F29-8C06-A963A7C8BE93}"/>
               </a:ext>
             </a:extLst>
           </p:cNvPr>
@@ -13148,7 +13148,7 @@
     </p:spTree>
     <p:extLst>
       <p:ext uri="{BB962C8B-B14F-4D97-AF65-F5344CB8AC3E}">
-        <p14:creationId xmlns="" xmlns:p14="http://schemas.microsoft.com/office/powerpoint/2010/main" val="1000829826"/>
+        <p14:creationId xmlns:p14="http://schemas.microsoft.com/office/powerpoint/2010/main" xmlns="" val="1000829826"/>
       </p:ext>
     </p:extLst>
   </p:cSld>
@@ -13156,7 +13156,7 @@
     <a:masterClrMapping/>
   </p:clrMapOvr>
   <mc:AlternateContent xmlns:mc="http://schemas.openxmlformats.org/markup-compatibility/2006">
-    <mc:Choice xmlns="" xmlns:p14="http://schemas.microsoft.com/office/powerpoint/2010/main" Requires="p14">
+    <mc:Choice xmlns:p14="http://schemas.microsoft.com/office/powerpoint/2010/main" xmlns="" Requires="p14">
       <p:transition spd="slow" p14:dur="2000" advClick="0" advTm="5000"/>
     </mc:Choice>
     <mc:Fallback>
@@ -13188,7 +13188,7 @@
           <p:cNvPr id="10" name="Slide Number">
             <a:extLst>
               <a:ext uri="{FF2B5EF4-FFF2-40B4-BE49-F238E27FC236}">
-                <a16:creationId xmlns="" xmlns:a16="http://schemas.microsoft.com/office/drawing/2014/main" id="{39DDE17E-5472-41F3-AF5F-54DFF10DC63C}"/>
+                <a16:creationId xmlns:a16="http://schemas.microsoft.com/office/drawing/2014/main" xmlns="" id="{39DDE17E-5472-41F3-AF5F-54DFF10DC63C}"/>
               </a:ext>
             </a:extLst>
           </p:cNvPr>
@@ -13230,7 +13230,7 @@
           <p:cNvPr id="9" name="Picture SoftUni Mascot" descr="SoftUni mascot with laptop">
             <a:extLst>
               <a:ext uri="{FF2B5EF4-FFF2-40B4-BE49-F238E27FC236}">
-                <a16:creationId xmlns="" xmlns:a16="http://schemas.microsoft.com/office/drawing/2014/main" id="{DC4365F6-D2C1-47B4-8477-38FD2C7711AA}"/>
+                <a16:creationId xmlns:a16="http://schemas.microsoft.com/office/drawing/2014/main" xmlns="" id="{DC4365F6-D2C1-47B4-8477-38FD2C7711AA}"/>
               </a:ext>
             </a:extLst>
           </p:cNvPr>
@@ -13243,7 +13243,7 @@
           <a:blip r:embed="rId2" cstate="print">
             <a:extLst>
               <a:ext uri="{28A0092B-C50C-407E-A947-70E740481C1C}">
-                <a14:useLocalDpi xmlns="" xmlns:a14="http://schemas.microsoft.com/office/drawing/2010/main" val="0"/>
+                <a14:useLocalDpi xmlns:a14="http://schemas.microsoft.com/office/drawing/2010/main" xmlns="" val="0"/>
               </a:ext>
             </a:extLst>
           </a:blip>
@@ -13266,7 +13266,7 @@
           <p:cNvPr id="23" name="Slide Body Text">
             <a:extLst>
               <a:ext uri="{FF2B5EF4-FFF2-40B4-BE49-F238E27FC236}">
-                <a16:creationId xmlns="" xmlns:a16="http://schemas.microsoft.com/office/drawing/2014/main" id="{889D93F4-ABFA-46BF-8E5D-FE6562ACB20F}"/>
+                <a16:creationId xmlns:a16="http://schemas.microsoft.com/office/drawing/2014/main" xmlns="" id="{889D93F4-ABFA-46BF-8E5D-FE6562ACB20F}"/>
               </a:ext>
             </a:extLst>
           </p:cNvPr>
@@ -13357,7 +13357,7 @@
           <p:cNvPr id="8" name="Rectangle Top">
             <a:extLst>
               <a:ext uri="{FF2B5EF4-FFF2-40B4-BE49-F238E27FC236}">
-                <a16:creationId xmlns="" xmlns:a16="http://schemas.microsoft.com/office/drawing/2014/main" id="{930E0800-9260-4369-8330-8264DD33C5CE}"/>
+                <a16:creationId xmlns:a16="http://schemas.microsoft.com/office/drawing/2014/main" xmlns="" id="{930E0800-9260-4369-8330-8264DD33C5CE}"/>
               </a:ext>
             </a:extLst>
           </p:cNvPr>
@@ -13438,7 +13438,7 @@
           <p:cNvPr id="11" name="Logo Software University" descr="Software University logo">
             <a:extLst>
               <a:ext uri="{FF2B5EF4-FFF2-40B4-BE49-F238E27FC236}">
-                <a16:creationId xmlns="" xmlns:a16="http://schemas.microsoft.com/office/drawing/2014/main" id="{14F779A7-4A91-448B-BEFA-956C70A1C22F}"/>
+                <a16:creationId xmlns:a16="http://schemas.microsoft.com/office/drawing/2014/main" xmlns="" id="{14F779A7-4A91-448B-BEFA-956C70A1C22F}"/>
               </a:ext>
             </a:extLst>
           </p:cNvPr>
@@ -13451,7 +13451,7 @@
           <a:blip r:embed="rId3" cstate="print">
             <a:extLst>
               <a:ext uri="{28A0092B-C50C-407E-A947-70E740481C1C}">
-                <a14:useLocalDpi xmlns="" xmlns:a14="http://schemas.microsoft.com/office/drawing/2010/main" val="0"/>
+                <a14:useLocalDpi xmlns:a14="http://schemas.microsoft.com/office/drawing/2010/main" xmlns="" val="0"/>
               </a:ext>
             </a:extLst>
           </a:blip>
@@ -13474,7 +13474,7 @@
           <p:cNvPr id="13" name="Slide Title">
             <a:extLst>
               <a:ext uri="{FF2B5EF4-FFF2-40B4-BE49-F238E27FC236}">
-                <a16:creationId xmlns="" xmlns:a16="http://schemas.microsoft.com/office/drawing/2014/main" id="{357D7BE1-6358-42CC-94F3-7BCDD91DCB6D}"/>
+                <a16:creationId xmlns:a16="http://schemas.microsoft.com/office/drawing/2014/main" xmlns="" id="{357D7BE1-6358-42CC-94F3-7BCDD91DCB6D}"/>
               </a:ext>
             </a:extLst>
           </p:cNvPr>
@@ -13513,7 +13513,7 @@
     </p:spTree>
     <p:extLst>
       <p:ext uri="{BB962C8B-B14F-4D97-AF65-F5344CB8AC3E}">
-        <p14:creationId xmlns="" xmlns:p14="http://schemas.microsoft.com/office/powerpoint/2010/main" val="1028724482"/>
+        <p14:creationId xmlns:p14="http://schemas.microsoft.com/office/powerpoint/2010/main" xmlns="" val="1028724482"/>
       </p:ext>
     </p:extLst>
   </p:cSld>
@@ -13521,7 +13521,7 @@
     <a:masterClrMapping/>
   </p:clrMapOvr>
   <mc:AlternateContent xmlns:mc="http://schemas.openxmlformats.org/markup-compatibility/2006">
-    <mc:Choice xmlns="" xmlns:p14="http://schemas.microsoft.com/office/powerpoint/2010/main" Requires="p14">
+    <mc:Choice xmlns:p14="http://schemas.microsoft.com/office/powerpoint/2010/main" xmlns="" Requires="p14">
       <p:transition spd="slow" p14:dur="2000" advClick="0" advTm="5000"/>
     </mc:Choice>
     <mc:Fallback>
@@ -13633,7 +13633,7 @@
           <p:cNvPr id="11" name="Slide Number">
             <a:extLst>
               <a:ext uri="{FF2B5EF4-FFF2-40B4-BE49-F238E27FC236}">
-                <a16:creationId xmlns="" xmlns:a16="http://schemas.microsoft.com/office/drawing/2014/main" id="{6750ECE4-94E0-469B-B8E4-562792823B0F}"/>
+                <a16:creationId xmlns:a16="http://schemas.microsoft.com/office/drawing/2014/main" xmlns="" id="{6750ECE4-94E0-469B-B8E4-562792823B0F}"/>
               </a:ext>
             </a:extLst>
           </p:cNvPr>
@@ -13756,7 +13756,7 @@
           <p:cNvPr id="12" name="Logo Software University Down" descr="Software University logo">
             <a:extLst>
               <a:ext uri="{FF2B5EF4-FFF2-40B4-BE49-F238E27FC236}">
-                <a16:creationId xmlns="" xmlns:a16="http://schemas.microsoft.com/office/drawing/2014/main" id="{7028D2F0-1E67-414B-A93D-D3F8F131A132}"/>
+                <a16:creationId xmlns:a16="http://schemas.microsoft.com/office/drawing/2014/main" xmlns="" id="{7028D2F0-1E67-414B-A93D-D3F8F131A132}"/>
               </a:ext>
             </a:extLst>
           </p:cNvPr>
@@ -13769,7 +13769,7 @@
           <a:blip r:embed="rId2" cstate="print">
             <a:extLst>
               <a:ext uri="{28A0092B-C50C-407E-A947-70E740481C1C}">
-                <a14:useLocalDpi xmlns="" xmlns:a14="http://schemas.microsoft.com/office/drawing/2010/main" val="0"/>
+                <a14:useLocalDpi xmlns:a14="http://schemas.microsoft.com/office/drawing/2010/main" xmlns="" val="0"/>
               </a:ext>
             </a:extLst>
           </a:blip>
@@ -13792,7 +13792,7 @@
           <p:cNvPr id="10" name="Text Placeholder Right">
             <a:extLst>
               <a:ext uri="{FF2B5EF4-FFF2-40B4-BE49-F238E27FC236}">
-                <a16:creationId xmlns="" xmlns:a16="http://schemas.microsoft.com/office/drawing/2014/main" id="{AF69A59F-C564-4A04-B1CC-31C261499991}"/>
+                <a16:creationId xmlns:a16="http://schemas.microsoft.com/office/drawing/2014/main" xmlns="" id="{AF69A59F-C564-4A04-B1CC-31C261499991}"/>
               </a:ext>
             </a:extLst>
           </p:cNvPr>
@@ -13870,7 +13870,7 @@
           <p:cNvPr id="9" name="Text Placeholder Left">
             <a:extLst>
               <a:ext uri="{FF2B5EF4-FFF2-40B4-BE49-F238E27FC236}">
-                <a16:creationId xmlns="" xmlns:a16="http://schemas.microsoft.com/office/drawing/2014/main" id="{C8A626D2-456B-41EF-9818-EA8DD7E314DA}"/>
+                <a16:creationId xmlns:a16="http://schemas.microsoft.com/office/drawing/2014/main" xmlns="" id="{C8A626D2-456B-41EF-9818-EA8DD7E314DA}"/>
               </a:ext>
             </a:extLst>
           </p:cNvPr>
@@ -13948,7 +13948,7 @@
           <p:cNvPr id="13" name="Rectangle Top">
             <a:extLst>
               <a:ext uri="{FF2B5EF4-FFF2-40B4-BE49-F238E27FC236}">
-                <a16:creationId xmlns="" xmlns:a16="http://schemas.microsoft.com/office/drawing/2014/main" id="{E03301DA-D0AF-46FD-8740-2F761250203A}"/>
+                <a16:creationId xmlns:a16="http://schemas.microsoft.com/office/drawing/2014/main" xmlns="" id="{E03301DA-D0AF-46FD-8740-2F761250203A}"/>
               </a:ext>
             </a:extLst>
           </p:cNvPr>
@@ -14029,7 +14029,7 @@
           <p:cNvPr id="14" name="Logo Software University" descr="Software University logo">
             <a:extLst>
               <a:ext uri="{FF2B5EF4-FFF2-40B4-BE49-F238E27FC236}">
-                <a16:creationId xmlns="" xmlns:a16="http://schemas.microsoft.com/office/drawing/2014/main" id="{19A67BB9-D880-4EAD-B90E-89C4219BFC0B}"/>
+                <a16:creationId xmlns:a16="http://schemas.microsoft.com/office/drawing/2014/main" xmlns="" id="{19A67BB9-D880-4EAD-B90E-89C4219BFC0B}"/>
               </a:ext>
             </a:extLst>
           </p:cNvPr>
@@ -14042,7 +14042,7 @@
           <a:blip r:embed="rId3" cstate="print">
             <a:extLst>
               <a:ext uri="{28A0092B-C50C-407E-A947-70E740481C1C}">
-                <a14:useLocalDpi xmlns="" xmlns:a14="http://schemas.microsoft.com/office/drawing/2010/main" val="0"/>
+                <a14:useLocalDpi xmlns:a14="http://schemas.microsoft.com/office/drawing/2010/main" xmlns="" val="0"/>
               </a:ext>
             </a:extLst>
           </a:blip>
@@ -14065,7 +14065,7 @@
           <p:cNvPr id="15" name="Slide Title">
             <a:extLst>
               <a:ext uri="{FF2B5EF4-FFF2-40B4-BE49-F238E27FC236}">
-                <a16:creationId xmlns="" xmlns:a16="http://schemas.microsoft.com/office/drawing/2014/main" id="{EA9A94D1-F9F6-4D7B-85E3-896A987B6A4D}"/>
+                <a16:creationId xmlns:a16="http://schemas.microsoft.com/office/drawing/2014/main" xmlns="" id="{EA9A94D1-F9F6-4D7B-85E3-896A987B6A4D}"/>
               </a:ext>
             </a:extLst>
           </p:cNvPr>
@@ -14104,7 +14104,7 @@
     </p:spTree>
     <p:extLst>
       <p:ext uri="{BB962C8B-B14F-4D97-AF65-F5344CB8AC3E}">
-        <p14:creationId xmlns="" xmlns:p14="http://schemas.microsoft.com/office/powerpoint/2010/main" val="3044033461"/>
+        <p14:creationId xmlns:p14="http://schemas.microsoft.com/office/powerpoint/2010/main" xmlns="" val="3044033461"/>
       </p:ext>
     </p:extLst>
   </p:cSld>
@@ -14112,7 +14112,7 @@
     <a:masterClrMapping/>
   </p:clrMapOvr>
   <mc:AlternateContent xmlns:mc="http://schemas.openxmlformats.org/markup-compatibility/2006">
-    <mc:Choice xmlns="" xmlns:p14="http://schemas.microsoft.com/office/powerpoint/2010/main" Requires="p14">
+    <mc:Choice xmlns:p14="http://schemas.microsoft.com/office/powerpoint/2010/main" xmlns="" Requires="p14">
       <p:transition spd="slow" p14:dur="2000" advClick="0" advTm="5000"/>
     </mc:Choice>
     <mc:Fallback>
@@ -14121,7 +14121,7 @@
   </mc:AlternateContent>
   <p:extLst>
     <p:ext uri="{DCECCB84-F9BA-43D5-87BE-67443E8EF086}">
-      <p15:sldGuideLst xmlns="" xmlns:p15="http://schemas.microsoft.com/office/powerpoint/2012/main">
+      <p15:sldGuideLst xmlns:p15="http://schemas.microsoft.com/office/powerpoint/2012/main" xmlns="">
         <p15:guide id="1" orient="horz" pos="2160">
           <p15:clr>
             <a:srgbClr val="FBAE40"/>
@@ -14168,7 +14168,7 @@
           <p:cNvPr id="4" name="Picture Background" descr="SoftUni Background">
             <a:extLst>
               <a:ext uri="{FF2B5EF4-FFF2-40B4-BE49-F238E27FC236}">
-                <a16:creationId xmlns="" xmlns:a16="http://schemas.microsoft.com/office/drawing/2014/main" id="{5BE90A63-DDD9-4B3B-A234-DF69B9BC812F}"/>
+                <a16:creationId xmlns:a16="http://schemas.microsoft.com/office/drawing/2014/main" xmlns="" id="{5BE90A63-DDD9-4B3B-A234-DF69B9BC812F}"/>
               </a:ext>
             </a:extLst>
           </p:cNvPr>
@@ -14197,7 +14197,7 @@
           <p:cNvPr id="11" name="Slide Body Text">
             <a:extLst>
               <a:ext uri="{FF2B5EF4-FFF2-40B4-BE49-F238E27FC236}">
-                <a16:creationId xmlns="" xmlns:a16="http://schemas.microsoft.com/office/drawing/2014/main" id="{90CBFB32-9F46-4F2F-8A54-9EE8BED27855}"/>
+                <a16:creationId xmlns:a16="http://schemas.microsoft.com/office/drawing/2014/main" xmlns="" id="{90CBFB32-9F46-4F2F-8A54-9EE8BED27855}"/>
               </a:ext>
             </a:extLst>
           </p:cNvPr>
@@ -14265,7 +14265,7 @@
           <p:cNvPr id="10" name="Slide Title">
             <a:extLst>
               <a:ext uri="{FF2B5EF4-FFF2-40B4-BE49-F238E27FC236}">
-                <a16:creationId xmlns="" xmlns:a16="http://schemas.microsoft.com/office/drawing/2014/main" id="{B770C392-3003-4C35-9625-BB041F8257BA}"/>
+                <a16:creationId xmlns:a16="http://schemas.microsoft.com/office/drawing/2014/main" xmlns="" id="{B770C392-3003-4C35-9625-BB041F8257BA}"/>
               </a:ext>
             </a:extLst>
           </p:cNvPr>
@@ -14302,7 +14302,7 @@
     </p:spTree>
     <p:extLst>
       <p:ext uri="{BB962C8B-B14F-4D97-AF65-F5344CB8AC3E}">
-        <p14:creationId xmlns="" xmlns:p14="http://schemas.microsoft.com/office/powerpoint/2010/main" val="156789181"/>
+        <p14:creationId xmlns:p14="http://schemas.microsoft.com/office/powerpoint/2010/main" xmlns="" val="156789181"/>
       </p:ext>
     </p:extLst>
   </p:cSld>
@@ -14326,7 +14326,7 @@
     <p:sldLayoutId id="2147483696" r:id="rId16"/>
   </p:sldLayoutIdLst>
   <mc:AlternateContent xmlns:mc="http://schemas.openxmlformats.org/markup-compatibility/2006">
-    <mc:Choice xmlns="" xmlns:p14="http://schemas.microsoft.com/office/powerpoint/2010/main" Requires="p14">
+    <mc:Choice xmlns:p14="http://schemas.microsoft.com/office/powerpoint/2010/main" xmlns="" Requires="p14">
       <p:transition spd="slow" p14:dur="2000" advClick="0" advTm="5000"/>
     </mc:Choice>
     <mc:Fallback>
@@ -14616,7 +14616,7 @@
   </p:txStyles>
   <p:extLst>
     <p:ext uri="{27BBF7A9-308A-43DC-89C8-2F10F3537804}">
-      <p15:sldGuideLst xmlns="" xmlns:p15="http://schemas.microsoft.com/office/powerpoint/2012/main">
+      <p15:sldGuideLst xmlns:p15="http://schemas.microsoft.com/office/powerpoint/2012/main" xmlns="">
         <p15:guide id="1" orient="horz" pos="2160">
           <p15:clr>
             <a:srgbClr val="F26B43"/>
@@ -14712,7 +14712,7 @@
           <p:cNvPr id="10" name="Author Position">
             <a:extLst>
               <a:ext uri="{FF2B5EF4-FFF2-40B4-BE49-F238E27FC236}">
-                <a16:creationId xmlns="" xmlns:a16="http://schemas.microsoft.com/office/drawing/2014/main" id="{F585BC4C-0F13-4FD4-8F23-99FD46618370}"/>
+                <a16:creationId xmlns:a16="http://schemas.microsoft.com/office/drawing/2014/main" xmlns="" id="{F585BC4C-0F13-4FD4-8F23-99FD46618370}"/>
               </a:ext>
             </a:extLst>
           </p:cNvPr>
@@ -14745,7 +14745,7 @@
           <p:cNvPr id="9" name="Author Name">
             <a:extLst>
               <a:ext uri="{FF2B5EF4-FFF2-40B4-BE49-F238E27FC236}">
-                <a16:creationId xmlns="" xmlns:a16="http://schemas.microsoft.com/office/drawing/2014/main" id="{FA396BB6-2053-4690-9672-BC528007D370}"/>
+                <a16:creationId xmlns:a16="http://schemas.microsoft.com/office/drawing/2014/main" xmlns="" id="{FA396BB6-2053-4690-9672-BC528007D370}"/>
               </a:ext>
             </a:extLst>
           </p:cNvPr>
@@ -14778,7 +14778,7 @@
           <p:cNvPr id="3" name="Presentation Subtitle">
             <a:extLst>
               <a:ext uri="{FF2B5EF4-FFF2-40B4-BE49-F238E27FC236}">
-                <a16:creationId xmlns="" xmlns:a16="http://schemas.microsoft.com/office/drawing/2014/main" id="{A004DC04-DA2A-41C0-8578-4B8D2F08EA7D}"/>
+                <a16:creationId xmlns:a16="http://schemas.microsoft.com/office/drawing/2014/main" xmlns="" id="{A004DC04-DA2A-41C0-8578-4B8D2F08EA7D}"/>
               </a:ext>
             </a:extLst>
           </p:cNvPr>
@@ -14803,15 +14803,7 @@
           <a:p>
             <a:r>
               <a:rPr lang="bg-BG" dirty="0" smtClean="0"/>
-              <a:t>Използване на </a:t>
-            </a:r>
-            <a:r>
-              <a:rPr lang="bg-BG" dirty="0" smtClean="0"/>
-              <a:t>агрегатни функции</a:t>
-            </a:r>
-            <a:r>
-              <a:rPr lang="bg-BG" dirty="0" smtClean="0"/>
-              <a:t>. </a:t>
+              <a:t>Използване на агрегатни функции. </a:t>
             </a:r>
             <a:r>
               <a:rPr lang="en-US" dirty="0" smtClean="0"/>
@@ -14834,7 +14826,7 @@
           <p:cNvPr id="16" name="Title 15">
             <a:extLst>
               <a:ext uri="{FF2B5EF4-FFF2-40B4-BE49-F238E27FC236}">
-                <a16:creationId xmlns="" xmlns:a16="http://schemas.microsoft.com/office/drawing/2014/main" id="{09D526E5-16F9-CDC3-F025-1D308EB5C234}"/>
+                <a16:creationId xmlns:a16="http://schemas.microsoft.com/office/drawing/2014/main" xmlns="" id="{09D526E5-16F9-CDC3-F025-1D308EB5C234}"/>
               </a:ext>
             </a:extLst>
           </p:cNvPr>
@@ -14894,7 +14886,7 @@
     </p:spTree>
     <p:extLst>
       <p:ext uri="{BB962C8B-B14F-4D97-AF65-F5344CB8AC3E}">
-        <p14:creationId xmlns="" xmlns:p14="http://schemas.microsoft.com/office/powerpoint/2010/main" val="3666405375"/>
+        <p14:creationId xmlns:p14="http://schemas.microsoft.com/office/powerpoint/2010/main" xmlns="" val="3666405375"/>
       </p:ext>
     </p:extLst>
   </p:cSld>
@@ -14902,7 +14894,7 @@
     <a:masterClrMapping/>
   </p:clrMapOvr>
   <mc:AlternateContent xmlns:mc="http://schemas.openxmlformats.org/markup-compatibility/2006">
-    <mc:Choice xmlns="" xmlns:p14="http://schemas.microsoft.com/office/powerpoint/2010/main" Requires="p14">
+    <mc:Choice xmlns:p14="http://schemas.microsoft.com/office/powerpoint/2010/main" xmlns="" Requires="p14">
       <p:transition spd="slow" p14:dur="2000" advClick="0" advTm="5000"/>
     </mc:Choice>
     <mc:Fallback>
@@ -15521,7 +15513,7 @@
           <p:nvPr>
             <p:extLst>
               <p:ext uri="{D42A27DB-BD31-4B8C-83A1-F6EECF244321}">
-                <p14:modId xmlns:p14="http://schemas.microsoft.com/office/powerpoint/2010/main" xmlns="" val="3350237647"/>
+                <p14:modId xmlns="" xmlns:p14="http://schemas.microsoft.com/office/powerpoint/2010/main" val="3350237647"/>
               </p:ext>
             </p:extLst>
           </p:nvPr>
@@ -17125,7 +17117,7 @@
     </p:spTree>
     <p:extLst>
       <p:ext uri="{BB962C8B-B14F-4D97-AF65-F5344CB8AC3E}">
-        <p14:creationId xmlns:p14="http://schemas.microsoft.com/office/powerpoint/2010/main" xmlns="" val="942626516"/>
+        <p14:creationId xmlns="" xmlns:p14="http://schemas.microsoft.com/office/powerpoint/2010/main" val="942626516"/>
       </p:ext>
     </p:extLst>
   </p:cSld>
@@ -17314,7 +17306,7 @@
     <a:masterClrMapping/>
   </p:clrMapOvr>
   <mc:AlternateContent xmlns:mc="http://schemas.openxmlformats.org/markup-compatibility/2006">
-    <mc:Choice xmlns="" xmlns:p14="http://schemas.microsoft.com/office/powerpoint/2010/main" Requires="p14">
+    <mc:Choice xmlns:p14="http://schemas.microsoft.com/office/powerpoint/2010/main" xmlns="" Requires="p14">
       <p:transition spd="slow" p14:dur="2000" advClick="0" advTm="5000"/>
     </mc:Choice>
     <mc:Fallback>
@@ -17360,7 +17352,7 @@
           <a:blip r:embed="rId3" cstate="screen">
             <a:extLst>
               <a:ext uri="{28A0092B-C50C-407E-A947-70E740481C1C}">
-                <a14:useLocalDpi xmlns:a14="http://schemas.microsoft.com/office/drawing/2010/main" xmlns="" val="0"/>
+                <a14:useLocalDpi xmlns="" xmlns:a14="http://schemas.microsoft.com/office/drawing/2010/main" val="0"/>
               </a:ext>
             </a:extLst>
           </a:blip>
@@ -17887,7 +17879,7 @@
           <p:nvPr>
             <p:extLst>
               <p:ext uri="{D42A27DB-BD31-4B8C-83A1-F6EECF244321}">
-                <p14:modId xmlns:p14="http://schemas.microsoft.com/office/powerpoint/2010/main" xmlns="" val="2858983544"/>
+                <p14:modId xmlns="" xmlns:p14="http://schemas.microsoft.com/office/powerpoint/2010/main" val="2858983544"/>
               </p:ext>
             </p:extLst>
           </p:nvPr>
@@ -20559,7 +20551,7 @@
           <p:nvPr>
             <p:extLst>
               <p:ext uri="{D42A27DB-BD31-4B8C-83A1-F6EECF244321}">
-                <p14:modId xmlns:p14="http://schemas.microsoft.com/office/powerpoint/2010/main" xmlns="" val="4057588850"/>
+                <p14:modId xmlns="" xmlns:p14="http://schemas.microsoft.com/office/powerpoint/2010/main" val="4057588850"/>
               </p:ext>
             </p:extLst>
           </p:nvPr>
@@ -21733,7 +21725,7 @@
     </p:spTree>
     <p:extLst>
       <p:ext uri="{BB962C8B-B14F-4D97-AF65-F5344CB8AC3E}">
-        <p14:creationId xmlns:p14="http://schemas.microsoft.com/office/powerpoint/2010/main" xmlns="" val="2655645643"/>
+        <p14:creationId xmlns="" xmlns:p14="http://schemas.microsoft.com/office/powerpoint/2010/main" val="2655645643"/>
       </p:ext>
     </p:extLst>
   </p:cSld>
@@ -21881,6 +21873,7 @@
                 <a:solidFill>
                   <a:schemeClr val="bg1"/>
                 </a:solidFill>
+                <a:latin typeface="Consolas" pitchFamily="49" charset="0"/>
               </a:rPr>
               <a:t> </a:t>
             </a:r>
@@ -21903,6 +21896,7 @@
                 <a:solidFill>
                   <a:schemeClr val="bg1"/>
                 </a:solidFill>
+                <a:latin typeface="Consolas" pitchFamily="49" charset="0"/>
               </a:rPr>
               <a:t> </a:t>
             </a:r>
@@ -22607,7 +22601,7 @@
     </p:spTree>
     <p:extLst>
       <p:ext uri="{BB962C8B-B14F-4D97-AF65-F5344CB8AC3E}">
-        <p14:creationId xmlns:p14="http://schemas.microsoft.com/office/powerpoint/2010/main" xmlns="" val="4294781664"/>
+        <p14:creationId xmlns="" xmlns:p14="http://schemas.microsoft.com/office/powerpoint/2010/main" val="4294781664"/>
       </p:ext>
     </p:extLst>
   </p:cSld>
@@ -22942,18 +22936,28 @@
               <a:t>Колоната след </a:t>
             </a:r>
             <a:r>
+              <a:rPr lang="ru-RU" b="1" dirty="0" smtClean="0">
+                <a:latin typeface="Consolas" pitchFamily="49" charset="0"/>
+              </a:rPr>
+              <a:t>GROUP BY</a:t>
+            </a:r>
+            <a:r>
               <a:rPr lang="ru-RU" b="1" dirty="0" smtClean="0"/>
-              <a:t>GROUP BY </a:t>
+              <a:t> </a:t>
             </a:r>
             <a:r>
               <a:rPr lang="ru-RU" dirty="0" smtClean="0"/>
               <a:t>не е задължително да бъде в списъка </a:t>
             </a:r>
             <a:r>
-              <a:rPr lang="ru-RU" b="1" dirty="0" smtClean="0"/>
+              <a:rPr lang="ru-RU" b="1" dirty="0" smtClean="0">
+                <a:latin typeface="Consolas" pitchFamily="49" charset="0"/>
+              </a:rPr>
               <a:t>SELECT</a:t>
             </a:r>
-            <a:endParaRPr lang="bg-BG" b="1" dirty="0"/>
+            <a:endParaRPr lang="bg-BG" b="1" dirty="0">
+              <a:latin typeface="Consolas" pitchFamily="49" charset="0"/>
+            </a:endParaRPr>
           </a:p>
         </p:txBody>
       </p:sp>
@@ -23145,7 +23149,7 @@
           <p:nvPr>
             <p:extLst>
               <p:ext uri="{D42A27DB-BD31-4B8C-83A1-F6EECF244321}">
-                <p14:modId xmlns:p14="http://schemas.microsoft.com/office/powerpoint/2010/main" xmlns="" val="2744259469"/>
+                <p14:modId xmlns="" xmlns:p14="http://schemas.microsoft.com/office/powerpoint/2010/main" val="2744259469"/>
               </p:ext>
             </p:extLst>
           </p:nvPr>
@@ -24151,7 +24155,7 @@
     </p:spTree>
     <p:extLst>
       <p:ext uri="{BB962C8B-B14F-4D97-AF65-F5344CB8AC3E}">
-        <p14:creationId xmlns:p14="http://schemas.microsoft.com/office/powerpoint/2010/main" xmlns="" val="1279716696"/>
+        <p14:creationId xmlns="" xmlns:p14="http://schemas.microsoft.com/office/powerpoint/2010/main" val="1279716696"/>
       </p:ext>
     </p:extLst>
   </p:cSld>
@@ -24315,7 +24319,7 @@
           <a:blip r:embed="rId3" cstate="screen">
             <a:extLst>
               <a:ext uri="{28A0092B-C50C-407E-A947-70E740481C1C}">
-                <a14:useLocalDpi xmlns:a14="http://schemas.microsoft.com/office/drawing/2010/main" xmlns="" val="0"/>
+                <a14:useLocalDpi xmlns="" xmlns:a14="http://schemas.microsoft.com/office/drawing/2010/main" val="0"/>
               </a:ext>
             </a:extLst>
           </a:blip>
@@ -24963,7 +24967,7 @@
           <p:nvPr>
             <p:extLst>
               <p:ext uri="{D42A27DB-BD31-4B8C-83A1-F6EECF244321}">
-                <p14:modId xmlns:p14="http://schemas.microsoft.com/office/powerpoint/2010/main" xmlns="" val="568675682"/>
+                <p14:modId xmlns="" xmlns:p14="http://schemas.microsoft.com/office/powerpoint/2010/main" val="568675682"/>
               </p:ext>
             </p:extLst>
           </p:nvPr>
@@ -28008,7 +28012,7 @@
           <p:nvPr>
             <p:extLst>
               <p:ext uri="{D42A27DB-BD31-4B8C-83A1-F6EECF244321}">
-                <p14:modId xmlns:p14="http://schemas.microsoft.com/office/powerpoint/2010/main" xmlns="" val="1123242572"/>
+                <p14:modId xmlns="" xmlns:p14="http://schemas.microsoft.com/office/powerpoint/2010/main" val="1123242572"/>
               </p:ext>
             </p:extLst>
           </p:nvPr>
@@ -30171,7 +30175,7 @@
     </p:spTree>
     <p:extLst>
       <p:ext uri="{BB962C8B-B14F-4D97-AF65-F5344CB8AC3E}">
-        <p14:creationId xmlns:p14="http://schemas.microsoft.com/office/powerpoint/2010/main" xmlns="" val="4087006741"/>
+        <p14:creationId xmlns="" xmlns:p14="http://schemas.microsoft.com/office/powerpoint/2010/main" val="4087006741"/>
       </p:ext>
     </p:extLst>
   </p:cSld>
@@ -30469,7 +30473,7 @@
           <p:nvPr>
             <p:extLst>
               <p:ext uri="{D42A27DB-BD31-4B8C-83A1-F6EECF244321}">
-                <p14:modId xmlns:p14="http://schemas.microsoft.com/office/powerpoint/2010/main" xmlns="" val="2432766786"/>
+                <p14:modId xmlns="" xmlns:p14="http://schemas.microsoft.com/office/powerpoint/2010/main" val="2432766786"/>
               </p:ext>
             </p:extLst>
           </p:nvPr>
@@ -32835,7 +32839,7 @@
     </p:spTree>
     <p:extLst>
       <p:ext uri="{BB962C8B-B14F-4D97-AF65-F5344CB8AC3E}">
-        <p14:creationId xmlns:p14="http://schemas.microsoft.com/office/powerpoint/2010/main" xmlns="" val="4272246455"/>
+        <p14:creationId xmlns="" xmlns:p14="http://schemas.microsoft.com/office/powerpoint/2010/main" val="4272246455"/>
       </p:ext>
     </p:extLst>
   </p:cSld>
@@ -33010,7 +33014,9 @@
               <a:t>Неправилен </a:t>
             </a:r>
             <a:r>
-              <a:rPr lang="en-US" b="1" dirty="0" smtClean="0"/>
+              <a:rPr lang="en-US" b="1" dirty="0" smtClean="0">
+                <a:latin typeface="Consolas" pitchFamily="49" charset="0"/>
+              </a:rPr>
               <a:t>SELECT</a:t>
             </a:r>
             <a:r>
@@ -33083,6 +33089,7 @@
                 <a:solidFill>
                   <a:schemeClr val="bg1"/>
                 </a:solidFill>
+                <a:latin typeface="Consolas" pitchFamily="49" charset="0"/>
               </a:rPr>
               <a:t>GROUP BY</a:t>
             </a:r>
@@ -33090,6 +33097,7 @@
               <a:solidFill>
                 <a:schemeClr val="bg1"/>
               </a:solidFill>
+              <a:latin typeface="Consolas" pitchFamily="49" charset="0"/>
             </a:endParaRPr>
           </a:p>
           <a:p>
@@ -33103,7 +33111,9 @@
               <a:t>Този </a:t>
             </a:r>
             <a:r>
-              <a:rPr lang="en-US" b="1" dirty="0" smtClean="0"/>
+              <a:rPr lang="en-US" b="1" dirty="0" smtClean="0">
+                <a:latin typeface="Consolas" pitchFamily="49" charset="0"/>
+              </a:rPr>
               <a:t>SELECT</a:t>
             </a:r>
             <a:r>
@@ -33142,6 +33152,7 @@
                 <a:solidFill>
                   <a:schemeClr val="bg1"/>
                 </a:solidFill>
+                <a:latin typeface="Consolas" pitchFamily="49" charset="0"/>
               </a:rPr>
               <a:t>WHERE</a:t>
             </a:r>
@@ -33191,7 +33202,7 @@
         <p:spPr bwMode="auto">
           <a:xfrm>
             <a:off x="913055" y="1860465"/>
-            <a:ext cx="7849946" cy="400110"/>
+            <a:ext cx="8535746" cy="430887"/>
           </a:xfrm>
           <a:prstGeom prst="rect">
             <a:avLst/>
@@ -33228,7 +33239,7 @@
               <a:buSzPct val="70000"/>
             </a:pPr>
             <a:r>
-              <a:rPr lang="en-US" sz="2000" b="1" noProof="1">
+              <a:rPr lang="en-US" sz="2200" b="1" noProof="1">
                 <a:solidFill>
                   <a:schemeClr val="bg1"/>
                 </a:solidFill>
@@ -33238,7 +33249,7 @@
               <a:t>SELECT</a:t>
             </a:r>
             <a:r>
-              <a:rPr lang="en-US" sz="2000" b="1" noProof="1">
+              <a:rPr lang="en-US" sz="2200" b="1" noProof="1">
                 <a:solidFill>
                   <a:srgbClr val="224464"/>
                 </a:solidFill>
@@ -33248,7 +33259,7 @@
               <a:t> DepartmentID, </a:t>
             </a:r>
             <a:r>
-              <a:rPr lang="en-US" sz="2000" b="1" noProof="1" smtClean="0">
+              <a:rPr lang="en-US" sz="2200" b="1" noProof="1" smtClean="0">
                 <a:solidFill>
                   <a:srgbClr val="FF0000"/>
                 </a:solidFill>
@@ -33258,7 +33269,7 @@
               <a:t>COUNT</a:t>
             </a:r>
             <a:r>
-              <a:rPr lang="en-US" sz="2000" b="1" noProof="1" smtClean="0">
+              <a:rPr lang="en-US" sz="2200" b="1" noProof="1" smtClean="0">
                 <a:solidFill>
                   <a:srgbClr val="224464"/>
                 </a:solidFill>
@@ -33268,7 +33279,7 @@
               <a:t>(LastName) </a:t>
             </a:r>
             <a:r>
-              <a:rPr lang="en-US" sz="2000" b="1" noProof="1" smtClean="0">
+              <a:rPr lang="en-US" sz="2200" b="1" noProof="1" smtClean="0">
                 <a:solidFill>
                   <a:schemeClr val="bg1"/>
                 </a:solidFill>
@@ -33278,7 +33289,7 @@
               <a:t>FROM</a:t>
             </a:r>
             <a:r>
-              <a:rPr lang="en-US" sz="2000" b="1" noProof="1" smtClean="0">
+              <a:rPr lang="en-US" sz="2200" b="1" noProof="1" smtClean="0">
                 <a:solidFill>
                   <a:srgbClr val="224464"/>
                 </a:solidFill>
@@ -33288,7 +33299,7 @@
               <a:t> </a:t>
             </a:r>
             <a:r>
-              <a:rPr lang="en-US" sz="2000" b="1" noProof="1">
+              <a:rPr lang="en-US" sz="2200" b="1" noProof="1">
                 <a:solidFill>
                   <a:srgbClr val="224464"/>
                 </a:solidFill>
@@ -33310,8 +33321,8 @@
         </p:nvSpPr>
         <p:spPr bwMode="auto">
           <a:xfrm>
-            <a:off x="913055" y="4392304"/>
-            <a:ext cx="7849945" cy="1323439"/>
+            <a:off x="913055" y="4343400"/>
+            <a:ext cx="7849945" cy="1446550"/>
           </a:xfrm>
           <a:prstGeom prst="rect">
             <a:avLst/>
@@ -33348,7 +33359,7 @@
               <a:buSzPct val="70000"/>
             </a:pPr>
             <a:r>
-              <a:rPr lang="en-US" sz="2000" b="1" noProof="1">
+              <a:rPr lang="en-US" sz="2200" b="1" noProof="1">
                 <a:solidFill>
                   <a:schemeClr val="bg1"/>
                 </a:solidFill>
@@ -33358,7 +33369,7 @@
               <a:t>SELECT </a:t>
             </a:r>
             <a:r>
-              <a:rPr lang="en-US" sz="2000" b="1" noProof="1">
+              <a:rPr lang="en-US" sz="2200" b="1" noProof="1">
                 <a:solidFill>
                   <a:srgbClr val="224464"/>
                 </a:solidFill>
@@ -33379,7 +33390,7 @@
               <a:buSzPct val="70000"/>
             </a:pPr>
             <a:r>
-              <a:rPr lang="en-US" sz="2000" b="1" noProof="1">
+              <a:rPr lang="en-US" sz="2200" b="1" noProof="1">
                 <a:solidFill>
                   <a:schemeClr val="bg1"/>
                 </a:solidFill>
@@ -33389,7 +33400,7 @@
               <a:t>FROM </a:t>
             </a:r>
             <a:r>
-              <a:rPr lang="en-US" sz="2000" b="1" noProof="1">
+              <a:rPr lang="en-US" sz="2200" b="1" noProof="1">
                 <a:solidFill>
                   <a:srgbClr val="224464"/>
                 </a:solidFill>
@@ -33410,7 +33421,7 @@
               <a:buSzPct val="70000"/>
             </a:pPr>
             <a:r>
-              <a:rPr lang="en-US" sz="2000" b="1" noProof="1">
+              <a:rPr lang="en-US" sz="2200" b="1" noProof="1">
                 <a:solidFill>
                   <a:srgbClr val="FF0000"/>
                 </a:solidFill>
@@ -33420,7 +33431,7 @@
               <a:t>WHERE</a:t>
             </a:r>
             <a:r>
-              <a:rPr lang="en-US" sz="2000" b="1" noProof="1">
+              <a:rPr lang="en-US" sz="2200" b="1" noProof="1">
                 <a:solidFill>
                   <a:schemeClr val="bg1"/>
                 </a:solidFill>
@@ -33430,7 +33441,7 @@
               <a:t> </a:t>
             </a:r>
             <a:r>
-              <a:rPr lang="en-US" sz="2000" b="1" noProof="1">
+              <a:rPr lang="en-US" sz="2200" b="1" noProof="1">
                 <a:solidFill>
                   <a:srgbClr val="224464"/>
                 </a:solidFill>
@@ -33451,7 +33462,7 @@
               <a:buSzPct val="70000"/>
             </a:pPr>
             <a:r>
-              <a:rPr lang="en-US" sz="2000" b="1" noProof="1">
+              <a:rPr lang="en-US" sz="2200" b="1" noProof="1">
                 <a:solidFill>
                   <a:schemeClr val="bg1"/>
                 </a:solidFill>
@@ -33461,15 +33472,32 @@
               <a:t>GROUP BY</a:t>
             </a:r>
             <a:r>
-              <a:rPr lang="en-US" sz="2000" b="1" noProof="1">
+              <a:rPr lang="en-US" sz="2200" b="1" noProof="1">
                 <a:solidFill>
                   <a:srgbClr val="224464"/>
                 </a:solidFill>
                 <a:latin typeface="Consolas" pitchFamily="49" charset="0"/>
                 <a:cs typeface="Consolas" pitchFamily="49" charset="0"/>
               </a:rPr>
-              <a:t> DepartmentID</a:t>
-            </a:r>
+              <a:t> </a:t>
+            </a:r>
+            <a:r>
+              <a:rPr lang="en-US" sz="2200" b="1" noProof="1" smtClean="0">
+                <a:solidFill>
+                  <a:srgbClr val="224464"/>
+                </a:solidFill>
+                <a:latin typeface="Consolas" pitchFamily="49" charset="0"/>
+                <a:cs typeface="Consolas" pitchFamily="49" charset="0"/>
+              </a:rPr>
+              <a:t>DepartmentID</a:t>
+            </a:r>
+            <a:endParaRPr lang="en-US" sz="2200" b="1" noProof="1">
+              <a:solidFill>
+                <a:srgbClr val="224464"/>
+              </a:solidFill>
+              <a:latin typeface="Consolas" pitchFamily="49" charset="0"/>
+              <a:cs typeface="Consolas" pitchFamily="49" charset="0"/>
+            </a:endParaRPr>
           </a:p>
         </p:txBody>
       </p:sp>
@@ -33485,7 +33513,7 @@
           <a:blip r:embed="rId3" cstate="print">
             <a:extLst>
               <a:ext uri="{28A0092B-C50C-407E-A947-70E740481C1C}">
-                <a14:useLocalDpi xmlns:a14="http://schemas.microsoft.com/office/drawing/2010/main" xmlns="" val="0"/>
+                <a14:useLocalDpi xmlns="" xmlns:a14="http://schemas.microsoft.com/office/drawing/2010/main" val="0"/>
               </a:ext>
             </a:extLst>
           </a:blip>
@@ -33505,7 +33533,7 @@
           <a:noFill/>
           <a:extLst>
             <a:ext uri="{909E8E84-426E-40DD-AFC4-6F175D3DCCD1}">
-              <a14:hiddenFill xmlns:a14="http://schemas.microsoft.com/office/drawing/2010/main" xmlns="">
+              <a14:hiddenFill xmlns="" xmlns:a14="http://schemas.microsoft.com/office/drawing/2010/main">
                 <a:solidFill>
                   <a:srgbClr val="FFFFFF"/>
                 </a:solidFill>
@@ -33526,7 +33554,7 @@
           <a:blip r:embed="rId3" cstate="print">
             <a:extLst>
               <a:ext uri="{28A0092B-C50C-407E-A947-70E740481C1C}">
-                <a14:useLocalDpi xmlns:a14="http://schemas.microsoft.com/office/drawing/2010/main" xmlns="" val="0"/>
+                <a14:useLocalDpi xmlns="" xmlns:a14="http://schemas.microsoft.com/office/drawing/2010/main" val="0"/>
               </a:ext>
             </a:extLst>
           </a:blip>
@@ -33546,7 +33574,7 @@
           <a:noFill/>
           <a:extLst>
             <a:ext uri="{909E8E84-426E-40DD-AFC4-6F175D3DCCD1}">
-              <a14:hiddenFill xmlns:a14="http://schemas.microsoft.com/office/drawing/2010/main" xmlns="">
+              <a14:hiddenFill xmlns="" xmlns:a14="http://schemas.microsoft.com/office/drawing/2010/main">
                 <a:solidFill>
                   <a:srgbClr val="FFFFFF"/>
                 </a:solidFill>
@@ -33558,7 +33586,7 @@
     </p:spTree>
     <p:extLst>
       <p:ext uri="{BB962C8B-B14F-4D97-AF65-F5344CB8AC3E}">
-        <p14:creationId xmlns:p14="http://schemas.microsoft.com/office/powerpoint/2010/main" xmlns="" val="3942513270"/>
+        <p14:creationId xmlns="" xmlns:p14="http://schemas.microsoft.com/office/powerpoint/2010/main" val="3942513270"/>
       </p:ext>
     </p:extLst>
   </p:cSld>
@@ -33893,6 +33921,7 @@
                 <a:solidFill>
                   <a:schemeClr val="bg1"/>
                 </a:solidFill>
+                <a:latin typeface="Consolas" pitchFamily="49" charset="0"/>
               </a:rPr>
               <a:t>GROUP BY </a:t>
             </a:r>
@@ -33957,7 +33986,9 @@
               <a:t>Колони, които не са посочени в </a:t>
             </a:r>
             <a:r>
-              <a:rPr lang="ru-RU" b="1" dirty="0" smtClean="0"/>
+              <a:rPr lang="ru-RU" b="1" dirty="0" smtClean="0">
+                <a:latin typeface="Consolas" pitchFamily="49" charset="0"/>
+              </a:rPr>
               <a:t>GROUP BY</a:t>
             </a:r>
             <a:r>
@@ -33989,7 +34020,9 @@
               <a:t>върху колоните в клаузата </a:t>
             </a:r>
             <a:r>
-              <a:rPr lang="ru-RU" b="1" dirty="0" smtClean="0"/>
+              <a:rPr lang="ru-RU" b="1" dirty="0" smtClean="0">
+                <a:latin typeface="Consolas" pitchFamily="49" charset="0"/>
+              </a:rPr>
               <a:t>GROUP BY</a:t>
             </a:r>
             <a:r>
@@ -34231,7 +34264,7 @@
     </p:spTree>
     <p:extLst>
       <p:ext uri="{BB962C8B-B14F-4D97-AF65-F5344CB8AC3E}">
-        <p14:creationId xmlns:p14="http://schemas.microsoft.com/office/powerpoint/2010/main" xmlns="" val="3175537467"/>
+        <p14:creationId xmlns="" xmlns:p14="http://schemas.microsoft.com/office/powerpoint/2010/main" val="3175537467"/>
       </p:ext>
     </p:extLst>
   </p:cSld>
@@ -34459,6 +34492,7 @@
                     <a:lumMod val="75000"/>
                   </a:schemeClr>
                 </a:solidFill>
+                <a:latin typeface="Consolas" pitchFamily="49" charset="0"/>
               </a:rPr>
               <a:t>HAVING</a:t>
             </a:r>
@@ -34479,6 +34513,7 @@
                     <a:lumMod val="75000"/>
                   </a:schemeClr>
                 </a:solidFill>
+                <a:latin typeface="Consolas" pitchFamily="49" charset="0"/>
               </a:rPr>
               <a:t>WHERE</a:t>
             </a:r>
@@ -34769,7 +34804,7 @@
           <p:nvPr>
             <p:extLst>
               <p:ext uri="{D42A27DB-BD31-4B8C-83A1-F6EECF244321}">
-                <p14:modId xmlns:p14="http://schemas.microsoft.com/office/powerpoint/2010/main" xmlns="" val="3930977264"/>
+                <p14:modId xmlns="" xmlns:p14="http://schemas.microsoft.com/office/powerpoint/2010/main" val="3930977264"/>
               </p:ext>
             </p:extLst>
           </p:nvPr>
@@ -35972,7 +36007,7 @@
     </p:spTree>
     <p:extLst>
       <p:ext uri="{BB962C8B-B14F-4D97-AF65-F5344CB8AC3E}">
-        <p14:creationId xmlns:p14="http://schemas.microsoft.com/office/powerpoint/2010/main" xmlns="" val="3696409877"/>
+        <p14:creationId xmlns="" xmlns:p14="http://schemas.microsoft.com/office/powerpoint/2010/main" val="3696409877"/>
       </p:ext>
     </p:extLst>
   </p:cSld>
@@ -36080,7 +36115,7 @@
           <p:cNvPr id="5" name="Slide Number">
             <a:extLst>
               <a:ext uri="{FF2B5EF4-FFF2-40B4-BE49-F238E27FC236}">
-                <a16:creationId xmlns="" xmlns:a16="http://schemas.microsoft.com/office/drawing/2014/main" id="{6A760D59-0056-4F39-B077-DBDBE3D2927E}"/>
+                <a16:creationId xmlns:a16="http://schemas.microsoft.com/office/drawing/2014/main" xmlns="" id="{6A760D59-0056-4F39-B077-DBDBE3D2927E}"/>
               </a:ext>
             </a:extLst>
           </p:cNvPr>
@@ -36233,48 +36268,145 @@
             </a:r>
           </a:p>
           <a:p>
-            <a:pPr lvl="1"/>
-            <a:r>
-              <a:rPr lang="en-US" sz="3000" dirty="0" smtClean="0"/>
+            <a:pPr lvl="1">
+              <a:buClr>
+                <a:srgbClr val="224464"/>
+              </a:buClr>
+            </a:pPr>
+            <a:r>
+              <a:rPr lang="en-US" sz="3000" b="1" dirty="0" smtClean="0">
+                <a:solidFill>
+                  <a:schemeClr val="bg1"/>
+                </a:solidFill>
+                <a:latin typeface="Consolas" pitchFamily="49" charset="0"/>
+              </a:rPr>
               <a:t>COUNT</a:t>
             </a:r>
-            <a:endParaRPr lang="bg-BG" sz="3000" dirty="0" smtClean="0"/>
+            <a:endParaRPr lang="bg-BG" sz="3000" b="1" dirty="0" smtClean="0">
+              <a:solidFill>
+                <a:schemeClr val="bg1"/>
+              </a:solidFill>
+              <a:latin typeface="Consolas" pitchFamily="49" charset="0"/>
+            </a:endParaRPr>
           </a:p>
           <a:p>
-            <a:pPr lvl="1"/>
-            <a:r>
-              <a:rPr lang="en-US" sz="3000" dirty="0" smtClean="0"/>
+            <a:pPr lvl="1">
+              <a:buClr>
+                <a:srgbClr val="224464"/>
+              </a:buClr>
+            </a:pPr>
+            <a:r>
+              <a:rPr lang="en-US" sz="3000" b="1" dirty="0" smtClean="0">
+                <a:solidFill>
+                  <a:schemeClr val="bg1"/>
+                </a:solidFill>
+                <a:latin typeface="Consolas" pitchFamily="49" charset="0"/>
+              </a:rPr>
               <a:t>MIN</a:t>
             </a:r>
-            <a:endParaRPr lang="bg-BG" sz="3000" dirty="0" smtClean="0"/>
+            <a:endParaRPr lang="bg-BG" sz="3000" b="1" dirty="0" smtClean="0">
+              <a:solidFill>
+                <a:schemeClr val="bg1"/>
+              </a:solidFill>
+              <a:latin typeface="Consolas" pitchFamily="49" charset="0"/>
+            </a:endParaRPr>
           </a:p>
           <a:p>
-            <a:pPr lvl="1"/>
-            <a:r>
-              <a:rPr lang="en-US" sz="3000" dirty="0" smtClean="0"/>
+            <a:pPr lvl="1">
+              <a:buClr>
+                <a:srgbClr val="224464"/>
+              </a:buClr>
+            </a:pPr>
+            <a:r>
+              <a:rPr lang="en-US" sz="3000" b="1" dirty="0" smtClean="0">
+                <a:solidFill>
+                  <a:schemeClr val="bg1"/>
+                </a:solidFill>
+                <a:latin typeface="Consolas" pitchFamily="49" charset="0"/>
+              </a:rPr>
               <a:t>MAX</a:t>
             </a:r>
-            <a:endParaRPr lang="bg-BG" sz="3000" dirty="0" smtClean="0"/>
+            <a:endParaRPr lang="bg-BG" sz="3000" b="1" dirty="0" smtClean="0">
+              <a:solidFill>
+                <a:schemeClr val="bg1"/>
+              </a:solidFill>
+              <a:latin typeface="Consolas" pitchFamily="49" charset="0"/>
+            </a:endParaRPr>
           </a:p>
           <a:p>
-            <a:pPr lvl="1"/>
-            <a:r>
-              <a:rPr lang="en-US" sz="3000" dirty="0" smtClean="0"/>
+            <a:pPr lvl="1">
+              <a:buClr>
+                <a:srgbClr val="224464"/>
+              </a:buClr>
+            </a:pPr>
+            <a:r>
+              <a:rPr lang="en-US" sz="3000" b="1" dirty="0" smtClean="0">
+                <a:solidFill>
+                  <a:schemeClr val="bg1"/>
+                </a:solidFill>
+                <a:latin typeface="Consolas" pitchFamily="49" charset="0"/>
+              </a:rPr>
               <a:t>AVG</a:t>
             </a:r>
-            <a:endParaRPr lang="bg-BG" sz="3000" dirty="0" smtClean="0"/>
+            <a:endParaRPr lang="bg-BG" sz="3000" dirty="0" smtClean="0">
+              <a:solidFill>
+                <a:schemeClr val="bg1"/>
+              </a:solidFill>
+              <a:latin typeface="Consolas" pitchFamily="49" charset="0"/>
+            </a:endParaRPr>
           </a:p>
           <a:p>
-            <a:r>
-              <a:rPr lang="en-US" sz="3200" dirty="0" smtClean="0"/>
-              <a:t>GROUP BY </a:t>
+            <a:pPr>
+              <a:buClr>
+                <a:srgbClr val="224464"/>
+              </a:buClr>
+            </a:pPr>
+            <a:r>
+              <a:rPr lang="en-US" sz="3200" dirty="0" smtClean="0">
+                <a:solidFill>
+                  <a:schemeClr val="bg1"/>
+                </a:solidFill>
+                <a:latin typeface="Consolas" pitchFamily="49" charset="0"/>
+              </a:rPr>
+              <a:t>GROUP</a:t>
+            </a:r>
+            <a:r>
+              <a:rPr lang="en-US" sz="3200" b="1" dirty="0" smtClean="0">
+                <a:solidFill>
+                  <a:schemeClr val="bg1"/>
+                </a:solidFill>
+                <a:latin typeface="Consolas" pitchFamily="49" charset="0"/>
+              </a:rPr>
+              <a:t> </a:t>
+            </a:r>
+            <a:r>
+              <a:rPr lang="en-US" sz="3200" b="1" dirty="0" smtClean="0">
+                <a:solidFill>
+                  <a:schemeClr val="bg1"/>
+                </a:solidFill>
+                <a:latin typeface="Consolas" pitchFamily="49" charset="0"/>
+              </a:rPr>
+              <a:t>BY</a:t>
+            </a:r>
+            <a:r>
+              <a:rPr lang="en-US" sz="3200" b="1" dirty="0" smtClean="0"/>
+              <a:t> </a:t>
             </a:r>
             <a:r>
               <a:rPr lang="bg-BG" sz="3200" dirty="0" smtClean="0"/>
-              <a:t>и </a:t>
-            </a:r>
-            <a:r>
-              <a:rPr lang="en-US" sz="3200" dirty="0" smtClean="0"/>
+              <a:t>и</a:t>
+            </a:r>
+            <a:r>
+              <a:rPr lang="bg-BG" sz="3200" b="1" dirty="0" smtClean="0"/>
+              <a:t> </a:t>
+            </a:r>
+            <a:r>
+              <a:rPr lang="en-US" sz="3200" b="1" dirty="0" smtClean="0">
+                <a:solidFill>
+                  <a:schemeClr val="bg1"/>
+                </a:solidFill>
+                <a:latin typeface="Consolas" pitchFamily="49" charset="0"/>
+              </a:rPr>
               <a:t>HAVING</a:t>
             </a:r>
           </a:p>
@@ -36310,7 +36442,7 @@
     </p:spTree>
     <p:extLst>
       <p:ext uri="{BB962C8B-B14F-4D97-AF65-F5344CB8AC3E}">
-        <p14:creationId xmlns="" xmlns:p14="http://schemas.microsoft.com/office/powerpoint/2010/main" val="1646986932"/>
+        <p14:creationId xmlns:p14="http://schemas.microsoft.com/office/powerpoint/2010/main" xmlns="" val="1646986932"/>
       </p:ext>
     </p:extLst>
   </p:cSld>
@@ -36318,7 +36450,7 @@
     <a:masterClrMapping/>
   </p:clrMapOvr>
   <mc:AlternateContent xmlns:mc="http://schemas.openxmlformats.org/markup-compatibility/2006">
-    <mc:Choice xmlns="" xmlns:p14="http://schemas.microsoft.com/office/powerpoint/2010/main" Requires="p14">
+    <mc:Choice xmlns:p14="http://schemas.microsoft.com/office/powerpoint/2010/main" xmlns="" Requires="p14">
       <p:transition spd="slow" p14:dur="2000" advClick="0" advTm="5000"/>
     </mc:Choice>
     <mc:Fallback>
@@ -37058,7 +37190,7 @@
           <p:nvPr>
             <p:extLst>
               <p:ext uri="{D42A27DB-BD31-4B8C-83A1-F6EECF244321}">
-                <p14:modId xmlns:p14="http://schemas.microsoft.com/office/powerpoint/2010/main" xmlns="" val="4288846276"/>
+                <p14:modId xmlns="" xmlns:p14="http://schemas.microsoft.com/office/powerpoint/2010/main" val="4288846276"/>
               </p:ext>
             </p:extLst>
           </p:nvPr>
@@ -37880,7 +38012,7 @@
     </p:spTree>
     <p:extLst>
       <p:ext uri="{BB962C8B-B14F-4D97-AF65-F5344CB8AC3E}">
-        <p14:creationId xmlns:p14="http://schemas.microsoft.com/office/powerpoint/2010/main" xmlns="" val="414466811"/>
+        <p14:creationId xmlns="" xmlns:p14="http://schemas.microsoft.com/office/powerpoint/2010/main" val="414466811"/>
       </p:ext>
     </p:extLst>
   </p:cSld>
@@ -37988,7 +38120,7 @@
           <p:cNvPr id="9" name="Summary Box Group">
             <a:extLst>
               <a:ext uri="{FF2B5EF4-FFF2-40B4-BE49-F238E27FC236}">
-                <a16:creationId xmlns="" xmlns:a16="http://schemas.microsoft.com/office/drawing/2014/main" id="{EBAFE522-EB7D-4931-A015-9A7E8A98517D}"/>
+                <a16:creationId xmlns:a16="http://schemas.microsoft.com/office/drawing/2014/main" xmlns="" id="{EBAFE522-EB7D-4931-A015-9A7E8A98517D}"/>
               </a:ext>
             </a:extLst>
           </p:cNvPr>
@@ -38008,7 +38140,7 @@
             <p:cNvPr id="10" name="Rounded Rectangle Blue">
               <a:extLst>
                 <a:ext uri="{FF2B5EF4-FFF2-40B4-BE49-F238E27FC236}">
-                  <a16:creationId xmlns="" xmlns:a16="http://schemas.microsoft.com/office/drawing/2014/main" id="{18F78F23-3D09-4B63-8DF9-D49CFBB145EE}"/>
+                  <a16:creationId xmlns:a16="http://schemas.microsoft.com/office/drawing/2014/main" xmlns="" id="{18F78F23-3D09-4B63-8DF9-D49CFBB145EE}"/>
                 </a:ext>
               </a:extLst>
             </p:cNvPr>
@@ -38062,7 +38194,7 @@
             <p:cNvPr id="11" name="Rounded Rectangle Left">
               <a:extLst>
                 <a:ext uri="{FF2B5EF4-FFF2-40B4-BE49-F238E27FC236}">
-                  <a16:creationId xmlns="" xmlns:a16="http://schemas.microsoft.com/office/drawing/2014/main" id="{F12C06CE-2BBE-46C2-B718-813794C58DF9}"/>
+                  <a16:creationId xmlns:a16="http://schemas.microsoft.com/office/drawing/2014/main" xmlns="" id="{F12C06CE-2BBE-46C2-B718-813794C58DF9}"/>
                 </a:ext>
               </a:extLst>
             </p:cNvPr>
@@ -38122,7 +38254,7 @@
             <p:cNvPr id="12" name="Half Frame Top Right">
               <a:extLst>
                 <a:ext uri="{FF2B5EF4-FFF2-40B4-BE49-F238E27FC236}">
-                  <a16:creationId xmlns="" xmlns:a16="http://schemas.microsoft.com/office/drawing/2014/main" id="{66CDBB1E-AF3C-43FC-9F34-2DD691F81726}"/>
+                  <a16:creationId xmlns:a16="http://schemas.microsoft.com/office/drawing/2014/main" xmlns="" id="{66CDBB1E-AF3C-43FC-9F34-2DD691F81726}"/>
                 </a:ext>
               </a:extLst>
             </p:cNvPr>
@@ -38184,7 +38316,7 @@
           <p:cNvPr id="14" name="Text Placeholder Body">
             <a:extLst>
               <a:ext uri="{FF2B5EF4-FFF2-40B4-BE49-F238E27FC236}">
-                <a16:creationId xmlns="" xmlns:a16="http://schemas.microsoft.com/office/drawing/2014/main" id="{0E49D336-45B6-44D3-97C4-E28F8DEA2022}"/>
+                <a16:creationId xmlns:a16="http://schemas.microsoft.com/office/drawing/2014/main" xmlns="" id="{0E49D336-45B6-44D3-97C4-E28F8DEA2022}"/>
               </a:ext>
             </a:extLst>
           </p:cNvPr>
@@ -38265,7 +38397,25 @@
               </a:buClr>
             </a:pPr>
             <a:r>
-              <a:rPr lang="en-US" sz="3200" b="1" dirty="0" smtClean="0">
+              <a:rPr lang="bg-BG" sz="3000" dirty="0" smtClean="0"/>
+              <a:t>Групиращи функции</a:t>
+            </a:r>
+            <a:endParaRPr lang="en-US" sz="3000" dirty="0" smtClean="0"/>
+          </a:p>
+          <a:p>
+            <a:pPr marL="969948" lvl="1" indent="-360000" fontAlgn="base">
+              <a:lnSpc>
+                <a:spcPct val="100000"/>
+              </a:lnSpc>
+              <a:spcAft>
+                <a:spcPts val="0"/>
+              </a:spcAft>
+              <a:buClr>
+                <a:schemeClr val="bg2"/>
+              </a:buClr>
+            </a:pPr>
+            <a:r>
+              <a:rPr lang="en-US" sz="2800" b="1" dirty="0" smtClean="0">
                 <a:solidFill>
                   <a:schemeClr val="bg1">
                     <a:lumMod val="60000"/>
@@ -38273,14 +38423,56 @@
                   </a:schemeClr>
                 </a:solidFill>
               </a:rPr>
-              <a:t>TODO</a:t>
-            </a:r>
-            <a:r>
-              <a:rPr lang="en-US" sz="3200" dirty="0" smtClean="0"/>
-              <a:t>:</a:t>
-            </a:r>
-            <a:r>
-              <a:rPr lang="en-US" sz="3200" b="1" dirty="0" smtClean="0">
+              <a:t>COUNT </a:t>
+            </a:r>
+            <a:r>
+              <a:rPr lang="bg-BG" sz="2800" dirty="0" smtClean="0">
+                <a:solidFill>
+                  <a:schemeClr val="bg2"/>
+                </a:solidFill>
+              </a:rPr>
+              <a:t>== </a:t>
+            </a:r>
+            <a:r>
+              <a:rPr lang="bg-BG" sz="2800" dirty="0" smtClean="0"/>
+              <a:t> </a:t>
+            </a:r>
+            <a:r>
+              <a:rPr lang="bg-BG" sz="2800" dirty="0" smtClean="0">
+                <a:solidFill>
+                  <a:schemeClr val="bg2"/>
+                </a:solidFill>
+              </a:rPr>
+              <a:t>брой </a:t>
+            </a:r>
+            <a:r>
+              <a:rPr lang="bg-BG" sz="2800" dirty="0" smtClean="0">
+                <a:solidFill>
+                  <a:schemeClr val="bg2"/>
+                </a:solidFill>
+              </a:rPr>
+              <a:t>на избраните редове</a:t>
+            </a:r>
+            <a:endParaRPr lang="en-US" sz="2800" dirty="0" smtClean="0">
+              <a:solidFill>
+                <a:schemeClr val="bg2"/>
+              </a:solidFill>
+            </a:endParaRPr>
+          </a:p>
+          <a:p>
+            <a:pPr marL="969948" lvl="1" indent="-360000" fontAlgn="base">
+              <a:lnSpc>
+                <a:spcPct val="100000"/>
+              </a:lnSpc>
+              <a:spcAft>
+                <a:spcPts val="0"/>
+              </a:spcAft>
+              <a:buClr>
+                <a:schemeClr val="bg2"/>
+              </a:buClr>
+            </a:pPr>
+            <a:r>
+              <a:rPr lang="en-US" sz="2800" b="1" dirty="0" smtClean="0">
                 <a:solidFill>
                   <a:schemeClr val="bg1">
                     <a:lumMod val="60000"/>
@@ -38288,12 +38480,290 @@
                   </a:schemeClr>
                 </a:solidFill>
               </a:rPr>
+              <a:t>SUM </a:t>
+            </a:r>
+            <a:r>
+              <a:rPr lang="bg-BG" sz="2800" dirty="0" smtClean="0">
+                <a:solidFill>
+                  <a:schemeClr val="bg2"/>
+                </a:solidFill>
+              </a:rPr>
+              <a:t>== </a:t>
+            </a:r>
+            <a:r>
+              <a:rPr lang="ru-RU" sz="2800" dirty="0" smtClean="0">
+                <a:solidFill>
+                  <a:schemeClr val="bg2"/>
+                </a:solidFill>
+              </a:rPr>
+              <a:t>сбор от стойностите в дадена колона</a:t>
+            </a:r>
+            <a:endParaRPr lang="en-US" sz="2800" dirty="0" smtClean="0">
+              <a:solidFill>
+                <a:schemeClr val="bg2"/>
+              </a:solidFill>
+            </a:endParaRPr>
+          </a:p>
+          <a:p>
+            <a:pPr marL="969948" lvl="1" indent="-360000" fontAlgn="base">
+              <a:lnSpc>
+                <a:spcPct val="100000"/>
+              </a:lnSpc>
+              <a:spcAft>
+                <a:spcPts val="0"/>
+              </a:spcAft>
+              <a:buClr>
+                <a:schemeClr val="bg2"/>
+              </a:buClr>
+            </a:pPr>
+            <a:r>
+              <a:rPr lang="en-US" sz="2800" b="1" dirty="0" smtClean="0">
+                <a:solidFill>
+                  <a:schemeClr val="bg1">
+                    <a:lumMod val="60000"/>
+                    <a:lumOff val="40000"/>
+                  </a:schemeClr>
+                </a:solidFill>
+              </a:rPr>
+              <a:t>MIN </a:t>
+            </a:r>
+            <a:r>
+              <a:rPr lang="bg-BG" sz="2800" dirty="0" smtClean="0">
+                <a:solidFill>
+                  <a:schemeClr val="bg2"/>
+                </a:solidFill>
+              </a:rPr>
+              <a:t>== </a:t>
+            </a:r>
+            <a:r>
+              <a:rPr lang="ru-RU" sz="2800" dirty="0" smtClean="0">
+                <a:solidFill>
+                  <a:schemeClr val="bg2"/>
+                </a:solidFill>
+              </a:rPr>
+              <a:t>минималната стойност в дадена </a:t>
+            </a:r>
+            <a:r>
+              <a:rPr lang="ru-RU" sz="2800" dirty="0" smtClean="0">
+                <a:solidFill>
+                  <a:schemeClr val="bg2"/>
+                </a:solidFill>
+              </a:rPr>
+              <a:t>колона</a:t>
+            </a:r>
+            <a:endParaRPr lang="en-US" sz="2800" dirty="0" smtClean="0">
+              <a:solidFill>
+                <a:schemeClr val="bg2"/>
+              </a:solidFill>
+            </a:endParaRPr>
+          </a:p>
+          <a:p>
+            <a:pPr marL="969948" lvl="1" indent="-360000" fontAlgn="base">
+              <a:lnSpc>
+                <a:spcPct val="100000"/>
+              </a:lnSpc>
+              <a:spcAft>
+                <a:spcPts val="0"/>
+              </a:spcAft>
+              <a:buClr>
+                <a:schemeClr val="bg2"/>
+              </a:buClr>
+            </a:pPr>
+            <a:r>
+              <a:rPr lang="en-US" sz="2800" b="1" dirty="0" smtClean="0">
+                <a:solidFill>
+                  <a:schemeClr val="bg1">
+                    <a:lumMod val="60000"/>
+                    <a:lumOff val="40000"/>
+                  </a:schemeClr>
+                </a:solidFill>
+              </a:rPr>
+              <a:t>MAX </a:t>
+            </a:r>
+            <a:r>
+              <a:rPr lang="bg-BG" sz="2800" dirty="0" smtClean="0">
+                <a:solidFill>
+                  <a:schemeClr val="bg2"/>
+                </a:solidFill>
+              </a:rPr>
+              <a:t>== </a:t>
+            </a:r>
+            <a:r>
+              <a:rPr lang="ru-RU" sz="2800" dirty="0" smtClean="0">
+                <a:solidFill>
+                  <a:schemeClr val="bg2"/>
+                </a:solidFill>
+              </a:rPr>
+              <a:t>минималната</a:t>
+            </a:r>
+            <a:r>
+              <a:rPr lang="ru-RU" sz="2800" dirty="0" smtClean="0">
+                <a:solidFill>
+                  <a:schemeClr val="bg2"/>
+                </a:solidFill>
+              </a:rPr>
+              <a:t> стойност в дадена колона</a:t>
+            </a:r>
+            <a:endParaRPr lang="en-US" sz="2800" b="1" dirty="0" smtClean="0">
+              <a:solidFill>
+                <a:schemeClr val="bg1">
+                  <a:lumMod val="60000"/>
+                  <a:lumOff val="40000"/>
+                </a:schemeClr>
+              </a:solidFill>
+            </a:endParaRPr>
+          </a:p>
+          <a:p>
+            <a:pPr marL="969948" lvl="1" indent="-360000" fontAlgn="base">
+              <a:lnSpc>
+                <a:spcPct val="100000"/>
+              </a:lnSpc>
+              <a:spcAft>
+                <a:spcPts val="0"/>
+              </a:spcAft>
+              <a:buClr>
+                <a:schemeClr val="bg2"/>
+              </a:buClr>
+            </a:pPr>
+            <a:r>
+              <a:rPr lang="en-US" sz="2800" b="1" dirty="0" smtClean="0">
+                <a:solidFill>
+                  <a:schemeClr val="bg1">
+                    <a:lumMod val="60000"/>
+                    <a:lumOff val="40000"/>
+                  </a:schemeClr>
+                </a:solidFill>
+              </a:rPr>
+              <a:t>AVG </a:t>
+            </a:r>
+            <a:r>
+              <a:rPr lang="bg-BG" sz="2800" dirty="0" smtClean="0">
+                <a:solidFill>
+                  <a:schemeClr val="bg2"/>
+                </a:solidFill>
+              </a:rPr>
               <a:t> </a:t>
             </a:r>
             <a:r>
-              <a:rPr lang="en-US" sz="3200" dirty="0" smtClean="0"/>
-              <a:t>Add summary</a:t>
-            </a:r>
+              <a:rPr lang="bg-BG" sz="2800" dirty="0" smtClean="0">
+                <a:solidFill>
+                  <a:schemeClr val="bg2"/>
+                </a:solidFill>
+              </a:rPr>
+              <a:t>== </a:t>
+            </a:r>
+            <a:r>
+              <a:rPr lang="ru-RU" sz="2800" dirty="0" smtClean="0">
+                <a:solidFill>
+                  <a:schemeClr val="bg2"/>
+                </a:solidFill>
+              </a:rPr>
+              <a:t>средна стойност в дадена колона</a:t>
+            </a:r>
+            <a:endParaRPr lang="en-US" sz="2800" dirty="0" smtClean="0">
+              <a:solidFill>
+                <a:schemeClr val="bg2"/>
+              </a:solidFill>
+            </a:endParaRPr>
+          </a:p>
+          <a:p>
+            <a:pPr marL="360363" indent="-360000" fontAlgn="base">
+              <a:lnSpc>
+                <a:spcPct val="100000"/>
+              </a:lnSpc>
+              <a:spcAft>
+                <a:spcPts val="0"/>
+              </a:spcAft>
+              <a:buClr>
+                <a:schemeClr val="bg2"/>
+              </a:buClr>
+            </a:pPr>
+            <a:r>
+              <a:rPr lang="en-US" sz="3000" b="1" dirty="0" smtClean="0">
+                <a:solidFill>
+                  <a:schemeClr val="bg1">
+                    <a:lumMod val="60000"/>
+                    <a:lumOff val="40000"/>
+                  </a:schemeClr>
+                </a:solidFill>
+              </a:rPr>
+              <a:t>GROUP BY</a:t>
+            </a:r>
+            <a:r>
+              <a:rPr lang="en-US" sz="3000" dirty="0" smtClean="0"/>
+              <a:t> == </a:t>
+            </a:r>
+            <a:r>
+              <a:rPr lang="bg-BG" sz="3000" dirty="0" smtClean="0"/>
+              <a:t>Р</a:t>
+            </a:r>
+            <a:r>
+              <a:rPr lang="ru-RU" sz="3000" dirty="0" smtClean="0"/>
+              <a:t>азделя </a:t>
+            </a:r>
+            <a:r>
+              <a:rPr lang="ru-RU" sz="3000" dirty="0" smtClean="0"/>
+              <a:t>редовете на таблицата на </a:t>
+            </a:r>
+            <a:r>
+              <a:rPr lang="ru-RU" sz="3000" b="1" dirty="0" smtClean="0">
+                <a:solidFill>
+                  <a:schemeClr val="bg1">
+                    <a:lumMod val="60000"/>
+                    <a:lumOff val="40000"/>
+                  </a:schemeClr>
+                </a:solidFill>
+              </a:rPr>
+              <a:t>групи</a:t>
+            </a:r>
+            <a:endParaRPr lang="en-US" sz="3000" b="1" dirty="0" smtClean="0">
+              <a:solidFill>
+                <a:schemeClr val="bg1">
+                  <a:lumMod val="60000"/>
+                  <a:lumOff val="40000"/>
+                </a:schemeClr>
+              </a:solidFill>
+            </a:endParaRPr>
+          </a:p>
+          <a:p>
+            <a:pPr marL="969948" lvl="1" indent="-360000" fontAlgn="base">
+              <a:lnSpc>
+                <a:spcPct val="100000"/>
+              </a:lnSpc>
+              <a:spcAft>
+                <a:spcPts val="0"/>
+              </a:spcAft>
+              <a:buClr>
+                <a:schemeClr val="bg2"/>
+              </a:buClr>
+            </a:pPr>
+            <a:r>
+              <a:rPr lang="en-US" sz="2800" b="1" dirty="0" smtClean="0">
+                <a:solidFill>
+                  <a:schemeClr val="bg1">
+                    <a:lumMod val="60000"/>
+                    <a:lumOff val="40000"/>
+                  </a:schemeClr>
+                </a:solidFill>
+              </a:rPr>
+              <a:t>HAVING </a:t>
+            </a:r>
+            <a:r>
+              <a:rPr lang="bg-BG" sz="2800" dirty="0" smtClean="0">
+                <a:solidFill>
+                  <a:schemeClr val="bg2"/>
+                </a:solidFill>
+              </a:rPr>
+              <a:t>се използва за филтриране на редовете от заявката</a:t>
+            </a:r>
+            <a:endParaRPr lang="en-US" sz="2800" dirty="0" smtClean="0">
+              <a:solidFill>
+                <a:schemeClr val="bg1">
+                  <a:lumMod val="60000"/>
+                  <a:lumOff val="40000"/>
+                </a:schemeClr>
+              </a:solidFill>
+            </a:endParaRPr>
           </a:p>
         </p:txBody>
       </p:sp>
@@ -38302,7 +38772,7 @@
           <p:cNvPr id="17" name="Slide Number">
             <a:extLst>
               <a:ext uri="{FF2B5EF4-FFF2-40B4-BE49-F238E27FC236}">
-                <a16:creationId xmlns="" xmlns:a16="http://schemas.microsoft.com/office/drawing/2014/main" id="{9DE5559F-55C2-47F1-A321-B593B1EC63C1}"/>
+                <a16:creationId xmlns:a16="http://schemas.microsoft.com/office/drawing/2014/main" xmlns="" id="{9DE5559F-55C2-47F1-A321-B593B1EC63C1}"/>
               </a:ext>
             </a:extLst>
           </p:cNvPr>
@@ -38344,7 +38814,7 @@
           <p:cNvPr id="13" name="Picture SoftUni Mascot">
             <a:extLst>
               <a:ext uri="{FF2B5EF4-FFF2-40B4-BE49-F238E27FC236}">
-                <a16:creationId xmlns="" xmlns:a16="http://schemas.microsoft.com/office/drawing/2014/main" id="{CCC3A316-993C-4741-8826-E104F27650A3}"/>
+                <a16:creationId xmlns:a16="http://schemas.microsoft.com/office/drawing/2014/main" xmlns="" id="{CCC3A316-993C-4741-8826-E104F27650A3}"/>
               </a:ext>
             </a:extLst>
           </p:cNvPr>
@@ -38357,7 +38827,7 @@
           <a:blip r:embed="rId3" cstate="print">
             <a:extLst>
               <a:ext uri="{28A0092B-C50C-407E-A947-70E740481C1C}">
-                <a14:useLocalDpi xmlns="" xmlns:a14="http://schemas.microsoft.com/office/drawing/2010/main" val="0"/>
+                <a14:useLocalDpi xmlns:a14="http://schemas.microsoft.com/office/drawing/2010/main" xmlns="" val="0"/>
               </a:ext>
             </a:extLst>
           </a:blip>
@@ -38402,7 +38872,7 @@
     </p:spTree>
     <p:extLst>
       <p:ext uri="{BB962C8B-B14F-4D97-AF65-F5344CB8AC3E}">
-        <p14:creationId xmlns="" xmlns:p14="http://schemas.microsoft.com/office/powerpoint/2010/main" val="2087190546"/>
+        <p14:creationId xmlns:p14="http://schemas.microsoft.com/office/powerpoint/2010/main" xmlns="" val="2087190546"/>
       </p:ext>
     </p:extLst>
   </p:cSld>
@@ -38410,7 +38880,7 @@
     <a:masterClrMapping/>
   </p:clrMapOvr>
   <mc:AlternateContent xmlns:mc="http://schemas.openxmlformats.org/markup-compatibility/2006">
-    <mc:Choice xmlns="" xmlns:p14="http://schemas.microsoft.com/office/powerpoint/2010/main" Requires="p14">
+    <mc:Choice xmlns:p14="http://schemas.microsoft.com/office/powerpoint/2010/main" xmlns="" Requires="p14">
       <p:transition spd="slow" p14:dur="2000" advClick="0" advTm="5000"/>
     </mc:Choice>
     <mc:Fallback>
@@ -38453,7 +38923,283 @@
                                         <p:tgtEl>
                                           <p:spTgt spid="14">
                                             <p:txEl>
-                                              <p:pRg st="0" end="0"/>
+                                              <p:pRg st="1" end="1"/>
+                                            </p:txEl>
+                                          </p:spTgt>
+                                        </p:tgtEl>
+                                        <p:attrNameLst>
+                                          <p:attrName>style.visibility</p:attrName>
+                                        </p:attrNameLst>
+                                      </p:cBhvr>
+                                      <p:to>
+                                        <p:strVal val="visible"/>
+                                      </p:to>
+                                    </p:set>
+                                  </p:childTnLst>
+                                </p:cTn>
+                              </p:par>
+                            </p:childTnLst>
+                          </p:cTn>
+                        </p:par>
+                      </p:childTnLst>
+                    </p:cTn>
+                  </p:par>
+                  <p:par>
+                    <p:cTn id="7" fill="hold">
+                      <p:stCondLst>
+                        <p:cond delay="indefinite"/>
+                      </p:stCondLst>
+                      <p:childTnLst>
+                        <p:par>
+                          <p:cTn id="8" fill="hold">
+                            <p:stCondLst>
+                              <p:cond delay="0"/>
+                            </p:stCondLst>
+                            <p:childTnLst>
+                              <p:par>
+                                <p:cTn id="9" presetID="1" presetClass="entr" presetSubtype="0" fill="hold" nodeType="clickEffect">
+                                  <p:stCondLst>
+                                    <p:cond delay="0"/>
+                                  </p:stCondLst>
+                                  <p:childTnLst>
+                                    <p:set>
+                                      <p:cBhvr>
+                                        <p:cTn id="10" dur="1" fill="hold">
+                                          <p:stCondLst>
+                                            <p:cond delay="0"/>
+                                          </p:stCondLst>
+                                        </p:cTn>
+                                        <p:tgtEl>
+                                          <p:spTgt spid="14">
+                                            <p:txEl>
+                                              <p:pRg st="2" end="2"/>
+                                            </p:txEl>
+                                          </p:spTgt>
+                                        </p:tgtEl>
+                                        <p:attrNameLst>
+                                          <p:attrName>style.visibility</p:attrName>
+                                        </p:attrNameLst>
+                                      </p:cBhvr>
+                                      <p:to>
+                                        <p:strVal val="visible"/>
+                                      </p:to>
+                                    </p:set>
+                                  </p:childTnLst>
+                                </p:cTn>
+                              </p:par>
+                            </p:childTnLst>
+                          </p:cTn>
+                        </p:par>
+                      </p:childTnLst>
+                    </p:cTn>
+                  </p:par>
+                  <p:par>
+                    <p:cTn id="11" fill="hold">
+                      <p:stCondLst>
+                        <p:cond delay="indefinite"/>
+                      </p:stCondLst>
+                      <p:childTnLst>
+                        <p:par>
+                          <p:cTn id="12" fill="hold">
+                            <p:stCondLst>
+                              <p:cond delay="0"/>
+                            </p:stCondLst>
+                            <p:childTnLst>
+                              <p:par>
+                                <p:cTn id="13" presetID="1" presetClass="entr" presetSubtype="0" fill="hold" nodeType="clickEffect">
+                                  <p:stCondLst>
+                                    <p:cond delay="0"/>
+                                  </p:stCondLst>
+                                  <p:childTnLst>
+                                    <p:set>
+                                      <p:cBhvr>
+                                        <p:cTn id="14" dur="1" fill="hold">
+                                          <p:stCondLst>
+                                            <p:cond delay="0"/>
+                                          </p:stCondLst>
+                                        </p:cTn>
+                                        <p:tgtEl>
+                                          <p:spTgt spid="14">
+                                            <p:txEl>
+                                              <p:pRg st="3" end="3"/>
+                                            </p:txEl>
+                                          </p:spTgt>
+                                        </p:tgtEl>
+                                        <p:attrNameLst>
+                                          <p:attrName>style.visibility</p:attrName>
+                                        </p:attrNameLst>
+                                      </p:cBhvr>
+                                      <p:to>
+                                        <p:strVal val="visible"/>
+                                      </p:to>
+                                    </p:set>
+                                  </p:childTnLst>
+                                </p:cTn>
+                              </p:par>
+                            </p:childTnLst>
+                          </p:cTn>
+                        </p:par>
+                      </p:childTnLst>
+                    </p:cTn>
+                  </p:par>
+                  <p:par>
+                    <p:cTn id="15" fill="hold">
+                      <p:stCondLst>
+                        <p:cond delay="indefinite"/>
+                      </p:stCondLst>
+                      <p:childTnLst>
+                        <p:par>
+                          <p:cTn id="16" fill="hold">
+                            <p:stCondLst>
+                              <p:cond delay="0"/>
+                            </p:stCondLst>
+                            <p:childTnLst>
+                              <p:par>
+                                <p:cTn id="17" presetID="1" presetClass="entr" presetSubtype="0" fill="hold" nodeType="clickEffect">
+                                  <p:stCondLst>
+                                    <p:cond delay="0"/>
+                                  </p:stCondLst>
+                                  <p:childTnLst>
+                                    <p:set>
+                                      <p:cBhvr>
+                                        <p:cTn id="18" dur="1" fill="hold">
+                                          <p:stCondLst>
+                                            <p:cond delay="0"/>
+                                          </p:stCondLst>
+                                        </p:cTn>
+                                        <p:tgtEl>
+                                          <p:spTgt spid="14">
+                                            <p:txEl>
+                                              <p:pRg st="4" end="4"/>
+                                            </p:txEl>
+                                          </p:spTgt>
+                                        </p:tgtEl>
+                                        <p:attrNameLst>
+                                          <p:attrName>style.visibility</p:attrName>
+                                        </p:attrNameLst>
+                                      </p:cBhvr>
+                                      <p:to>
+                                        <p:strVal val="visible"/>
+                                      </p:to>
+                                    </p:set>
+                                  </p:childTnLst>
+                                </p:cTn>
+                              </p:par>
+                            </p:childTnLst>
+                          </p:cTn>
+                        </p:par>
+                      </p:childTnLst>
+                    </p:cTn>
+                  </p:par>
+                  <p:par>
+                    <p:cTn id="19" fill="hold">
+                      <p:stCondLst>
+                        <p:cond delay="indefinite"/>
+                      </p:stCondLst>
+                      <p:childTnLst>
+                        <p:par>
+                          <p:cTn id="20" fill="hold">
+                            <p:stCondLst>
+                              <p:cond delay="0"/>
+                            </p:stCondLst>
+                            <p:childTnLst>
+                              <p:par>
+                                <p:cTn id="21" presetID="1" presetClass="entr" presetSubtype="0" fill="hold" nodeType="clickEffect">
+                                  <p:stCondLst>
+                                    <p:cond delay="0"/>
+                                  </p:stCondLst>
+                                  <p:childTnLst>
+                                    <p:set>
+                                      <p:cBhvr>
+                                        <p:cTn id="22" dur="1" fill="hold">
+                                          <p:stCondLst>
+                                            <p:cond delay="0"/>
+                                          </p:stCondLst>
+                                        </p:cTn>
+                                        <p:tgtEl>
+                                          <p:spTgt spid="14">
+                                            <p:txEl>
+                                              <p:pRg st="5" end="5"/>
+                                            </p:txEl>
+                                          </p:spTgt>
+                                        </p:tgtEl>
+                                        <p:attrNameLst>
+                                          <p:attrName>style.visibility</p:attrName>
+                                        </p:attrNameLst>
+                                      </p:cBhvr>
+                                      <p:to>
+                                        <p:strVal val="visible"/>
+                                      </p:to>
+                                    </p:set>
+                                  </p:childTnLst>
+                                </p:cTn>
+                              </p:par>
+                            </p:childTnLst>
+                          </p:cTn>
+                        </p:par>
+                      </p:childTnLst>
+                    </p:cTn>
+                  </p:par>
+                  <p:par>
+                    <p:cTn id="23" fill="hold">
+                      <p:stCondLst>
+                        <p:cond delay="indefinite"/>
+                      </p:stCondLst>
+                      <p:childTnLst>
+                        <p:par>
+                          <p:cTn id="24" fill="hold">
+                            <p:stCondLst>
+                              <p:cond delay="0"/>
+                            </p:stCondLst>
+                            <p:childTnLst>
+                              <p:par>
+                                <p:cTn id="25" presetID="1" presetClass="entr" presetSubtype="0" fill="hold" nodeType="clickEffect">
+                                  <p:stCondLst>
+                                    <p:cond delay="0"/>
+                                  </p:stCondLst>
+                                  <p:childTnLst>
+                                    <p:set>
+                                      <p:cBhvr>
+                                        <p:cTn id="26" dur="1" fill="hold">
+                                          <p:stCondLst>
+                                            <p:cond delay="0"/>
+                                          </p:stCondLst>
+                                        </p:cTn>
+                                        <p:tgtEl>
+                                          <p:spTgt spid="14">
+                                            <p:txEl>
+                                              <p:pRg st="6" end="6"/>
+                                            </p:txEl>
+                                          </p:spTgt>
+                                        </p:tgtEl>
+                                        <p:attrNameLst>
+                                          <p:attrName>style.visibility</p:attrName>
+                                        </p:attrNameLst>
+                                      </p:cBhvr>
+                                      <p:to>
+                                        <p:strVal val="visible"/>
+                                      </p:to>
+                                    </p:set>
+                                  </p:childTnLst>
+                                </p:cTn>
+                              </p:par>
+                              <p:par>
+                                <p:cTn id="27" presetID="1" presetClass="entr" presetSubtype="0" fill="hold" nodeType="withEffect">
+                                  <p:stCondLst>
+                                    <p:cond delay="0"/>
+                                  </p:stCondLst>
+                                  <p:childTnLst>
+                                    <p:set>
+                                      <p:cBhvr>
+                                        <p:cTn id="28" dur="1" fill="hold">
+                                          <p:stCondLst>
+                                            <p:cond delay="0"/>
+                                          </p:stCondLst>
+                                        </p:cTn>
+                                        <p:tgtEl>
+                                          <p:spTgt spid="14">
+                                            <p:txEl>
+                                              <p:pRg st="7" end="7"/>
                                             </p:txEl>
                                           </p:spTgt>
                                         </p:tgtEl>
@@ -38521,7 +39267,7 @@
           <p:cNvPr id="5" name="Group 4">
             <a:extLst>
               <a:ext uri="{FF2B5EF4-FFF2-40B4-BE49-F238E27FC236}">
-                <a16:creationId xmlns="" xmlns:a16="http://schemas.microsoft.com/office/drawing/2014/main" id="{1A67F800-7980-E3CA-7188-3C478C8E98B8}"/>
+                <a16:creationId xmlns:a16="http://schemas.microsoft.com/office/drawing/2014/main" xmlns="" id="{1A67F800-7980-E3CA-7188-3C478C8E98B8}"/>
               </a:ext>
             </a:extLst>
           </p:cNvPr>
@@ -38541,7 +39287,7 @@
             <p:cNvPr id="7" name="Picture 6" descr="A picture containing text, sign, vector graphics&#10;&#10;Description automatically generated">
               <a:extLst>
                 <a:ext uri="{FF2B5EF4-FFF2-40B4-BE49-F238E27FC236}">
-                  <a16:creationId xmlns="" xmlns:a16="http://schemas.microsoft.com/office/drawing/2014/main" id="{15CE28B1-02BA-4014-E149-BF1EE09447ED}"/>
+                  <a16:creationId xmlns:a16="http://schemas.microsoft.com/office/drawing/2014/main" xmlns="" id="{15CE28B1-02BA-4014-E149-BF1EE09447ED}"/>
                 </a:ext>
               </a:extLst>
             </p:cNvPr>
@@ -38571,7 +39317,7 @@
             <p:cNvPr id="9" name="Picture 8" descr="Logo&#10;&#10;Description automatically generated">
               <a:extLst>
                 <a:ext uri="{FF2B5EF4-FFF2-40B4-BE49-F238E27FC236}">
-                  <a16:creationId xmlns="" xmlns:a16="http://schemas.microsoft.com/office/drawing/2014/main" id="{5F82FF4F-4AD2-4B3B-1445-F3C6BA268522}"/>
+                  <a16:creationId xmlns:a16="http://schemas.microsoft.com/office/drawing/2014/main" xmlns="" id="{5F82FF4F-4AD2-4B3B-1445-F3C6BA268522}"/>
                 </a:ext>
               </a:extLst>
             </p:cNvPr>
@@ -38601,7 +39347,7 @@
             <p:cNvPr id="11" name="Picture 10" descr="Logo&#10;&#10;Description automatically generated">
               <a:extLst>
                 <a:ext uri="{FF2B5EF4-FFF2-40B4-BE49-F238E27FC236}">
-                  <a16:creationId xmlns="" xmlns:a16="http://schemas.microsoft.com/office/drawing/2014/main" id="{68CCA8DB-9EFC-F9BC-57AE-81E4F843E863}"/>
+                  <a16:creationId xmlns:a16="http://schemas.microsoft.com/office/drawing/2014/main" xmlns="" id="{68CCA8DB-9EFC-F9BC-57AE-81E4F843E863}"/>
                 </a:ext>
               </a:extLst>
             </p:cNvPr>
@@ -38631,7 +39377,7 @@
             <p:cNvPr id="13" name="Picture 12" descr="Logo&#10;&#10;Description automatically generated">
               <a:extLst>
                 <a:ext uri="{FF2B5EF4-FFF2-40B4-BE49-F238E27FC236}">
-                  <a16:creationId xmlns="" xmlns:a16="http://schemas.microsoft.com/office/drawing/2014/main" id="{3FDF9297-50FA-E866-B6CE-9D64B1E892BF}"/>
+                  <a16:creationId xmlns:a16="http://schemas.microsoft.com/office/drawing/2014/main" xmlns="" id="{3FDF9297-50FA-E866-B6CE-9D64B1E892BF}"/>
                 </a:ext>
               </a:extLst>
             </p:cNvPr>
@@ -38661,7 +39407,7 @@
             <p:cNvPr id="18" name="Graphic 17">
               <a:extLst>
                 <a:ext uri="{FF2B5EF4-FFF2-40B4-BE49-F238E27FC236}">
-                  <a16:creationId xmlns="" xmlns:a16="http://schemas.microsoft.com/office/drawing/2014/main" id="{2A1BC0C9-7A7B-9C5B-B457-3E86E59EF29E}"/>
+                  <a16:creationId xmlns:a16="http://schemas.microsoft.com/office/drawing/2014/main" xmlns="" id="{2A1BC0C9-7A7B-9C5B-B457-3E86E59EF29E}"/>
                 </a:ext>
               </a:extLst>
             </p:cNvPr>
@@ -38674,7 +39420,7 @@
             <a:blip r:embed="rId7" cstate="print">
               <a:extLst>
                 <a:ext uri="{96DAC541-7B7A-43D3-8B79-37D633B846F1}">
-                  <asvg:svgBlip xmlns="" xmlns:asvg="http://schemas.microsoft.com/office/drawing/2016/SVG/main" r:embed="rId8"/>
+                  <asvg:svgBlip xmlns:asvg="http://schemas.microsoft.com/office/drawing/2016/SVG/main" xmlns="" r:embed="rId8"/>
                 </a:ext>
               </a:extLst>
             </a:blip>
@@ -38697,7 +39443,7 @@
             <p:cNvPr id="20" name="Graphic 19">
               <a:extLst>
                 <a:ext uri="{FF2B5EF4-FFF2-40B4-BE49-F238E27FC236}">
-                  <a16:creationId xmlns="" xmlns:a16="http://schemas.microsoft.com/office/drawing/2014/main" id="{DBE174DA-A182-7E57-06D4-86AFA26D484D}"/>
+                  <a16:creationId xmlns:a16="http://schemas.microsoft.com/office/drawing/2014/main" xmlns="" id="{DBE174DA-A182-7E57-06D4-86AFA26D484D}"/>
                 </a:ext>
               </a:extLst>
             </p:cNvPr>
@@ -38710,7 +39456,7 @@
             <a:blip r:embed="rId9" cstate="print">
               <a:extLst>
                 <a:ext uri="{96DAC541-7B7A-43D3-8B79-37D633B846F1}">
-                  <asvg:svgBlip xmlns="" xmlns:asvg="http://schemas.microsoft.com/office/drawing/2016/SVG/main" r:embed="rId10"/>
+                  <asvg:svgBlip xmlns:asvg="http://schemas.microsoft.com/office/drawing/2016/SVG/main" xmlns="" r:embed="rId10"/>
                 </a:ext>
               </a:extLst>
             </a:blip>
@@ -38733,7 +39479,7 @@
             <p:cNvPr id="22" name="Picture 21" descr="Logo&#10;&#10;Description automatically generated">
               <a:extLst>
                 <a:ext uri="{FF2B5EF4-FFF2-40B4-BE49-F238E27FC236}">
-                  <a16:creationId xmlns="" xmlns:a16="http://schemas.microsoft.com/office/drawing/2014/main" id="{9B7FFC36-A4BC-7A53-AB82-82C398A47538}"/>
+                  <a16:creationId xmlns:a16="http://schemas.microsoft.com/office/drawing/2014/main" xmlns="" id="{9B7FFC36-A4BC-7A53-AB82-82C398A47538}"/>
                 </a:ext>
               </a:extLst>
             </p:cNvPr>
@@ -38763,7 +39509,7 @@
             <p:cNvPr id="36" name="Group 35">
               <a:extLst>
                 <a:ext uri="{FF2B5EF4-FFF2-40B4-BE49-F238E27FC236}">
-                  <a16:creationId xmlns="" xmlns:a16="http://schemas.microsoft.com/office/drawing/2014/main" id="{3FB2AEAC-BDEE-9D5F-67A3-17CEDA699052}"/>
+                  <a16:creationId xmlns:a16="http://schemas.microsoft.com/office/drawing/2014/main" xmlns="" id="{3FB2AEAC-BDEE-9D5F-67A3-17CEDA699052}"/>
                 </a:ext>
               </a:extLst>
             </p:cNvPr>
@@ -38783,7 +39529,7 @@
               <p:cNvPr id="31" name="Straight Connector 30">
                 <a:extLst>
                   <a:ext uri="{FF2B5EF4-FFF2-40B4-BE49-F238E27FC236}">
-                    <a16:creationId xmlns="" xmlns:a16="http://schemas.microsoft.com/office/drawing/2014/main" id="{AA38ABD5-1637-DC80-A922-DF10E4F75CDE}"/>
+                    <a16:creationId xmlns:a16="http://schemas.microsoft.com/office/drawing/2014/main" xmlns="" id="{AA38ABD5-1637-DC80-A922-DF10E4F75CDE}"/>
                   </a:ext>
                 </a:extLst>
               </p:cNvPr>
@@ -38826,7 +39572,7 @@
               <p:cNvPr id="33" name="Picture 32">
                 <a:extLst>
                   <a:ext uri="{FF2B5EF4-FFF2-40B4-BE49-F238E27FC236}">
-                    <a16:creationId xmlns="" xmlns:a16="http://schemas.microsoft.com/office/drawing/2014/main" id="{617B586A-0BC5-5E32-7E67-FD277547ED69}"/>
+                    <a16:creationId xmlns:a16="http://schemas.microsoft.com/office/drawing/2014/main" xmlns="" id="{617B586A-0BC5-5E32-7E67-FD277547ED69}"/>
                   </a:ext>
                 </a:extLst>
               </p:cNvPr>
@@ -38858,7 +39604,7 @@
           <p:cNvPr id="40" name="Picture 39" descr="Logo&#10;&#10;Description automatically generated">
             <a:extLst>
               <a:ext uri="{FF2B5EF4-FFF2-40B4-BE49-F238E27FC236}">
-                <a16:creationId xmlns="" xmlns:a16="http://schemas.microsoft.com/office/drawing/2014/main" id="{9C30DD70-D438-6D27-35D3-8BB874966D84}"/>
+                <a16:creationId xmlns:a16="http://schemas.microsoft.com/office/drawing/2014/main" xmlns="" id="{9C30DD70-D438-6D27-35D3-8BB874966D84}"/>
               </a:ext>
             </a:extLst>
           </p:cNvPr>
@@ -38888,7 +39634,7 @@
           <p:cNvPr id="2" name="Google Shape;441;p37">
             <a:extLst>
               <a:ext uri="{FF2B5EF4-FFF2-40B4-BE49-F238E27FC236}">
-                <a16:creationId xmlns="" xmlns:a16="http://schemas.microsoft.com/office/drawing/2014/main" id="{2AFB472C-93C2-241B-75FA-457782840F92}"/>
+                <a16:creationId xmlns:a16="http://schemas.microsoft.com/office/drawing/2014/main" xmlns="" id="{2AFB472C-93C2-241B-75FA-457782840F92}"/>
               </a:ext>
             </a:extLst>
           </p:cNvPr>
@@ -39193,7 +39939,7 @@
           <p:cNvPr id="14" name="Картина 13">
             <a:extLst>
               <a:ext uri="{FF2B5EF4-FFF2-40B4-BE49-F238E27FC236}">
-                <a16:creationId xmlns="" xmlns:a16="http://schemas.microsoft.com/office/drawing/2014/main" id="{54B365E9-8FD0-6D5B-2DFC-723EE5DDD555}"/>
+                <a16:creationId xmlns:a16="http://schemas.microsoft.com/office/drawing/2014/main" xmlns="" id="{54B365E9-8FD0-6D5B-2DFC-723EE5DDD555}"/>
               </a:ext>
             </a:extLst>
           </p:cNvPr>
@@ -39223,7 +39969,7 @@
           <p:cNvPr id="16" name="Картина 15">
             <a:extLst>
               <a:ext uri="{FF2B5EF4-FFF2-40B4-BE49-F238E27FC236}">
-                <a16:creationId xmlns="" xmlns:a16="http://schemas.microsoft.com/office/drawing/2014/main" id="{3BD6ABFC-02BF-2D42-B42B-6929222F37B6}"/>
+                <a16:creationId xmlns:a16="http://schemas.microsoft.com/office/drawing/2014/main" xmlns="" id="{3BD6ABFC-02BF-2D42-B42B-6929222F37B6}"/>
               </a:ext>
             </a:extLst>
           </p:cNvPr>
@@ -39251,7 +39997,7 @@
     </p:spTree>
     <p:extLst>
       <p:ext uri="{BB962C8B-B14F-4D97-AF65-F5344CB8AC3E}">
-        <p14:creationId xmlns="" xmlns:p14="http://schemas.microsoft.com/office/powerpoint/2010/main" val="2144060659"/>
+        <p14:creationId xmlns:p14="http://schemas.microsoft.com/office/powerpoint/2010/main" xmlns="" val="2144060659"/>
       </p:ext>
     </p:extLst>
   </p:cSld>
@@ -39290,7 +40036,7 @@
           <p:cNvPr id="5" name="Slide Number">
             <a:extLst>
               <a:ext uri="{FF2B5EF4-FFF2-40B4-BE49-F238E27FC236}">
-                <a16:creationId xmlns="" xmlns:a16="http://schemas.microsoft.com/office/drawing/2014/main" id="{F48C3C93-90A1-4D31-BEA6-B54D1106CE31}"/>
+                <a16:creationId xmlns:a16="http://schemas.microsoft.com/office/drawing/2014/main" xmlns="" id="{F48C3C93-90A1-4D31-BEA6-B54D1106CE31}"/>
               </a:ext>
             </a:extLst>
           </p:cNvPr>
@@ -39332,7 +40078,7 @@
           <p:cNvPr id="2" name="Slide Body">
             <a:extLst>
               <a:ext uri="{FF2B5EF4-FFF2-40B4-BE49-F238E27FC236}">
-                <a16:creationId xmlns="" xmlns:a16="http://schemas.microsoft.com/office/drawing/2014/main" id="{980F49B1-E4BE-4389-A747-7AB9B71AD920}"/>
+                <a16:creationId xmlns:a16="http://schemas.microsoft.com/office/drawing/2014/main" xmlns="" id="{980F49B1-E4BE-4389-A747-7AB9B71AD920}"/>
               </a:ext>
             </a:extLst>
           </p:cNvPr>
@@ -39466,7 +40212,7 @@
           <p:cNvPr id="6" name="Picture License" descr="License">
             <a:extLst>
               <a:ext uri="{FF2B5EF4-FFF2-40B4-BE49-F238E27FC236}">
-                <a16:creationId xmlns="" xmlns:a16="http://schemas.microsoft.com/office/drawing/2014/main" id="{A10A2585-858C-4B1E-8846-27CF1C15729E}"/>
+                <a16:creationId xmlns:a16="http://schemas.microsoft.com/office/drawing/2014/main" xmlns="" id="{A10A2585-858C-4B1E-8846-27CF1C15729E}"/>
               </a:ext>
             </a:extLst>
           </p:cNvPr>
@@ -39507,7 +40253,7 @@
           <p:cNvPr id="3" name="Slide Title">
             <a:extLst>
               <a:ext uri="{FF2B5EF4-FFF2-40B4-BE49-F238E27FC236}">
-                <a16:creationId xmlns="" xmlns:a16="http://schemas.microsoft.com/office/drawing/2014/main" id="{E5F1FB41-80C3-4816-BC47-CCC50632E6E8}"/>
+                <a16:creationId xmlns:a16="http://schemas.microsoft.com/office/drawing/2014/main" xmlns="" id="{E5F1FB41-80C3-4816-BC47-CCC50632E6E8}"/>
               </a:ext>
             </a:extLst>
           </p:cNvPr>
@@ -39533,7 +40279,7 @@
     </p:spTree>
     <p:extLst>
       <p:ext uri="{BB962C8B-B14F-4D97-AF65-F5344CB8AC3E}">
-        <p14:creationId xmlns="" xmlns:p14="http://schemas.microsoft.com/office/powerpoint/2010/main" val="3506533871"/>
+        <p14:creationId xmlns:p14="http://schemas.microsoft.com/office/powerpoint/2010/main" xmlns="" val="3506533871"/>
       </p:ext>
     </p:extLst>
   </p:cSld>
@@ -39541,7 +40287,7 @@
     <a:masterClrMapping/>
   </p:clrMapOvr>
   <mc:AlternateContent xmlns:mc="http://schemas.openxmlformats.org/markup-compatibility/2006">
-    <mc:Choice xmlns="" xmlns:p14="http://schemas.microsoft.com/office/powerpoint/2010/main" Requires="p14">
+    <mc:Choice xmlns:p14="http://schemas.microsoft.com/office/powerpoint/2010/main" xmlns="" Requires="p14">
       <p:transition spd="slow" p14:dur="2000" advClick="0" advTm="5000"/>
     </mc:Choice>
     <mc:Fallback>
@@ -39653,7 +40399,7 @@
     <a:masterClrMapping/>
   </p:clrMapOvr>
   <mc:AlternateContent xmlns:mc="http://schemas.openxmlformats.org/markup-compatibility/2006">
-    <mc:Choice xmlns="" xmlns:p14="http://schemas.microsoft.com/office/powerpoint/2010/main" Requires="p14">
+    <mc:Choice xmlns:p14="http://schemas.microsoft.com/office/powerpoint/2010/main" xmlns="" Requires="p14">
       <p:transition spd="slow" p14:dur="2000" advClick="0" advTm="5000"/>
     </mc:Choice>
     <mc:Fallback>
@@ -39837,7 +40583,7 @@
           <a:blip r:embed="rId3" cstate="screen">
             <a:extLst>
               <a:ext uri="{28A0092B-C50C-407E-A947-70E740481C1C}">
-                <a14:useLocalDpi xmlns:a14="http://schemas.microsoft.com/office/drawing/2010/main" xmlns="" val="0"/>
+                <a14:useLocalDpi xmlns="" xmlns:a14="http://schemas.microsoft.com/office/drawing/2010/main" val="0"/>
               </a:ext>
             </a:extLst>
           </a:blip>
@@ -39962,7 +40708,7 @@
           <p:nvPr>
             <p:extLst>
               <p:ext uri="{D42A27DB-BD31-4B8C-83A1-F6EECF244321}">
-                <p14:modId xmlns:p14="http://schemas.microsoft.com/office/powerpoint/2010/main" xmlns="" val="1471852162"/>
+                <p14:modId xmlns="" xmlns:p14="http://schemas.microsoft.com/office/powerpoint/2010/main" val="1471852162"/>
               </p:ext>
             </p:extLst>
           </p:nvPr>
@@ -41492,7 +42238,7 @@
           <p:nvPr>
             <p:extLst>
               <p:ext uri="{D42A27DB-BD31-4B8C-83A1-F6EECF244321}">
-                <p14:modId xmlns:p14="http://schemas.microsoft.com/office/powerpoint/2010/main" xmlns="" val="3909739140"/>
+                <p14:modId xmlns="" xmlns:p14="http://schemas.microsoft.com/office/powerpoint/2010/main" val="3909739140"/>
               </p:ext>
             </p:extLst>
           </p:nvPr>
@@ -41828,7 +42574,7 @@
     </p:spTree>
     <p:extLst>
       <p:ext uri="{BB962C8B-B14F-4D97-AF65-F5344CB8AC3E}">
-        <p14:creationId xmlns:p14="http://schemas.microsoft.com/office/powerpoint/2010/main" xmlns="" val="1705544651"/>
+        <p14:creationId xmlns="" xmlns:p14="http://schemas.microsoft.com/office/powerpoint/2010/main" val="1705544651"/>
       </p:ext>
     </p:extLst>
   </p:cSld>
@@ -42360,7 +43106,7 @@
     </p:spTree>
     <p:extLst>
       <p:ext uri="{BB962C8B-B14F-4D97-AF65-F5344CB8AC3E}">
-        <p14:creationId xmlns:p14="http://schemas.microsoft.com/office/powerpoint/2010/main" xmlns="" val="2513660019"/>
+        <p14:creationId xmlns="" xmlns:p14="http://schemas.microsoft.com/office/powerpoint/2010/main" val="2513660019"/>
       </p:ext>
     </p:extLst>
   </p:cSld>
@@ -42741,6 +43487,7 @@
                 <a:solidFill>
                   <a:schemeClr val="bg1"/>
                 </a:solidFill>
+                <a:latin typeface="Consolas" pitchFamily="49" charset="0"/>
               </a:rPr>
               <a:t>MIN</a:t>
             </a:r>
@@ -42761,6 +43508,7 @@
                 <a:solidFill>
                   <a:schemeClr val="bg1"/>
                 </a:solidFill>
+                <a:latin typeface="Consolas" pitchFamily="49" charset="0"/>
               </a:rPr>
               <a:t>MAX</a:t>
             </a:r>
@@ -43050,7 +43798,7 @@
           <p:nvPr>
             <p:extLst>
               <p:ext uri="{D42A27DB-BD31-4B8C-83A1-F6EECF244321}">
-                <p14:modId xmlns:p14="http://schemas.microsoft.com/office/powerpoint/2010/main" xmlns="" val="698992006"/>
+                <p14:modId xmlns="" xmlns:p14="http://schemas.microsoft.com/office/powerpoint/2010/main" val="698992006"/>
               </p:ext>
             </p:extLst>
           </p:nvPr>
@@ -43615,7 +44363,7 @@
     </p:spTree>
     <p:extLst>
       <p:ext uri="{BB962C8B-B14F-4D97-AF65-F5344CB8AC3E}">
-        <p14:creationId xmlns:p14="http://schemas.microsoft.com/office/powerpoint/2010/main" xmlns="" val="420237416"/>
+        <p14:creationId xmlns="" xmlns:p14="http://schemas.microsoft.com/office/powerpoint/2010/main" val="420237416"/>
       </p:ext>
     </p:extLst>
   </p:cSld>
@@ -43871,6 +44619,7 @@
                 <a:solidFill>
                   <a:schemeClr val="bg1"/>
                 </a:solidFill>
+                <a:latin typeface="Consolas" pitchFamily="49" charset="0"/>
               </a:rPr>
               <a:t>AVG</a:t>
             </a:r>
@@ -43893,6 +44642,7 @@
                 <a:solidFill>
                   <a:schemeClr val="bg1"/>
                 </a:solidFill>
+                <a:latin typeface="Consolas" pitchFamily="49" charset="0"/>
               </a:rPr>
               <a:t>SUM</a:t>
             </a:r>
@@ -44250,7 +45000,7 @@
           <p:nvPr>
             <p:extLst>
               <p:ext uri="{D42A27DB-BD31-4B8C-83A1-F6EECF244321}">
-                <p14:modId xmlns:p14="http://schemas.microsoft.com/office/powerpoint/2010/main" xmlns="" val="1386271896"/>
+                <p14:modId xmlns="" xmlns:p14="http://schemas.microsoft.com/office/powerpoint/2010/main" val="1386271896"/>
               </p:ext>
             </p:extLst>
           </p:nvPr>
@@ -45152,7 +45902,7 @@
     </p:spTree>
     <p:extLst>
       <p:ext uri="{BB962C8B-B14F-4D97-AF65-F5344CB8AC3E}">
-        <p14:creationId xmlns:p14="http://schemas.microsoft.com/office/powerpoint/2010/main" xmlns="" val="2890641456"/>
+        <p14:creationId xmlns="" xmlns:p14="http://schemas.microsoft.com/office/powerpoint/2010/main" val="2890641456"/>
       </p:ext>
     </p:extLst>
   </p:cSld>
@@ -45330,6 +46080,7 @@
                 <a:solidFill>
                   <a:schemeClr val="bg1"/>
                 </a:solidFill>
+                <a:latin typeface="Consolas" pitchFamily="49" charset="0"/>
               </a:rPr>
               <a:t>COUNT</a:t>
             </a:r>
@@ -45338,6 +46089,7 @@
                 <a:solidFill>
                   <a:schemeClr val="bg1"/>
                 </a:solidFill>
+                <a:latin typeface="Consolas" pitchFamily="49" charset="0"/>
               </a:rPr>
               <a:t> </a:t>
             </a:r>
@@ -45348,6 +46100,7 @@
                     <a:lumMod val="75000"/>
                   </a:schemeClr>
                 </a:solidFill>
+                <a:latin typeface="Consolas" pitchFamily="49" charset="0"/>
               </a:rPr>
               <a:t>(*) </a:t>
             </a:r>
@@ -45388,22 +46141,25 @@
                 <a:solidFill>
                   <a:schemeClr val="bg1"/>
                 </a:solidFill>
+                <a:latin typeface="Consolas" pitchFamily="49" charset="0"/>
               </a:rPr>
               <a:t>COUNT</a:t>
-            </a:r>
-            <a:r>
-              <a:rPr lang="bg-BG" sz="3200" b="1" noProof="1" smtClean="0">
-                <a:solidFill>
-                  <a:srgbClr val="224464"/>
-                </a:solidFill>
-              </a:rPr>
-              <a:t> </a:t>
             </a:r>
             <a:r>
               <a:rPr lang="en-US" sz="3200" b="1" noProof="1" smtClean="0">
                 <a:solidFill>
                   <a:srgbClr val="224464"/>
                 </a:solidFill>
+                <a:latin typeface="Consolas" pitchFamily="49" charset="0"/>
+              </a:rPr>
+              <a:t> </a:t>
+            </a:r>
+            <a:r>
+              <a:rPr lang="en-US" sz="3200" b="1" noProof="1" smtClean="0">
+                <a:solidFill>
+                  <a:srgbClr val="224464"/>
+                </a:solidFill>
+                <a:latin typeface="Consolas" pitchFamily="49" charset="0"/>
               </a:rPr>
               <a:t>(</a:t>
             </a:r>
@@ -45414,6 +46170,7 @@
                     <a:lumMod val="75000"/>
                   </a:schemeClr>
                 </a:solidFill>
+                <a:latin typeface="Consolas" pitchFamily="49" charset="0"/>
               </a:rPr>
               <a:t>колона</a:t>
             </a:r>
@@ -45424,6 +46181,7 @@
                     <a:lumMod val="75000"/>
                   </a:schemeClr>
                 </a:solidFill>
+                <a:latin typeface="Consolas" pitchFamily="49" charset="0"/>
               </a:rPr>
               <a:t>)</a:t>
             </a:r>
@@ -45434,6 +46192,7 @@
                     <a:lumMod val="75000"/>
                   </a:schemeClr>
                 </a:solidFill>
+                <a:latin typeface="Consolas" pitchFamily="49" charset="0"/>
               </a:rPr>
               <a:t> </a:t>
             </a:r>
@@ -45674,7 +46433,7 @@
           <p:nvPr>
             <p:extLst>
               <p:ext uri="{D42A27DB-BD31-4B8C-83A1-F6EECF244321}">
-                <p14:modId xmlns:p14="http://schemas.microsoft.com/office/powerpoint/2010/main" xmlns="" val="1006518010"/>
+                <p14:modId xmlns="" xmlns:p14="http://schemas.microsoft.com/office/powerpoint/2010/main" val="1006518010"/>
               </p:ext>
             </p:extLst>
           </p:nvPr>
@@ -46098,7 +46857,7 @@
           <p:nvPr>
             <p:extLst>
               <p:ext uri="{D42A27DB-BD31-4B8C-83A1-F6EECF244321}">
-                <p14:modId xmlns:p14="http://schemas.microsoft.com/office/powerpoint/2010/main" xmlns="" val="1112611780"/>
+                <p14:modId xmlns="" xmlns:p14="http://schemas.microsoft.com/office/powerpoint/2010/main" val="1112611780"/>
               </p:ext>
             </p:extLst>
           </p:nvPr>
@@ -46526,7 +47285,7 @@
     </p:spTree>
     <p:extLst>
       <p:ext uri="{BB962C8B-B14F-4D97-AF65-F5344CB8AC3E}">
-        <p14:creationId xmlns:p14="http://schemas.microsoft.com/office/powerpoint/2010/main" xmlns="" val="1131685995"/>
+        <p14:creationId xmlns="" xmlns:p14="http://schemas.microsoft.com/office/powerpoint/2010/main" val="1131685995"/>
       </p:ext>
     </p:extLst>
   </p:cSld>
@@ -47139,7 +47898,7 @@
           <p:nvPr>
             <p:extLst>
               <p:ext uri="{D42A27DB-BD31-4B8C-83A1-F6EECF244321}">
-                <p14:modId xmlns:p14="http://schemas.microsoft.com/office/powerpoint/2010/main" xmlns="" val="942586738"/>
+                <p14:modId xmlns="" xmlns:p14="http://schemas.microsoft.com/office/powerpoint/2010/main" val="942586738"/>
               </p:ext>
             </p:extLst>
           </p:nvPr>
@@ -47583,7 +48342,7 @@
     </p:spTree>
     <p:extLst>
       <p:ext uri="{BB962C8B-B14F-4D97-AF65-F5344CB8AC3E}">
-        <p14:creationId xmlns:p14="http://schemas.microsoft.com/office/powerpoint/2010/main" xmlns="" val="935234271"/>
+        <p14:creationId xmlns="" xmlns:p14="http://schemas.microsoft.com/office/powerpoint/2010/main" val="935234271"/>
       </p:ext>
     </p:extLst>
   </p:cSld>
@@ -48034,7 +48793,7 @@
   <a:extraClrSchemeLst/>
   <a:extLst>
     <a:ext uri="{05A4C25C-085E-4340-85A3-A5531E510DB2}">
-      <thm15:themeFamily xmlns="" xmlns:thm15="http://schemas.microsoft.com/office/thememl/2012/main" name="SoftUni" id="{D61FAD9B-6E74-4E03-BFE4-B363D484F1DA}" vid="{7089C1A3-635B-4B03-A017-DAF10A3A396B}"/>
+      <thm15:themeFamily xmlns:thm15="http://schemas.microsoft.com/office/thememl/2012/main" xmlns="" name="SoftUni" id="{D61FAD9B-6E74-4E03-BFE4-B363D484F1DA}" vid="{7089C1A3-635B-4B03-A017-DAF10A3A396B}"/>
     </a:ext>
   </a:extLst>
 </a:theme>
@@ -48329,7 +49088,7 @@
   <a:extraClrSchemeLst/>
   <a:extLst>
     <a:ext uri="{05A4C25C-085E-4340-85A3-A5531E510DB2}">
-      <thm15:themeFamily xmlns="" xmlns:thm15="http://schemas.microsoft.com/office/thememl/2012/main" name="Office Theme" id="{62F939B6-93AF-4DB8-9C6B-D6C7DFDC589F}" vid="{4A3C46E8-61CC-4603-A589-7422A47A8E4A}"/>
+      <thm15:themeFamily xmlns:thm15="http://schemas.microsoft.com/office/thememl/2012/main" xmlns="" name="Office Theme" id="{62F939B6-93AF-4DB8-9C6B-D6C7DFDC589F}" vid="{4A3C46E8-61CC-4603-A589-7422A47A8E4A}"/>
     </a:ext>
   </a:extLst>
 </a:theme>
@@ -48624,19 +49383,16 @@
   <a:extraClrSchemeLst/>
   <a:extLst>
     <a:ext uri="{05A4C25C-085E-4340-85A3-A5531E510DB2}">
-      <thm15:themeFamily xmlns="" xmlns:thm15="http://schemas.microsoft.com/office/thememl/2012/main" name="Office Theme" id="{62F939B6-93AF-4DB8-9C6B-D6C7DFDC589F}" vid="{4A3C46E8-61CC-4603-A589-7422A47A8E4A}"/>
+      <thm15:themeFamily xmlns:thm15="http://schemas.microsoft.com/office/thememl/2012/main" xmlns="" name="Office Theme" id="{62F939B6-93AF-4DB8-9C6B-D6C7DFDC589F}" vid="{4A3C46E8-61CC-4603-A589-7422A47A8E4A}"/>
     </a:ext>
   </a:extLst>
 </a:theme>
 </file>
 
 <file path=customXml/item1.xml><?xml version="1.0" encoding="utf-8"?>
-<?mso-contentType ?>
-<FormTemplates xmlns="http://schemas.microsoft.com/sharepoint/v3/contenttype/forms">
-  <Display>DocumentLibraryForm</Display>
-  <Edit>DocumentLibraryForm</Edit>
-  <New>DocumentLibraryForm</New>
-</FormTemplates>
+<p:properties xmlns:p="http://schemas.microsoft.com/office/2006/metadata/properties" xmlns:xsi="http://www.w3.org/2001/XMLSchema-instance" xmlns:pc="http://schemas.microsoft.com/office/infopath/2007/PartnerControls">
+  <documentManagement/>
+</p:properties>
 </file>
 
 <file path=customXml/item2.xml><?xml version="1.0" encoding="utf-8"?>
@@ -48812,15 +49568,26 @@
 </file>
 
 <file path=customXml/item3.xml><?xml version="1.0" encoding="utf-8"?>
-<p:properties xmlns:p="http://schemas.microsoft.com/office/2006/metadata/properties" xmlns:xsi="http://www.w3.org/2001/XMLSchema-instance" xmlns:pc="http://schemas.microsoft.com/office/infopath/2007/PartnerControls">
-  <documentManagement/>
-</p:properties>
+<?mso-contentType ?>
+<FormTemplates xmlns="http://schemas.microsoft.com/sharepoint/v3/contenttype/forms">
+  <Display>DocumentLibraryForm</Display>
+  <Edit>DocumentLibraryForm</Edit>
+  <New>DocumentLibraryForm</New>
+</FormTemplates>
 </file>
 
 <file path=customXml/itemProps1.xml><?xml version="1.0" encoding="utf-8"?>
-<ds:datastoreItem xmlns:ds="http://schemas.openxmlformats.org/officeDocument/2006/customXml" ds:itemID="{68A20BEC-F81B-49CD-951D-E62C4BAE7796}">
+<ds:datastoreItem xmlns:ds="http://schemas.openxmlformats.org/officeDocument/2006/customXml" ds:itemID="{5E2F4A33-1866-4BB8-8A35-8D6BDFE8D9F5}">
   <ds:schemaRefs>
-    <ds:schemaRef ds:uri="http://schemas.microsoft.com/sharepoint/v3/contenttype/forms"/>
+    <ds:schemaRef ds:uri="http://schemas.microsoft.com/office/infopath/2007/PartnerControls"/>
+    <ds:schemaRef ds:uri="http://purl.org/dc/dcmitype/"/>
+    <ds:schemaRef ds:uri="http://schemas.microsoft.com/office/2006/documentManagement/types"/>
+    <ds:schemaRef ds:uri="http://schemas.microsoft.com/office/2006/metadata/properties"/>
+    <ds:schemaRef ds:uri="http://www.w3.org/XML/1998/namespace"/>
+    <ds:schemaRef ds:uri="4f985cec-e092-4bcf-a1e1-b816bd0221d8"/>
+    <ds:schemaRef ds:uri="http://schemas.openxmlformats.org/package/2006/metadata/core-properties"/>
+    <ds:schemaRef ds:uri="http://purl.org/dc/terms/"/>
+    <ds:schemaRef ds:uri="http://purl.org/dc/elements/1.1/"/>
   </ds:schemaRefs>
 </ds:datastoreItem>
 </file>
@@ -48844,17 +49611,9 @@
 </file>
 
 <file path=customXml/itemProps3.xml><?xml version="1.0" encoding="utf-8"?>
-<ds:datastoreItem xmlns:ds="http://schemas.openxmlformats.org/officeDocument/2006/customXml" ds:itemID="{5E2F4A33-1866-4BB8-8A35-8D6BDFE8D9F5}">
+<ds:datastoreItem xmlns:ds="http://schemas.openxmlformats.org/officeDocument/2006/customXml" ds:itemID="{68A20BEC-F81B-49CD-951D-E62C4BAE7796}">
   <ds:schemaRefs>
-    <ds:schemaRef ds:uri="http://schemas.microsoft.com/office/infopath/2007/PartnerControls"/>
-    <ds:schemaRef ds:uri="http://purl.org/dc/dcmitype/"/>
-    <ds:schemaRef ds:uri="http://schemas.microsoft.com/office/2006/documentManagement/types"/>
-    <ds:schemaRef ds:uri="http://schemas.microsoft.com/office/2006/metadata/properties"/>
-    <ds:schemaRef ds:uri="http://www.w3.org/XML/1998/namespace"/>
-    <ds:schemaRef ds:uri="4f985cec-e092-4bcf-a1e1-b816bd0221d8"/>
-    <ds:schemaRef ds:uri="http://schemas.openxmlformats.org/package/2006/metadata/core-properties"/>
-    <ds:schemaRef ds:uri="http://purl.org/dc/terms/"/>
-    <ds:schemaRef ds:uri="http://purl.org/dc/elements/1.1/"/>
+    <ds:schemaRef ds:uri="http://schemas.microsoft.com/sharepoint/v3/contenttype/forms"/>
   </ds:schemaRefs>
 </ds:datastoreItem>
 </file>
</xml_diff>